<commit_message>
Enhance PPTX: Add visual architecture diagram and embed evaluation plots
</commit_message>
<xml_diff>
--- a/presentation.pptx
+++ b/presentation.pptx
@@ -15,7 +15,6 @@
     <p:sldId id="263" r:id="rId14"/>
     <p:sldId id="264" r:id="rId15"/>
     <p:sldId id="265" r:id="rId16"/>
-    <p:sldId id="266" r:id="rId17"/>
   </p:sldIdLst>
   <p:sldSz cx="9144000" cy="6858000" type="screen4x3"/>
   <p:notesSz cx="6858000" cy="9144000"/>
@@ -3165,17 +3164,6 @@
               <a:t>Indonesian Vehicle Detection and Classification</a:t>
             </a:r>
           </a:p>
-          <a:p/>
-          <a:p>
-            <a:r>
-              <a:t>Machine Learning Engineering Challenge</a:t>
-            </a:r>
-          </a:p>
-          <a:p>
-            <a:r>
-              <a:t>January 2026</a:t>
-            </a:r>
-          </a:p>
         </p:txBody>
       </p:sp>
     </p:spTree>
@@ -3220,14 +3208,14 @@
           <a:lstStyle/>
           <a:p>
             <a:pPr>
-              <a:defRPr>
+              <a:defRPr b="1">
                 <a:solidFill>
                   <a:srgbClr val="B58900"/>
                 </a:solidFill>
               </a:defRPr>
             </a:pPr>
             <a:r>
-              <a:t>Key Findings</a:t>
+              <a:t>Conclusion &amp; Future Work</a:t>
             </a:r>
           </a:p>
         </p:txBody>
@@ -3283,11 +3271,14 @@
               </a:defRPr>
             </a:pPr>
             <a:r>
-              <a:t>Insights</a:t>
+              <a:t>Key Achievements</a:t>
             </a:r>
           </a:p>
           <a:p>
             <a:pPr>
+              <a:spcAft>
+                <a:spcPts val="1000"/>
+              </a:spcAft>
               <a:defRPr sz="2000">
                 <a:solidFill>
                   <a:srgbClr val="657B83"/>
@@ -3295,11 +3286,14 @@
               </a:defRPr>
             </a:pPr>
             <a:r>
-              <a:t>• Pickup &amp; Truck: High accuracy (&gt;90%) due to distinct shapes</a:t>
+              <a:t>• Successful 2-stage pipeline integration</a:t>
             </a:r>
           </a:p>
           <a:p>
             <a:pPr>
+              <a:spcAft>
+                <a:spcPts val="1000"/>
+              </a:spcAft>
               <a:defRPr sz="2000">
                 <a:solidFill>
                   <a:srgbClr val="657B83"/>
@@ -3307,11 +3301,14 @@
               </a:defRPr>
             </a:pPr>
             <a:r>
-              <a:t>• MPV: High recall but confused with Crossovers</a:t>
+              <a:t>• Reliable classification (86%+ accuracy)</a:t>
             </a:r>
           </a:p>
           <a:p>
             <a:pPr>
+              <a:spcAft>
+                <a:spcPts val="1000"/>
+              </a:spcAft>
               <a:defRPr sz="2000">
                 <a:solidFill>
                   <a:srgbClr val="657B83"/>
@@ -3319,7 +3316,7 @@
               </a:defRPr>
             </a:pPr>
             <a:r>
-              <a:t>• Real-time capable at 13.6 FPS</a:t>
+              <a:t>• Real-time viable processing speed</a:t>
             </a:r>
           </a:p>
         </p:txBody>
@@ -3358,268 +3355,44 @@
               </a:defRPr>
             </a:pPr>
             <a:r>
-              <a:t>Tech Stack</a:t>
-            </a:r>
-          </a:p>
-          <a:p>
-            <a:pPr>
-              <a:defRPr sz="2000">
-                <a:solidFill>
-                  <a:srgbClr val="657B83"/>
-                </a:solidFill>
-              </a:defRPr>
-            </a:pPr>
-            <a:r>
-              <a:t>• PyTorch</a:t>
-            </a:r>
-          </a:p>
-          <a:p>
-            <a:pPr>
-              <a:defRPr sz="2000">
-                <a:solidFill>
-                  <a:srgbClr val="657B83"/>
-                </a:solidFill>
-              </a:defRPr>
-            </a:pPr>
-            <a:r>
-              <a:t>• Ultralytics YOLOv8</a:t>
-            </a:r>
-          </a:p>
-          <a:p>
-            <a:pPr>
-              <a:defRPr sz="2000">
-                <a:solidFill>
-                  <a:srgbClr val="657B83"/>
-                </a:solidFill>
-              </a:defRPr>
-            </a:pPr>
-            <a:r>
-              <a:t>• torchvision</a:t>
-            </a:r>
-          </a:p>
-          <a:p>
-            <a:pPr>
-              <a:defRPr sz="2000">
-                <a:solidFill>
-                  <a:srgbClr val="657B83"/>
-                </a:solidFill>
-              </a:defRPr>
-            </a:pPr>
-            <a:r>
-              <a:t>• OpenCV</a:t>
-            </a:r>
-          </a:p>
-          <a:p>
-            <a:pPr>
-              <a:defRPr sz="2000">
-                <a:solidFill>
-                  <a:srgbClr val="657B83"/>
-                </a:solidFill>
-              </a:defRPr>
-            </a:pPr>
-            <a:r>
-              <a:t>• scikit-learn</a:t>
-            </a:r>
-          </a:p>
-        </p:txBody>
-      </p:sp>
-    </p:spTree>
-  </p:cSld>
-  <p:clrMapOvr>
-    <a:masterClrMapping/>
-  </p:clrMapOvr>
-</p:sld>
-</file>
-
-<file path=ppt/slides/slide11.xml><?xml version="1.0" encoding="utf-8"?>
-<p:sld xmlns:a="http://schemas.openxmlformats.org/drawingml/2006/main" xmlns:p="http://schemas.openxmlformats.org/presentationml/2006/main" xmlns:r="http://schemas.openxmlformats.org/officeDocument/2006/relationships">
-  <p:cSld>
-    <p:bg>
-      <p:bgPr>
-        <a:solidFill>
-          <a:srgbClr val="FDF6E3"/>
-        </a:solidFill>
-        <a:effectLst/>
-      </p:bgPr>
-    </p:bg>
-    <p:spTree>
-      <p:nvGrpSpPr>
-        <p:cNvPr id="1" name=""/>
-        <p:cNvGrpSpPr/>
-        <p:nvPr/>
-      </p:nvGrpSpPr>
-      <p:grpSpPr/>
-      <p:sp>
-        <p:nvSpPr>
-          <p:cNvPr id="2" name="Title 1"/>
-          <p:cNvSpPr>
-            <a:spLocks noGrp="1"/>
-          </p:cNvSpPr>
-          <p:nvPr>
-            <p:ph type="title"/>
-          </p:nvPr>
-        </p:nvSpPr>
-        <p:spPr/>
-        <p:txBody>
-          <a:bodyPr/>
-          <a:lstStyle/>
-          <a:p>
-            <a:pPr>
-              <a:defRPr>
-                <a:solidFill>
-                  <a:srgbClr val="B58900"/>
-                </a:solidFill>
-              </a:defRPr>
-            </a:pPr>
-            <a:r>
-              <a:t>Conclusion</a:t>
-            </a:r>
-          </a:p>
-        </p:txBody>
-      </p:sp>
-      <p:sp>
-        <p:nvSpPr>
-          <p:cNvPr id="3" name="Content Placeholder 2"/>
-          <p:cNvSpPr>
-            <a:spLocks noGrp="1"/>
-          </p:cNvSpPr>
-          <p:nvPr>
-            <p:ph idx="1"/>
-          </p:nvPr>
-        </p:nvSpPr>
-        <p:spPr/>
-        <p:txBody>
-          <a:bodyPr/>
-          <a:lstStyle/>
-          <a:p/>
-        </p:txBody>
-      </p:sp>
-      <p:sp>
-        <p:nvSpPr>
-          <p:cNvPr id="4" name="TextBox 3"/>
-          <p:cNvSpPr txBox="1"/>
-          <p:nvPr/>
-        </p:nvSpPr>
-        <p:spPr>
-          <a:xfrm>
-            <a:off x="457200" y="1828800"/>
-            <a:ext cx="4114800" cy="4572000"/>
-          </a:xfrm>
-          <a:prstGeom prst="rect">
-            <a:avLst/>
-          </a:prstGeom>
-          <a:noFill/>
-        </p:spPr>
-        <p:txBody>
-          <a:bodyPr wrap="none">
-            <a:spAutoFit/>
-          </a:bodyPr>
-          <a:lstStyle/>
-          <a:p/>
+              <a:t>Future Improvements</a:t>
+            </a:r>
+          </a:p>
           <a:p>
             <a:pPr>
               <a:spcAft>
-                <a:spcPts val="2000"/>
+                <a:spcPts val="1000"/>
               </a:spcAft>
-              <a:defRPr b="1" sz="2800">
-                <a:solidFill>
-                  <a:srgbClr val="268BD2"/>
+              <a:defRPr sz="2000">
+                <a:solidFill>
+                  <a:srgbClr val="657B83"/>
                 </a:solidFill>
               </a:defRPr>
             </a:pPr>
             <a:r>
-              <a:t>Achievements</a:t>
-            </a:r>
-          </a:p>
-          <a:p>
-            <a:pPr>
-              <a:defRPr sz="2000">
-                <a:solidFill>
-                  <a:srgbClr val="657B83"/>
-                </a:solidFill>
-              </a:defRPr>
-            </a:pPr>
-            <a:r>
-              <a:t>• 86.33% Test Accuracy</a:t>
-            </a:r>
-          </a:p>
-          <a:p>
-            <a:pPr>
-              <a:defRPr sz="2000">
-                <a:solidFill>
-                  <a:srgbClr val="657B83"/>
-                </a:solidFill>
-              </a:defRPr>
-            </a:pPr>
-            <a:r>
-              <a:t>• All 8 car types handled</a:t>
-            </a:r>
-          </a:p>
-          <a:p>
-            <a:pPr>
-              <a:defRPr sz="2000">
-                <a:solidFill>
-                  <a:srgbClr val="657B83"/>
-                </a:solidFill>
-              </a:defRPr>
-            </a:pPr>
-            <a:r>
-              <a:t>• End-to-End Pipeline</a:t>
-            </a:r>
-          </a:p>
-          <a:p>
-            <a:pPr>
-              <a:defRPr sz="2000">
-                <a:solidFill>
-                  <a:srgbClr val="657B83"/>
-                </a:solidFill>
-              </a:defRPr>
-            </a:pPr>
-            <a:r>
-              <a:t>• Video &amp; Image Support</a:t>
-            </a:r>
-          </a:p>
-        </p:txBody>
-      </p:sp>
-      <p:sp>
-        <p:nvSpPr>
-          <p:cNvPr id="5" name="TextBox 4"/>
-          <p:cNvSpPr txBox="1"/>
-          <p:nvPr/>
-        </p:nvSpPr>
-        <p:spPr>
-          <a:xfrm>
-            <a:off x="5029200" y="1828800"/>
-            <a:ext cx="4114800" cy="4572000"/>
-          </a:xfrm>
-          <a:prstGeom prst="rect">
-            <a:avLst/>
-          </a:prstGeom>
-          <a:noFill/>
-        </p:spPr>
-        <p:txBody>
-          <a:bodyPr wrap="none">
-            <a:spAutoFit/>
-          </a:bodyPr>
-          <a:lstStyle/>
-          <a:p/>
+              <a:t>• Adopt Vision Transformers (ViT)</a:t>
+            </a:r>
+          </a:p>
           <a:p>
             <a:pPr>
               <a:spcAft>
-                <a:spcPts val="2000"/>
+                <a:spcPts val="1000"/>
               </a:spcAft>
-              <a:defRPr b="1" sz="2800">
-                <a:solidFill>
-                  <a:srgbClr val="268BD2"/>
+              <a:defRPr sz="2000">
+                <a:solidFill>
+                  <a:srgbClr val="657B83"/>
                 </a:solidFill>
               </a:defRPr>
             </a:pPr>
             <a:r>
-              <a:t>Future Work</a:t>
+              <a:t>• Expand dataset for rare classes</a:t>
             </a:r>
           </a:p>
           <a:p>
             <a:pPr>
+              <a:spcAft>
+                <a:spcPts val="1000"/>
+              </a:spcAft>
               <a:defRPr sz="2000">
                 <a:solidFill>
                   <a:srgbClr val="657B83"/>
@@ -3627,43 +3400,7 @@
               </a:defRPr>
             </a:pPr>
             <a:r>
-              <a:t>• Vision Transformers (ViT)</a:t>
-            </a:r>
-          </a:p>
-          <a:p>
-            <a:pPr>
-              <a:defRPr sz="2000">
-                <a:solidFill>
-                  <a:srgbClr val="657B83"/>
-                </a:solidFill>
-              </a:defRPr>
-            </a:pPr>
-            <a:r>
-              <a:t>• Dataset Expansion</a:t>
-            </a:r>
-          </a:p>
-          <a:p>
-            <a:pPr>
-              <a:defRPr sz="2000">
-                <a:solidFill>
-                  <a:srgbClr val="657B83"/>
-                </a:solidFill>
-              </a:defRPr>
-            </a:pPr>
-            <a:r>
-              <a:t>• Edge Deployment (TensorRT)</a:t>
-            </a:r>
-          </a:p>
-          <a:p>
-            <a:pPr>
-              <a:defRPr sz="2000">
-                <a:solidFill>
-                  <a:srgbClr val="657B83"/>
-                </a:solidFill>
-              </a:defRPr>
-            </a:pPr>
-            <a:r>
-              <a:t>• Vehicle Tracking (DeepSORT)</a:t>
+              <a:t>• Optimize for Edge Devices (TensorRT)</a:t>
             </a:r>
           </a:p>
         </p:txBody>
@@ -3710,7 +3447,7 @@
           <a:lstStyle/>
           <a:p>
             <a:pPr>
-              <a:defRPr>
+              <a:defRPr b="1">
                 <a:solidFill>
                   <a:srgbClr val="B58900"/>
                 </a:solidFill>
@@ -3773,11 +3510,14 @@
               </a:defRPr>
             </a:pPr>
             <a:r>
-              <a:t>Challenge</a:t>
+              <a:t>Measurements</a:t>
             </a:r>
           </a:p>
           <a:p>
             <a:pPr>
+              <a:spcAft>
+                <a:spcPts val="1000"/>
+              </a:spcAft>
               <a:defRPr sz="2000">
                 <a:solidFill>
                   <a:srgbClr val="657B83"/>
@@ -3785,11 +3525,14 @@
               </a:defRPr>
             </a:pPr>
             <a:r>
-              <a:t>• Develop Object Detection Model for Cars</a:t>
+              <a:t>• Detect multiple car instances</a:t>
             </a:r>
           </a:p>
           <a:p>
             <a:pPr>
+              <a:spcAft>
+                <a:spcPts val="1000"/>
+              </a:spcAft>
               <a:defRPr sz="2000">
                 <a:solidFill>
                   <a:srgbClr val="657B83"/>
@@ -3797,11 +3540,14 @@
               </a:defRPr>
             </a:pPr>
             <a:r>
-              <a:t>• Classify Indonesian Car Types</a:t>
+              <a:t>• Classify 8 Indonesian car types</a:t>
             </a:r>
           </a:p>
           <a:p>
             <a:pPr>
+              <a:spcAft>
+                <a:spcPts val="1000"/>
+              </a:spcAft>
               <a:defRPr sz="2000">
                 <a:solidFill>
                   <a:srgbClr val="657B83"/>
@@ -3809,19 +3555,7 @@
               </a:defRPr>
             </a:pPr>
             <a:r>
-              <a:t>• Integrate both into unified pipeline</a:t>
-            </a:r>
-          </a:p>
-          <a:p>
-            <a:pPr>
-              <a:defRPr sz="2000">
-                <a:solidFill>
-                  <a:srgbClr val="657B83"/>
-                </a:solidFill>
-              </a:defRPr>
-            </a:pPr>
-            <a:r>
-              <a:t>• Process real-world traffic video</a:t>
+              <a:t>• Process traffic video</a:t>
             </a:r>
           </a:p>
         </p:txBody>
@@ -3860,11 +3594,14 @@
               </a:defRPr>
             </a:pPr>
             <a:r>
-              <a:t>Requirements</a:t>
+              <a:t>Constraints</a:t>
             </a:r>
           </a:p>
           <a:p>
             <a:pPr>
+              <a:spcAft>
+                <a:spcPts val="1000"/>
+              </a:spcAft>
               <a:defRPr sz="2000">
                 <a:solidFill>
                   <a:srgbClr val="657B83"/>
@@ -3872,11 +3609,14 @@
               </a:defRPr>
             </a:pPr>
             <a:r>
-              <a:t>• Detect multiple car instances</a:t>
+              <a:t>• Use Deep Learning (PyTorch)</a:t>
             </a:r>
           </a:p>
           <a:p>
             <a:pPr>
+              <a:spcAft>
+                <a:spcPts val="1000"/>
+              </a:spcAft>
               <a:defRPr sz="2000">
                 <a:solidFill>
                   <a:srgbClr val="657B83"/>
@@ -3884,11 +3624,14 @@
               </a:defRPr>
             </a:pPr>
             <a:r>
-              <a:t>• 8 car type categories</a:t>
+              <a:t>• Real-time capability desirable</a:t>
             </a:r>
           </a:p>
           <a:p>
             <a:pPr>
+              <a:spcAft>
+                <a:spcPts val="1000"/>
+              </a:spcAft>
               <a:defRPr sz="2000">
                 <a:solidFill>
                   <a:srgbClr val="657B83"/>
@@ -3896,19 +3639,7 @@
               </a:defRPr>
             </a:pPr>
             <a:r>
-              <a:t>• CNN-based feature extraction</a:t>
-            </a:r>
-          </a:p>
-          <a:p>
-            <a:pPr>
-              <a:defRPr sz="2000">
-                <a:solidFill>
-                  <a:srgbClr val="657B83"/>
-                </a:solidFill>
-              </a:defRPr>
-            </a:pPr>
-            <a:r>
-              <a:t>• Deep Learning Framework (PyTorch)</a:t>
+              <a:t>• Robust to varied visual conditions</a:t>
             </a:r>
           </a:p>
         </p:txBody>
@@ -3955,7 +3686,7 @@
           <a:lstStyle/>
           <a:p>
             <a:pPr>
-              <a:defRPr>
+              <a:defRPr b="1">
                 <a:solidFill>
                   <a:srgbClr val="B58900"/>
                 </a:solidFill>
@@ -3969,36 +3700,477 @@
       </p:sp>
       <p:sp>
         <p:nvSpPr>
-          <p:cNvPr id="3" name="TextBox 2"/>
-          <p:cNvSpPr txBox="1"/>
+          <p:cNvPr id="3" name="Rounded Rectangle 2"/>
+          <p:cNvSpPr/>
           <p:nvPr/>
         </p:nvSpPr>
         <p:spPr>
           <a:xfrm>
-            <a:off x="457200" y="2286000"/>
-            <a:ext cx="8229600" cy="914400"/>
-          </a:xfrm>
-          <a:prstGeom prst="rect">
+            <a:off x="365760" y="3200400"/>
+            <a:ext cx="1463040" cy="1097280"/>
+          </a:xfrm>
+          <a:prstGeom prst="roundRect">
             <a:avLst/>
           </a:prstGeom>
-          <a:noFill/>
-        </p:spPr>
-        <p:txBody>
-          <a:bodyPr wrap="none">
-            <a:spAutoFit/>
-          </a:bodyPr>
-          <a:lstStyle/>
+          <a:solidFill>
+            <a:srgbClr val="93A1A1"/>
+          </a:solidFill>
+          <a:ln>
+            <a:solidFill>
+              <a:srgbClr val="586E75"/>
+            </a:solidFill>
+          </a:ln>
+        </p:spPr>
+        <p:style>
+          <a:lnRef idx="1">
+            <a:schemeClr val="accent1"/>
+          </a:lnRef>
+          <a:fillRef idx="3">
+            <a:schemeClr val="accent1"/>
+          </a:fillRef>
+          <a:effectRef idx="2">
+            <a:schemeClr val="accent1"/>
+          </a:effectRef>
+          <a:fontRef idx="minor">
+            <a:schemeClr val="lt1"/>
+          </a:fontRef>
+        </p:style>
+        <p:txBody>
+          <a:bodyPr rtlCol="0" anchor="ctr"/>
+          <a:lstStyle/>
+          <a:p>
+            <a:pPr algn="ctr"/>
+          </a:p>
           <a:p>
             <a:pPr algn="ctr">
-              <a:defRPr sz="1800">
-                <a:solidFill>
-                  <a:srgbClr val="657B83"/>
-                </a:solidFill>
-                <a:latin typeface="Courier New"/>
+              <a:defRPr b="1">
+                <a:solidFill>
+                  <a:srgbClr val="FFFFFF"/>
+                </a:solidFill>
               </a:defRPr>
             </a:pPr>
             <a:r>
-              <a:t>Input Image/Video  →  YOLOv8 Detector  →  Crop Regions  →  ResNet50 Classifier  →  Car Types</a:t>
+              <a:t>Input</a:t>
+            </a:r>
+            <a:br/>
+            <a:r>
+              <a:t>Video/Image</a:t>
+            </a:r>
+          </a:p>
+        </p:txBody>
+      </p:sp>
+      <p:sp>
+        <p:nvSpPr>
+          <p:cNvPr id="4" name="Right Arrow 3"/>
+          <p:cNvSpPr/>
+          <p:nvPr/>
+        </p:nvSpPr>
+        <p:spPr>
+          <a:xfrm>
+            <a:off x="1874520" y="3657600"/>
+            <a:ext cx="182880" cy="182880"/>
+          </a:xfrm>
+          <a:prstGeom prst="rightArrow">
+            <a:avLst/>
+          </a:prstGeom>
+          <a:solidFill>
+            <a:srgbClr val="CB4B16"/>
+          </a:solidFill>
+          <a:ln>
+            <a:noFill/>
+          </a:ln>
+        </p:spPr>
+        <p:style>
+          <a:lnRef idx="1">
+            <a:schemeClr val="accent1"/>
+          </a:lnRef>
+          <a:fillRef idx="3">
+            <a:schemeClr val="accent1"/>
+          </a:fillRef>
+          <a:effectRef idx="2">
+            <a:schemeClr val="accent1"/>
+          </a:effectRef>
+          <a:fontRef idx="minor">
+            <a:schemeClr val="lt1"/>
+          </a:fontRef>
+        </p:style>
+        <p:txBody>
+          <a:bodyPr rtlCol="0" anchor="ctr"/>
+          <a:lstStyle/>
+          <a:p>
+            <a:pPr algn="ctr"/>
+          </a:p>
+        </p:txBody>
+      </p:sp>
+      <p:sp>
+        <p:nvSpPr>
+          <p:cNvPr id="5" name="Rounded Rectangle 4"/>
+          <p:cNvSpPr/>
+          <p:nvPr/>
+        </p:nvSpPr>
+        <p:spPr>
+          <a:xfrm>
+            <a:off x="2103120" y="3200400"/>
+            <a:ext cx="1463040" cy="1097280"/>
+          </a:xfrm>
+          <a:prstGeom prst="roundRect">
+            <a:avLst/>
+          </a:prstGeom>
+          <a:solidFill>
+            <a:srgbClr val="268BD2"/>
+          </a:solidFill>
+          <a:ln>
+            <a:solidFill>
+              <a:srgbClr val="586E75"/>
+            </a:solidFill>
+          </a:ln>
+        </p:spPr>
+        <p:style>
+          <a:lnRef idx="1">
+            <a:schemeClr val="accent1"/>
+          </a:lnRef>
+          <a:fillRef idx="3">
+            <a:schemeClr val="accent1"/>
+          </a:fillRef>
+          <a:effectRef idx="2">
+            <a:schemeClr val="accent1"/>
+          </a:effectRef>
+          <a:fontRef idx="minor">
+            <a:schemeClr val="lt1"/>
+          </a:fontRef>
+        </p:style>
+        <p:txBody>
+          <a:bodyPr rtlCol="0" anchor="ctr"/>
+          <a:lstStyle/>
+          <a:p>
+            <a:pPr algn="ctr"/>
+          </a:p>
+          <a:p>
+            <a:pPr algn="ctr">
+              <a:defRPr b="1">
+                <a:solidFill>
+                  <a:srgbClr val="FFFFFF"/>
+                </a:solidFill>
+              </a:defRPr>
+            </a:pPr>
+            <a:r>
+              <a:t>YOLOv8</a:t>
+            </a:r>
+            <a:br/>
+            <a:r>
+              <a:t>Detector</a:t>
+            </a:r>
+          </a:p>
+        </p:txBody>
+      </p:sp>
+      <p:sp>
+        <p:nvSpPr>
+          <p:cNvPr id="6" name="Right Arrow 5"/>
+          <p:cNvSpPr/>
+          <p:nvPr/>
+        </p:nvSpPr>
+        <p:spPr>
+          <a:xfrm>
+            <a:off x="3611880" y="3657600"/>
+            <a:ext cx="182880" cy="182880"/>
+          </a:xfrm>
+          <a:prstGeom prst="rightArrow">
+            <a:avLst/>
+          </a:prstGeom>
+          <a:solidFill>
+            <a:srgbClr val="CB4B16"/>
+          </a:solidFill>
+          <a:ln>
+            <a:noFill/>
+          </a:ln>
+        </p:spPr>
+        <p:style>
+          <a:lnRef idx="1">
+            <a:schemeClr val="accent1"/>
+          </a:lnRef>
+          <a:fillRef idx="3">
+            <a:schemeClr val="accent1"/>
+          </a:fillRef>
+          <a:effectRef idx="2">
+            <a:schemeClr val="accent1"/>
+          </a:effectRef>
+          <a:fontRef idx="minor">
+            <a:schemeClr val="lt1"/>
+          </a:fontRef>
+        </p:style>
+        <p:txBody>
+          <a:bodyPr rtlCol="0" anchor="ctr"/>
+          <a:lstStyle/>
+          <a:p>
+            <a:pPr algn="ctr"/>
+          </a:p>
+        </p:txBody>
+      </p:sp>
+      <p:sp>
+        <p:nvSpPr>
+          <p:cNvPr id="7" name="Rounded Rectangle 6"/>
+          <p:cNvSpPr/>
+          <p:nvPr/>
+        </p:nvSpPr>
+        <p:spPr>
+          <a:xfrm>
+            <a:off x="3840480" y="3200400"/>
+            <a:ext cx="1463040" cy="1097280"/>
+          </a:xfrm>
+          <a:prstGeom prst="roundRect">
+            <a:avLst/>
+          </a:prstGeom>
+          <a:solidFill>
+            <a:srgbClr val="93A1A1"/>
+          </a:solidFill>
+          <a:ln>
+            <a:solidFill>
+              <a:srgbClr val="586E75"/>
+            </a:solidFill>
+          </a:ln>
+        </p:spPr>
+        <p:style>
+          <a:lnRef idx="1">
+            <a:schemeClr val="accent1"/>
+          </a:lnRef>
+          <a:fillRef idx="3">
+            <a:schemeClr val="accent1"/>
+          </a:fillRef>
+          <a:effectRef idx="2">
+            <a:schemeClr val="accent1"/>
+          </a:effectRef>
+          <a:fontRef idx="minor">
+            <a:schemeClr val="lt1"/>
+          </a:fontRef>
+        </p:style>
+        <p:txBody>
+          <a:bodyPr rtlCol="0" anchor="ctr"/>
+          <a:lstStyle/>
+          <a:p>
+            <a:pPr algn="ctr"/>
+          </a:p>
+          <a:p>
+            <a:pPr algn="ctr">
+              <a:defRPr b="1">
+                <a:solidFill>
+                  <a:srgbClr val="FFFFFF"/>
+                </a:solidFill>
+              </a:defRPr>
+            </a:pPr>
+            <a:r>
+              <a:t>Crop</a:t>
+            </a:r>
+            <a:br/>
+            <a:r>
+              <a:t>Regions</a:t>
+            </a:r>
+          </a:p>
+        </p:txBody>
+      </p:sp>
+      <p:sp>
+        <p:nvSpPr>
+          <p:cNvPr id="8" name="Right Arrow 7"/>
+          <p:cNvSpPr/>
+          <p:nvPr/>
+        </p:nvSpPr>
+        <p:spPr>
+          <a:xfrm>
+            <a:off x="5349240" y="3657600"/>
+            <a:ext cx="182880" cy="182880"/>
+          </a:xfrm>
+          <a:prstGeom prst="rightArrow">
+            <a:avLst/>
+          </a:prstGeom>
+          <a:solidFill>
+            <a:srgbClr val="CB4B16"/>
+          </a:solidFill>
+          <a:ln>
+            <a:noFill/>
+          </a:ln>
+        </p:spPr>
+        <p:style>
+          <a:lnRef idx="1">
+            <a:schemeClr val="accent1"/>
+          </a:lnRef>
+          <a:fillRef idx="3">
+            <a:schemeClr val="accent1"/>
+          </a:fillRef>
+          <a:effectRef idx="2">
+            <a:schemeClr val="accent1"/>
+          </a:effectRef>
+          <a:fontRef idx="minor">
+            <a:schemeClr val="lt1"/>
+          </a:fontRef>
+        </p:style>
+        <p:txBody>
+          <a:bodyPr rtlCol="0" anchor="ctr"/>
+          <a:lstStyle/>
+          <a:p>
+            <a:pPr algn="ctr"/>
+          </a:p>
+        </p:txBody>
+      </p:sp>
+      <p:sp>
+        <p:nvSpPr>
+          <p:cNvPr id="9" name="Rounded Rectangle 8"/>
+          <p:cNvSpPr/>
+          <p:nvPr/>
+        </p:nvSpPr>
+        <p:spPr>
+          <a:xfrm>
+            <a:off x="5577840" y="3200400"/>
+            <a:ext cx="1463040" cy="1097280"/>
+          </a:xfrm>
+          <a:prstGeom prst="roundRect">
+            <a:avLst/>
+          </a:prstGeom>
+          <a:solidFill>
+            <a:srgbClr val="268BD2"/>
+          </a:solidFill>
+          <a:ln>
+            <a:solidFill>
+              <a:srgbClr val="586E75"/>
+            </a:solidFill>
+          </a:ln>
+        </p:spPr>
+        <p:style>
+          <a:lnRef idx="1">
+            <a:schemeClr val="accent1"/>
+          </a:lnRef>
+          <a:fillRef idx="3">
+            <a:schemeClr val="accent1"/>
+          </a:fillRef>
+          <a:effectRef idx="2">
+            <a:schemeClr val="accent1"/>
+          </a:effectRef>
+          <a:fontRef idx="minor">
+            <a:schemeClr val="lt1"/>
+          </a:fontRef>
+        </p:style>
+        <p:txBody>
+          <a:bodyPr rtlCol="0" anchor="ctr"/>
+          <a:lstStyle/>
+          <a:p>
+            <a:pPr algn="ctr"/>
+          </a:p>
+          <a:p>
+            <a:pPr algn="ctr">
+              <a:defRPr b="1">
+                <a:solidFill>
+                  <a:srgbClr val="FFFFFF"/>
+                </a:solidFill>
+              </a:defRPr>
+            </a:pPr>
+            <a:r>
+              <a:t>ResNet50</a:t>
+            </a:r>
+            <a:br/>
+            <a:r>
+              <a:t>Classifier</a:t>
+            </a:r>
+          </a:p>
+        </p:txBody>
+      </p:sp>
+      <p:sp>
+        <p:nvSpPr>
+          <p:cNvPr id="10" name="Right Arrow 9"/>
+          <p:cNvSpPr/>
+          <p:nvPr/>
+        </p:nvSpPr>
+        <p:spPr>
+          <a:xfrm>
+            <a:off x="7086600" y="3657600"/>
+            <a:ext cx="182880" cy="182880"/>
+          </a:xfrm>
+          <a:prstGeom prst="rightArrow">
+            <a:avLst/>
+          </a:prstGeom>
+          <a:solidFill>
+            <a:srgbClr val="CB4B16"/>
+          </a:solidFill>
+          <a:ln>
+            <a:noFill/>
+          </a:ln>
+        </p:spPr>
+        <p:style>
+          <a:lnRef idx="1">
+            <a:schemeClr val="accent1"/>
+          </a:lnRef>
+          <a:fillRef idx="3">
+            <a:schemeClr val="accent1"/>
+          </a:fillRef>
+          <a:effectRef idx="2">
+            <a:schemeClr val="accent1"/>
+          </a:effectRef>
+          <a:fontRef idx="minor">
+            <a:schemeClr val="lt1"/>
+          </a:fontRef>
+        </p:style>
+        <p:txBody>
+          <a:bodyPr rtlCol="0" anchor="ctr"/>
+          <a:lstStyle/>
+          <a:p>
+            <a:pPr algn="ctr"/>
+          </a:p>
+        </p:txBody>
+      </p:sp>
+      <p:sp>
+        <p:nvSpPr>
+          <p:cNvPr id="11" name="Rounded Rectangle 10"/>
+          <p:cNvSpPr/>
+          <p:nvPr/>
+        </p:nvSpPr>
+        <p:spPr>
+          <a:xfrm>
+            <a:off x="7315200" y="3200400"/>
+            <a:ext cx="1463040" cy="1097280"/>
+          </a:xfrm>
+          <a:prstGeom prst="roundRect">
+            <a:avLst/>
+          </a:prstGeom>
+          <a:solidFill>
+            <a:srgbClr val="859900"/>
+          </a:solidFill>
+          <a:ln>
+            <a:solidFill>
+              <a:srgbClr val="586E75"/>
+            </a:solidFill>
+          </a:ln>
+        </p:spPr>
+        <p:style>
+          <a:lnRef idx="1">
+            <a:schemeClr val="accent1"/>
+          </a:lnRef>
+          <a:fillRef idx="3">
+            <a:schemeClr val="accent1"/>
+          </a:fillRef>
+          <a:effectRef idx="2">
+            <a:schemeClr val="accent1"/>
+          </a:effectRef>
+          <a:fontRef idx="minor">
+            <a:schemeClr val="lt1"/>
+          </a:fontRef>
+        </p:style>
+        <p:txBody>
+          <a:bodyPr rtlCol="0" anchor="ctr"/>
+          <a:lstStyle/>
+          <a:p>
+            <a:pPr algn="ctr"/>
+          </a:p>
+          <a:p>
+            <a:pPr algn="ctr">
+              <a:defRPr b="1">
+                <a:solidFill>
+                  <a:srgbClr val="FFFFFF"/>
+                </a:solidFill>
+              </a:defRPr>
+            </a:pPr>
+            <a:r>
+              <a:t>Output</a:t>
+            </a:r>
+            <a:br/>
+            <a:r>
+              <a:t>Annnotations</a:t>
             </a:r>
           </a:p>
         </p:txBody>
@@ -4045,33 +4217,61 @@
           <a:lstStyle/>
           <a:p>
             <a:pPr>
-              <a:defRPr>
+              <a:defRPr b="1">
                 <a:solidFill>
                   <a:srgbClr val="B58900"/>
                 </a:solidFill>
               </a:defRPr>
             </a:pPr>
             <a:r>
-              <a:t>System Details</a:t>
-            </a:r>
-          </a:p>
-        </p:txBody>
-      </p:sp>
-      <p:sp>
-        <p:nvSpPr>
-          <p:cNvPr id="3" name="Content Placeholder 2"/>
-          <p:cNvSpPr>
-            <a:spLocks noGrp="1"/>
-          </p:cNvSpPr>
-          <p:nvPr>
-            <p:ph idx="1"/>
-          </p:nvPr>
-        </p:nvSpPr>
-        <p:spPr/>
-        <p:txBody>
-          <a:bodyPr/>
-          <a:lstStyle/>
-          <a:p/>
+              <a:t>Dataset Overview</a:t>
+            </a:r>
+          </a:p>
+        </p:txBody>
+      </p:sp>
+      <p:sp>
+        <p:nvSpPr>
+          <p:cNvPr id="3" name="Rounded Rectangle 2"/>
+          <p:cNvSpPr/>
+          <p:nvPr/>
+        </p:nvSpPr>
+        <p:spPr>
+          <a:xfrm>
+            <a:off x="457200" y="2286000"/>
+            <a:ext cx="2011680" cy="1371600"/>
+          </a:xfrm>
+          <a:prstGeom prst="roundRect">
+            <a:avLst/>
+          </a:prstGeom>
+          <a:solidFill>
+            <a:srgbClr val="EEE8D5"/>
+          </a:solidFill>
+          <a:ln>
+            <a:solidFill>
+              <a:srgbClr val="93A1A1"/>
+            </a:solidFill>
+          </a:ln>
+        </p:spPr>
+        <p:style>
+          <a:lnRef idx="1">
+            <a:schemeClr val="accent1"/>
+          </a:lnRef>
+          <a:fillRef idx="3">
+            <a:schemeClr val="accent1"/>
+          </a:fillRef>
+          <a:effectRef idx="2">
+            <a:schemeClr val="accent1"/>
+          </a:effectRef>
+          <a:fontRef idx="minor">
+            <a:schemeClr val="lt1"/>
+          </a:fontRef>
+        </p:style>
+        <p:txBody>
+          <a:bodyPr rtlCol="0" anchor="ctr"/>
+          <a:lstStyle/>
+          <a:p>
+            <a:pPr algn="ctr"/>
+          </a:p>
         </p:txBody>
       </p:sp>
       <p:sp>
@@ -4082,8 +4282,8 @@
         </p:nvSpPr>
         <p:spPr>
           <a:xfrm>
-            <a:off x="457200" y="1828800"/>
-            <a:ext cx="4114800" cy="4572000"/>
+            <a:off x="457200" y="2514600"/>
+            <a:ext cx="2011680" cy="731520"/>
           </a:xfrm>
           <a:prstGeom prst="rect">
             <a:avLst/>
@@ -4095,56 +4295,16 @@
             <a:spAutoFit/>
           </a:bodyPr>
           <a:lstStyle/>
-          <a:p/>
-          <a:p>
-            <a:pPr>
-              <a:spcAft>
-                <a:spcPts val="2000"/>
-              </a:spcAft>
-              <a:defRPr b="1" sz="2800">
-                <a:solidFill>
-                  <a:srgbClr val="268BD2"/>
+          <a:p>
+            <a:pPr algn="ctr">
+              <a:defRPr b="1" sz="3200">
+                <a:solidFill>
+                  <a:srgbClr val="D33682"/>
                 </a:solidFill>
               </a:defRPr>
             </a:pPr>
             <a:r>
-              <a:t>Detection Stage</a:t>
-            </a:r>
-          </a:p>
-          <a:p>
-            <a:pPr>
-              <a:defRPr sz="2000">
-                <a:solidFill>
-                  <a:srgbClr val="657B83"/>
-                </a:solidFill>
-              </a:defRPr>
-            </a:pPr>
-            <a:r>
-              <a:t>• YOLOv8-nano (COCO pretrained)</a:t>
-            </a:r>
-          </a:p>
-          <a:p>
-            <a:pPr>
-              <a:defRPr sz="2000">
-                <a:solidFill>
-                  <a:srgbClr val="657B83"/>
-                </a:solidFill>
-              </a:defRPr>
-            </a:pPr>
-            <a:r>
-              <a:t>• Filters vehicle classes</a:t>
-            </a:r>
-          </a:p>
-          <a:p>
-            <a:pPr>
-              <a:defRPr sz="2000">
-                <a:solidFill>
-                  <a:srgbClr val="657B83"/>
-                </a:solidFill>
-              </a:defRPr>
-            </a:pPr>
-            <a:r>
-              <a:t>• Returns BBoxes + Confidence</a:t>
+              <a:t>17,171</a:t>
             </a:r>
           </a:p>
         </p:txBody>
@@ -4157,8 +4317,8 @@
         </p:nvSpPr>
         <p:spPr>
           <a:xfrm>
-            <a:off x="5029200" y="1828800"/>
-            <a:ext cx="4114800" cy="4572000"/>
+            <a:off x="457200" y="3063240"/>
+            <a:ext cx="2011680" cy="457200"/>
           </a:xfrm>
           <a:prstGeom prst="rect">
             <a:avLst/>
@@ -4170,56 +4330,361 @@
             <a:spAutoFit/>
           </a:bodyPr>
           <a:lstStyle/>
-          <a:p/>
-          <a:p>
-            <a:pPr>
-              <a:spcAft>
-                <a:spcPts val="2000"/>
-              </a:spcAft>
-              <a:defRPr b="1" sz="2800">
-                <a:solidFill>
-                  <a:srgbClr val="268BD2"/>
+          <a:p>
+            <a:pPr algn="ctr">
+              <a:defRPr sz="1400">
+                <a:solidFill>
+                  <a:srgbClr val="586E75"/>
                 </a:solidFill>
               </a:defRPr>
             </a:pPr>
             <a:r>
-              <a:t>Classification Stage</a:t>
-            </a:r>
-          </a:p>
-          <a:p>
-            <a:pPr>
-              <a:defRPr sz="2000">
-                <a:solidFill>
-                  <a:srgbClr val="657B83"/>
+              <a:t>Total Images</a:t>
+            </a:r>
+          </a:p>
+        </p:txBody>
+      </p:sp>
+      <p:sp>
+        <p:nvSpPr>
+          <p:cNvPr id="6" name="Rounded Rectangle 5"/>
+          <p:cNvSpPr/>
+          <p:nvPr/>
+        </p:nvSpPr>
+        <p:spPr>
+          <a:xfrm>
+            <a:off x="2697480" y="2286000"/>
+            <a:ext cx="2011680" cy="1371600"/>
+          </a:xfrm>
+          <a:prstGeom prst="roundRect">
+            <a:avLst/>
+          </a:prstGeom>
+          <a:solidFill>
+            <a:srgbClr val="EEE8D5"/>
+          </a:solidFill>
+          <a:ln>
+            <a:solidFill>
+              <a:srgbClr val="93A1A1"/>
+            </a:solidFill>
+          </a:ln>
+        </p:spPr>
+        <p:style>
+          <a:lnRef idx="1">
+            <a:schemeClr val="accent1"/>
+          </a:lnRef>
+          <a:fillRef idx="3">
+            <a:schemeClr val="accent1"/>
+          </a:fillRef>
+          <a:effectRef idx="2">
+            <a:schemeClr val="accent1"/>
+          </a:effectRef>
+          <a:fontRef idx="minor">
+            <a:schemeClr val="lt1"/>
+          </a:fontRef>
+        </p:style>
+        <p:txBody>
+          <a:bodyPr rtlCol="0" anchor="ctr"/>
+          <a:lstStyle/>
+          <a:p>
+            <a:pPr algn="ctr"/>
+          </a:p>
+        </p:txBody>
+      </p:sp>
+      <p:sp>
+        <p:nvSpPr>
+          <p:cNvPr id="7" name="TextBox 6"/>
+          <p:cNvSpPr txBox="1"/>
+          <p:nvPr/>
+        </p:nvSpPr>
+        <p:spPr>
+          <a:xfrm>
+            <a:off x="2697480" y="2514600"/>
+            <a:ext cx="2011680" cy="731520"/>
+          </a:xfrm>
+          <a:prstGeom prst="rect">
+            <a:avLst/>
+          </a:prstGeom>
+          <a:noFill/>
+        </p:spPr>
+        <p:txBody>
+          <a:bodyPr wrap="none">
+            <a:spAutoFit/>
+          </a:bodyPr>
+          <a:lstStyle/>
+          <a:p>
+            <a:pPr algn="ctr">
+              <a:defRPr b="1" sz="3200">
+                <a:solidFill>
+                  <a:srgbClr val="D33682"/>
                 </a:solidFill>
               </a:defRPr>
             </a:pPr>
             <a:r>
-              <a:t>• ResNet50 backbone (ImageNet)</a:t>
-            </a:r>
-          </a:p>
-          <a:p>
-            <a:pPr>
-              <a:defRPr sz="2000">
-                <a:solidFill>
-                  <a:srgbClr val="657B83"/>
+              <a:t>8</a:t>
+            </a:r>
+          </a:p>
+        </p:txBody>
+      </p:sp>
+      <p:sp>
+        <p:nvSpPr>
+          <p:cNvPr id="8" name="TextBox 7"/>
+          <p:cNvSpPr txBox="1"/>
+          <p:nvPr/>
+        </p:nvSpPr>
+        <p:spPr>
+          <a:xfrm>
+            <a:off x="2697480" y="3063240"/>
+            <a:ext cx="2011680" cy="457200"/>
+          </a:xfrm>
+          <a:prstGeom prst="rect">
+            <a:avLst/>
+          </a:prstGeom>
+          <a:noFill/>
+        </p:spPr>
+        <p:txBody>
+          <a:bodyPr wrap="none">
+            <a:spAutoFit/>
+          </a:bodyPr>
+          <a:lstStyle/>
+          <a:p>
+            <a:pPr algn="ctr">
+              <a:defRPr sz="1400">
+                <a:solidFill>
+                  <a:srgbClr val="586E75"/>
                 </a:solidFill>
               </a:defRPr>
             </a:pPr>
             <a:r>
-              <a:t>• Custom classification head</a:t>
-            </a:r>
-          </a:p>
-          <a:p>
-            <a:pPr>
-              <a:defRPr sz="2000">
-                <a:solidFill>
-                  <a:srgbClr val="657B83"/>
+              <a:t>Car Types</a:t>
+            </a:r>
+          </a:p>
+        </p:txBody>
+      </p:sp>
+      <p:sp>
+        <p:nvSpPr>
+          <p:cNvPr id="9" name="Rounded Rectangle 8"/>
+          <p:cNvSpPr/>
+          <p:nvPr/>
+        </p:nvSpPr>
+        <p:spPr>
+          <a:xfrm>
+            <a:off x="4937760" y="2286000"/>
+            <a:ext cx="2011680" cy="1371600"/>
+          </a:xfrm>
+          <a:prstGeom prst="roundRect">
+            <a:avLst/>
+          </a:prstGeom>
+          <a:solidFill>
+            <a:srgbClr val="EEE8D5"/>
+          </a:solidFill>
+          <a:ln>
+            <a:solidFill>
+              <a:srgbClr val="93A1A1"/>
+            </a:solidFill>
+          </a:ln>
+        </p:spPr>
+        <p:style>
+          <a:lnRef idx="1">
+            <a:schemeClr val="accent1"/>
+          </a:lnRef>
+          <a:fillRef idx="3">
+            <a:schemeClr val="accent1"/>
+          </a:fillRef>
+          <a:effectRef idx="2">
+            <a:schemeClr val="accent1"/>
+          </a:effectRef>
+          <a:fontRef idx="minor">
+            <a:schemeClr val="lt1"/>
+          </a:fontRef>
+        </p:style>
+        <p:txBody>
+          <a:bodyPr rtlCol="0" anchor="ctr"/>
+          <a:lstStyle/>
+          <a:p>
+            <a:pPr algn="ctr"/>
+          </a:p>
+        </p:txBody>
+      </p:sp>
+      <p:sp>
+        <p:nvSpPr>
+          <p:cNvPr id="10" name="TextBox 9"/>
+          <p:cNvSpPr txBox="1"/>
+          <p:nvPr/>
+        </p:nvSpPr>
+        <p:spPr>
+          <a:xfrm>
+            <a:off x="4937760" y="2514600"/>
+            <a:ext cx="2011680" cy="731520"/>
+          </a:xfrm>
+          <a:prstGeom prst="rect">
+            <a:avLst/>
+          </a:prstGeom>
+          <a:noFill/>
+        </p:spPr>
+        <p:txBody>
+          <a:bodyPr wrap="none">
+            <a:spAutoFit/>
+          </a:bodyPr>
+          <a:lstStyle/>
+          <a:p>
+            <a:pPr algn="ctr">
+              <a:defRPr b="1" sz="3200">
+                <a:solidFill>
+                  <a:srgbClr val="D33682"/>
                 </a:solidFill>
               </a:defRPr>
             </a:pPr>
             <a:r>
-              <a:t>• 8 output classes</a:t>
+              <a:t>13,542</a:t>
+            </a:r>
+          </a:p>
+        </p:txBody>
+      </p:sp>
+      <p:sp>
+        <p:nvSpPr>
+          <p:cNvPr id="11" name="TextBox 10"/>
+          <p:cNvSpPr txBox="1"/>
+          <p:nvPr/>
+        </p:nvSpPr>
+        <p:spPr>
+          <a:xfrm>
+            <a:off x="4937760" y="3063240"/>
+            <a:ext cx="2011680" cy="457200"/>
+          </a:xfrm>
+          <a:prstGeom prst="rect">
+            <a:avLst/>
+          </a:prstGeom>
+          <a:noFill/>
+        </p:spPr>
+        <p:txBody>
+          <a:bodyPr wrap="none">
+            <a:spAutoFit/>
+          </a:bodyPr>
+          <a:lstStyle/>
+          <a:p>
+            <a:pPr algn="ctr">
+              <a:defRPr sz="1400">
+                <a:solidFill>
+                  <a:srgbClr val="586E75"/>
+                </a:solidFill>
+              </a:defRPr>
+            </a:pPr>
+            <a:r>
+              <a:t>Train Samples</a:t>
+            </a:r>
+          </a:p>
+        </p:txBody>
+      </p:sp>
+      <p:sp>
+        <p:nvSpPr>
+          <p:cNvPr id="12" name="Rounded Rectangle 11"/>
+          <p:cNvSpPr/>
+          <p:nvPr/>
+        </p:nvSpPr>
+        <p:spPr>
+          <a:xfrm>
+            <a:off x="7178040" y="2286000"/>
+            <a:ext cx="2011680" cy="1371600"/>
+          </a:xfrm>
+          <a:prstGeom prst="roundRect">
+            <a:avLst/>
+          </a:prstGeom>
+          <a:solidFill>
+            <a:srgbClr val="EEE8D5"/>
+          </a:solidFill>
+          <a:ln>
+            <a:solidFill>
+              <a:srgbClr val="93A1A1"/>
+            </a:solidFill>
+          </a:ln>
+        </p:spPr>
+        <p:style>
+          <a:lnRef idx="1">
+            <a:schemeClr val="accent1"/>
+          </a:lnRef>
+          <a:fillRef idx="3">
+            <a:schemeClr val="accent1"/>
+          </a:fillRef>
+          <a:effectRef idx="2">
+            <a:schemeClr val="accent1"/>
+          </a:effectRef>
+          <a:fontRef idx="minor">
+            <a:schemeClr val="lt1"/>
+          </a:fontRef>
+        </p:style>
+        <p:txBody>
+          <a:bodyPr rtlCol="0" anchor="ctr"/>
+          <a:lstStyle/>
+          <a:p>
+            <a:pPr algn="ctr"/>
+          </a:p>
+        </p:txBody>
+      </p:sp>
+      <p:sp>
+        <p:nvSpPr>
+          <p:cNvPr id="13" name="TextBox 12"/>
+          <p:cNvSpPr txBox="1"/>
+          <p:nvPr/>
+        </p:nvSpPr>
+        <p:spPr>
+          <a:xfrm>
+            <a:off x="7178040" y="2514600"/>
+            <a:ext cx="2011680" cy="731520"/>
+          </a:xfrm>
+          <a:prstGeom prst="rect">
+            <a:avLst/>
+          </a:prstGeom>
+          <a:noFill/>
+        </p:spPr>
+        <p:txBody>
+          <a:bodyPr wrap="none">
+            <a:spAutoFit/>
+          </a:bodyPr>
+          <a:lstStyle/>
+          <a:p>
+            <a:pPr algn="ctr">
+              <a:defRPr b="1" sz="3200">
+                <a:solidFill>
+                  <a:srgbClr val="D33682"/>
+                </a:solidFill>
+              </a:defRPr>
+            </a:pPr>
+            <a:r>
+              <a:t>1,756</a:t>
+            </a:r>
+          </a:p>
+        </p:txBody>
+      </p:sp>
+      <p:sp>
+        <p:nvSpPr>
+          <p:cNvPr id="14" name="TextBox 13"/>
+          <p:cNvSpPr txBox="1"/>
+          <p:nvPr/>
+        </p:nvSpPr>
+        <p:spPr>
+          <a:xfrm>
+            <a:off x="7178040" y="3063240"/>
+            <a:ext cx="2011680" cy="457200"/>
+          </a:xfrm>
+          <a:prstGeom prst="rect">
+            <a:avLst/>
+          </a:prstGeom>
+          <a:noFill/>
+        </p:spPr>
+        <p:txBody>
+          <a:bodyPr wrap="none">
+            <a:spAutoFit/>
+          </a:bodyPr>
+          <a:lstStyle/>
+          <a:p>
+            <a:pPr algn="ctr">
+              <a:defRPr sz="1400">
+                <a:solidFill>
+                  <a:srgbClr val="586E75"/>
+                </a:solidFill>
+              </a:defRPr>
+            </a:pPr>
+            <a:r>
+              <a:t>Test Samples</a:t>
             </a:r>
           </a:p>
         </p:txBody>
@@ -4266,510 +4731,106 @@
           <a:lstStyle/>
           <a:p>
             <a:pPr>
-              <a:defRPr>
+              <a:defRPr b="1">
                 <a:solidFill>
                   <a:srgbClr val="B58900"/>
                 </a:solidFill>
               </a:defRPr>
             </a:pPr>
             <a:r>
-              <a:t>Dataset Overview</a:t>
-            </a:r>
-          </a:p>
-        </p:txBody>
-      </p:sp>
-      <p:sp>
-        <p:nvSpPr>
-          <p:cNvPr id="3" name="Rounded Rectangle 2"/>
-          <p:cNvSpPr/>
-          <p:nvPr/>
-        </p:nvSpPr>
-        <p:spPr>
-          <a:xfrm>
-            <a:off x="457200" y="2286000"/>
-            <a:ext cx="2011680" cy="1371600"/>
-          </a:xfrm>
-          <a:prstGeom prst="roundRect">
-            <a:avLst/>
-          </a:prstGeom>
-          <a:solidFill>
-            <a:srgbClr val="EEE8D5"/>
-          </a:solidFill>
-          <a:ln>
-            <a:solidFill>
-              <a:srgbClr val="93A1A1"/>
-            </a:solidFill>
-          </a:ln>
-        </p:spPr>
-        <p:style>
-          <a:lnRef idx="1">
-            <a:schemeClr val="accent1"/>
-          </a:lnRef>
-          <a:fillRef idx="3">
-            <a:schemeClr val="accent1"/>
-          </a:fillRef>
-          <a:effectRef idx="2">
-            <a:schemeClr val="accent1"/>
-          </a:effectRef>
-          <a:fontRef idx="minor">
-            <a:schemeClr val="lt1"/>
-          </a:fontRef>
-        </p:style>
-        <p:txBody>
-          <a:bodyPr rtlCol="0" anchor="ctr"/>
-          <a:lstStyle/>
-          <a:p>
-            <a:pPr algn="ctr"/>
-          </a:p>
-        </p:txBody>
-      </p:sp>
-      <p:sp>
-        <p:nvSpPr>
-          <p:cNvPr id="4" name="TextBox 3"/>
-          <p:cNvSpPr txBox="1"/>
-          <p:nvPr/>
-        </p:nvSpPr>
-        <p:spPr>
-          <a:xfrm>
-            <a:off x="457200" y="2468880"/>
-            <a:ext cx="2011680" cy="731520"/>
-          </a:xfrm>
-          <a:prstGeom prst="rect">
-            <a:avLst/>
-          </a:prstGeom>
-          <a:noFill/>
-        </p:spPr>
-        <p:txBody>
-          <a:bodyPr wrap="none">
-            <a:spAutoFit/>
-          </a:bodyPr>
-          <a:lstStyle/>
-          <a:p>
-            <a:pPr algn="ctr">
-              <a:defRPr b="1" sz="3200">
-                <a:solidFill>
-                  <a:srgbClr val="D33682"/>
+              <a:t>Technical Implementation</a:t>
+            </a:r>
+          </a:p>
+        </p:txBody>
+      </p:sp>
+      <p:sp>
+        <p:nvSpPr>
+          <p:cNvPr id="3" name="Content Placeholder 2"/>
+          <p:cNvSpPr>
+            <a:spLocks noGrp="1"/>
+          </p:cNvSpPr>
+          <p:nvPr>
+            <p:ph idx="1"/>
+          </p:nvPr>
+        </p:nvSpPr>
+        <p:spPr/>
+        <p:txBody>
+          <a:bodyPr/>
+          <a:lstStyle/>
+          <a:p/>
+          <a:p>
+            <a:pPr>
+              <a:spcAft>
+                <a:spcPts val="2000"/>
+              </a:spcAft>
+              <a:defRPr sz="2400">
+                <a:solidFill>
+                  <a:srgbClr val="657B83"/>
                 </a:solidFill>
               </a:defRPr>
             </a:pPr>
             <a:r>
-              <a:t>17,171</a:t>
-            </a:r>
-          </a:p>
-        </p:txBody>
-      </p:sp>
-      <p:sp>
-        <p:nvSpPr>
-          <p:cNvPr id="5" name="TextBox 4"/>
-          <p:cNvSpPr txBox="1"/>
-          <p:nvPr/>
-        </p:nvSpPr>
-        <p:spPr>
-          <a:xfrm>
-            <a:off x="457200" y="3017520"/>
-            <a:ext cx="2011680" cy="457200"/>
-          </a:xfrm>
-          <a:prstGeom prst="rect">
-            <a:avLst/>
-          </a:prstGeom>
-          <a:noFill/>
-        </p:spPr>
-        <p:txBody>
-          <a:bodyPr wrap="none">
-            <a:spAutoFit/>
-          </a:bodyPr>
-          <a:lstStyle/>
-          <a:p>
-            <a:pPr algn="ctr">
-              <a:defRPr sz="1400">
-                <a:solidFill>
-                  <a:srgbClr val="586E75"/>
+              <a:t>Detector: YOLOv8-nano (COCO pretrained)</a:t>
+            </a:r>
+          </a:p>
+          <a:p>
+            <a:pPr>
+              <a:spcAft>
+                <a:spcPts val="2000"/>
+              </a:spcAft>
+              <a:defRPr sz="2400">
+                <a:solidFill>
+                  <a:srgbClr val="657B83"/>
                 </a:solidFill>
               </a:defRPr>
             </a:pPr>
             <a:r>
-              <a:t>Total Images</a:t>
-            </a:r>
-          </a:p>
-        </p:txBody>
-      </p:sp>
-      <p:sp>
-        <p:nvSpPr>
-          <p:cNvPr id="6" name="Rounded Rectangle 5"/>
-          <p:cNvSpPr/>
-          <p:nvPr/>
-        </p:nvSpPr>
-        <p:spPr>
-          <a:xfrm>
-            <a:off x="2697480" y="2286000"/>
-            <a:ext cx="2011680" cy="1371600"/>
-          </a:xfrm>
-          <a:prstGeom prst="roundRect">
-            <a:avLst/>
-          </a:prstGeom>
-          <a:solidFill>
-            <a:srgbClr val="EEE8D5"/>
-          </a:solidFill>
-          <a:ln>
-            <a:solidFill>
-              <a:srgbClr val="93A1A1"/>
-            </a:solidFill>
-          </a:ln>
-        </p:spPr>
-        <p:style>
-          <a:lnRef idx="1">
-            <a:schemeClr val="accent1"/>
-          </a:lnRef>
-          <a:fillRef idx="3">
-            <a:schemeClr val="accent1"/>
-          </a:fillRef>
-          <a:effectRef idx="2">
-            <a:schemeClr val="accent1"/>
-          </a:effectRef>
-          <a:fontRef idx="minor">
-            <a:schemeClr val="lt1"/>
-          </a:fontRef>
-        </p:style>
-        <p:txBody>
-          <a:bodyPr rtlCol="0" anchor="ctr"/>
-          <a:lstStyle/>
-          <a:p>
-            <a:pPr algn="ctr"/>
-          </a:p>
-        </p:txBody>
-      </p:sp>
-      <p:sp>
-        <p:nvSpPr>
-          <p:cNvPr id="7" name="TextBox 6"/>
-          <p:cNvSpPr txBox="1"/>
-          <p:nvPr/>
-        </p:nvSpPr>
-        <p:spPr>
-          <a:xfrm>
-            <a:off x="2697480" y="2468880"/>
-            <a:ext cx="2011680" cy="731520"/>
-          </a:xfrm>
-          <a:prstGeom prst="rect">
-            <a:avLst/>
-          </a:prstGeom>
-          <a:noFill/>
-        </p:spPr>
-        <p:txBody>
-          <a:bodyPr wrap="none">
-            <a:spAutoFit/>
-          </a:bodyPr>
-          <a:lstStyle/>
-          <a:p>
-            <a:pPr algn="ctr">
-              <a:defRPr b="1" sz="3200">
-                <a:solidFill>
-                  <a:srgbClr val="D33682"/>
+              <a:t>Classifier: ResNet50 (ImageNet pretrained)</a:t>
+            </a:r>
+          </a:p>
+          <a:p>
+            <a:pPr>
+              <a:spcAft>
+                <a:spcPts val="2000"/>
+              </a:spcAft>
+              <a:defRPr sz="2400">
+                <a:solidFill>
+                  <a:srgbClr val="657B83"/>
                 </a:solidFill>
               </a:defRPr>
             </a:pPr>
             <a:r>
-              <a:t>8</a:t>
-            </a:r>
-          </a:p>
-        </p:txBody>
-      </p:sp>
-      <p:sp>
-        <p:nvSpPr>
-          <p:cNvPr id="8" name="TextBox 7"/>
-          <p:cNvSpPr txBox="1"/>
-          <p:nvPr/>
-        </p:nvSpPr>
-        <p:spPr>
-          <a:xfrm>
-            <a:off x="2697480" y="3017520"/>
-            <a:ext cx="2011680" cy="457200"/>
-          </a:xfrm>
-          <a:prstGeom prst="rect">
-            <a:avLst/>
-          </a:prstGeom>
-          <a:noFill/>
-        </p:spPr>
-        <p:txBody>
-          <a:bodyPr wrap="none">
-            <a:spAutoFit/>
-          </a:bodyPr>
-          <a:lstStyle/>
-          <a:p>
-            <a:pPr algn="ctr">
-              <a:defRPr sz="1400">
-                <a:solidFill>
-                  <a:srgbClr val="586E75"/>
+              <a:t>Optimizer: AdamW (LR: 1e-4) + Cosine Annealing</a:t>
+            </a:r>
+          </a:p>
+          <a:p>
+            <a:pPr>
+              <a:spcAft>
+                <a:spcPts val="2000"/>
+              </a:spcAft>
+              <a:defRPr sz="2400">
+                <a:solidFill>
+                  <a:srgbClr val="657B83"/>
                 </a:solidFill>
               </a:defRPr>
             </a:pPr>
             <a:r>
-              <a:t>Car Types</a:t>
-            </a:r>
-          </a:p>
-        </p:txBody>
-      </p:sp>
-      <p:sp>
-        <p:nvSpPr>
-          <p:cNvPr id="9" name="Rounded Rectangle 8"/>
-          <p:cNvSpPr/>
-          <p:nvPr/>
-        </p:nvSpPr>
-        <p:spPr>
-          <a:xfrm>
-            <a:off x="4937760" y="2286000"/>
-            <a:ext cx="2011680" cy="1371600"/>
-          </a:xfrm>
-          <a:prstGeom prst="roundRect">
-            <a:avLst/>
-          </a:prstGeom>
-          <a:solidFill>
-            <a:srgbClr val="EEE8D5"/>
-          </a:solidFill>
-          <a:ln>
-            <a:solidFill>
-              <a:srgbClr val="93A1A1"/>
-            </a:solidFill>
-          </a:ln>
-        </p:spPr>
-        <p:style>
-          <a:lnRef idx="1">
-            <a:schemeClr val="accent1"/>
-          </a:lnRef>
-          <a:fillRef idx="3">
-            <a:schemeClr val="accent1"/>
-          </a:fillRef>
-          <a:effectRef idx="2">
-            <a:schemeClr val="accent1"/>
-          </a:effectRef>
-          <a:fontRef idx="minor">
-            <a:schemeClr val="lt1"/>
-          </a:fontRef>
-        </p:style>
-        <p:txBody>
-          <a:bodyPr rtlCol="0" anchor="ctr"/>
-          <a:lstStyle/>
-          <a:p>
-            <a:pPr algn="ctr"/>
-          </a:p>
-        </p:txBody>
-      </p:sp>
-      <p:sp>
-        <p:nvSpPr>
-          <p:cNvPr id="10" name="TextBox 9"/>
-          <p:cNvSpPr txBox="1"/>
-          <p:nvPr/>
-        </p:nvSpPr>
-        <p:spPr>
-          <a:xfrm>
-            <a:off x="4937760" y="2468880"/>
-            <a:ext cx="2011680" cy="731520"/>
-          </a:xfrm>
-          <a:prstGeom prst="rect">
-            <a:avLst/>
-          </a:prstGeom>
-          <a:noFill/>
-        </p:spPr>
-        <p:txBody>
-          <a:bodyPr wrap="none">
-            <a:spAutoFit/>
-          </a:bodyPr>
-          <a:lstStyle/>
-          <a:p>
-            <a:pPr algn="ctr">
-              <a:defRPr b="1" sz="3200">
-                <a:solidFill>
-                  <a:srgbClr val="D33682"/>
+              <a:t>Augmentation: RandomCrop, ColorJitter, Rotation</a:t>
+            </a:r>
+          </a:p>
+          <a:p>
+            <a:pPr>
+              <a:spcAft>
+                <a:spcPts val="2000"/>
+              </a:spcAft>
+              <a:defRPr sz="2400">
+                <a:solidFill>
+                  <a:srgbClr val="657B83"/>
                 </a:solidFill>
               </a:defRPr>
             </a:pPr>
             <a:r>
-              <a:t>13,542</a:t>
-            </a:r>
-          </a:p>
-        </p:txBody>
-      </p:sp>
-      <p:sp>
-        <p:nvSpPr>
-          <p:cNvPr id="11" name="TextBox 10"/>
-          <p:cNvSpPr txBox="1"/>
-          <p:nvPr/>
-        </p:nvSpPr>
-        <p:spPr>
-          <a:xfrm>
-            <a:off x="4937760" y="3017520"/>
-            <a:ext cx="2011680" cy="457200"/>
-          </a:xfrm>
-          <a:prstGeom prst="rect">
-            <a:avLst/>
-          </a:prstGeom>
-          <a:noFill/>
-        </p:spPr>
-        <p:txBody>
-          <a:bodyPr wrap="none">
-            <a:spAutoFit/>
-          </a:bodyPr>
-          <a:lstStyle/>
-          <a:p>
-            <a:pPr algn="ctr">
-              <a:defRPr sz="1400">
-                <a:solidFill>
-                  <a:srgbClr val="586E75"/>
-                </a:solidFill>
-              </a:defRPr>
-            </a:pPr>
-            <a:r>
-              <a:t>Train Samples</a:t>
-            </a:r>
-          </a:p>
-        </p:txBody>
-      </p:sp>
-      <p:sp>
-        <p:nvSpPr>
-          <p:cNvPr id="12" name="Rounded Rectangle 11"/>
-          <p:cNvSpPr/>
-          <p:nvPr/>
-        </p:nvSpPr>
-        <p:spPr>
-          <a:xfrm>
-            <a:off x="7178040" y="2286000"/>
-            <a:ext cx="2011680" cy="1371600"/>
-          </a:xfrm>
-          <a:prstGeom prst="roundRect">
-            <a:avLst/>
-          </a:prstGeom>
-          <a:solidFill>
-            <a:srgbClr val="EEE8D5"/>
-          </a:solidFill>
-          <a:ln>
-            <a:solidFill>
-              <a:srgbClr val="93A1A1"/>
-            </a:solidFill>
-          </a:ln>
-        </p:spPr>
-        <p:style>
-          <a:lnRef idx="1">
-            <a:schemeClr val="accent1"/>
-          </a:lnRef>
-          <a:fillRef idx="3">
-            <a:schemeClr val="accent1"/>
-          </a:fillRef>
-          <a:effectRef idx="2">
-            <a:schemeClr val="accent1"/>
-          </a:effectRef>
-          <a:fontRef idx="minor">
-            <a:schemeClr val="lt1"/>
-          </a:fontRef>
-        </p:style>
-        <p:txBody>
-          <a:bodyPr rtlCol="0" anchor="ctr"/>
-          <a:lstStyle/>
-          <a:p>
-            <a:pPr algn="ctr"/>
-          </a:p>
-        </p:txBody>
-      </p:sp>
-      <p:sp>
-        <p:nvSpPr>
-          <p:cNvPr id="13" name="TextBox 12"/>
-          <p:cNvSpPr txBox="1"/>
-          <p:nvPr/>
-        </p:nvSpPr>
-        <p:spPr>
-          <a:xfrm>
-            <a:off x="7178040" y="2468880"/>
-            <a:ext cx="2011680" cy="731520"/>
-          </a:xfrm>
-          <a:prstGeom prst="rect">
-            <a:avLst/>
-          </a:prstGeom>
-          <a:noFill/>
-        </p:spPr>
-        <p:txBody>
-          <a:bodyPr wrap="none">
-            <a:spAutoFit/>
-          </a:bodyPr>
-          <a:lstStyle/>
-          <a:p>
-            <a:pPr algn="ctr">
-              <a:defRPr b="1" sz="3200">
-                <a:solidFill>
-                  <a:srgbClr val="D33682"/>
-                </a:solidFill>
-              </a:defRPr>
-            </a:pPr>
-            <a:r>
-              <a:t>1,756</a:t>
-            </a:r>
-          </a:p>
-        </p:txBody>
-      </p:sp>
-      <p:sp>
-        <p:nvSpPr>
-          <p:cNvPr id="14" name="TextBox 13"/>
-          <p:cNvSpPr txBox="1"/>
-          <p:nvPr/>
-        </p:nvSpPr>
-        <p:spPr>
-          <a:xfrm>
-            <a:off x="7178040" y="3017520"/>
-            <a:ext cx="2011680" cy="457200"/>
-          </a:xfrm>
-          <a:prstGeom prst="rect">
-            <a:avLst/>
-          </a:prstGeom>
-          <a:noFill/>
-        </p:spPr>
-        <p:txBody>
-          <a:bodyPr wrap="none">
-            <a:spAutoFit/>
-          </a:bodyPr>
-          <a:lstStyle/>
-          <a:p>
-            <a:pPr algn="ctr">
-              <a:defRPr sz="1400">
-                <a:solidFill>
-                  <a:srgbClr val="586E75"/>
-                </a:solidFill>
-              </a:defRPr>
-            </a:pPr>
-            <a:r>
-              <a:t>Test Samples</a:t>
-            </a:r>
-          </a:p>
-        </p:txBody>
-      </p:sp>
-      <p:sp>
-        <p:nvSpPr>
-          <p:cNvPr id="15" name="TextBox 14"/>
-          <p:cNvSpPr txBox="1"/>
-          <p:nvPr/>
-        </p:nvSpPr>
-        <p:spPr>
-          <a:xfrm>
-            <a:off x="457200" y="4572000"/>
-            <a:ext cx="8229600" cy="914400"/>
-          </a:xfrm>
-          <a:prstGeom prst="rect">
-            <a:avLst/>
-          </a:prstGeom>
-          <a:noFill/>
-        </p:spPr>
-        <p:txBody>
-          <a:bodyPr wrap="none">
-            <a:spAutoFit/>
-          </a:bodyPr>
-          <a:lstStyle/>
-          <a:p/>
-          <a:p>
-            <a:pPr algn="ctr">
-              <a:defRPr sz="2400">
-                <a:solidFill>
-                  <a:srgbClr val="586E75"/>
-                </a:solidFill>
-              </a:defRPr>
-            </a:pPr>
-            <a:r>
-              <a:t>Crossover • Hatchback • MPV • Offroad • Pickup • Sedan • Truck • Van</a:t>
+              <a:t>Loss: CrossEntropy with Label Smoothing (0.1)</a:t>
             </a:r>
           </a:p>
         </p:txBody>
@@ -4816,33 +4877,61 @@
           <a:lstStyle/>
           <a:p>
             <a:pPr>
-              <a:defRPr>
+              <a:defRPr b="1">
                 <a:solidFill>
                   <a:srgbClr val="B58900"/>
                 </a:solidFill>
               </a:defRPr>
             </a:pPr>
             <a:r>
-              <a:t>Classifier Architecture</a:t>
-            </a:r>
-          </a:p>
-        </p:txBody>
-      </p:sp>
-      <p:sp>
-        <p:nvSpPr>
-          <p:cNvPr id="3" name="Content Placeholder 2"/>
-          <p:cNvSpPr>
-            <a:spLocks noGrp="1"/>
-          </p:cNvSpPr>
-          <p:nvPr>
-            <p:ph idx="1"/>
-          </p:nvPr>
-        </p:nvSpPr>
-        <p:spPr/>
-        <p:txBody>
-          <a:bodyPr/>
-          <a:lstStyle/>
-          <a:p/>
+              <a:t>Performance Summary</a:t>
+            </a:r>
+          </a:p>
+        </p:txBody>
+      </p:sp>
+      <p:sp>
+        <p:nvSpPr>
+          <p:cNvPr id="3" name="Rounded Rectangle 2"/>
+          <p:cNvSpPr/>
+          <p:nvPr/>
+        </p:nvSpPr>
+        <p:spPr>
+          <a:xfrm>
+            <a:off x="457200" y="2286000"/>
+            <a:ext cx="2011680" cy="1371600"/>
+          </a:xfrm>
+          <a:prstGeom prst="roundRect">
+            <a:avLst/>
+          </a:prstGeom>
+          <a:solidFill>
+            <a:srgbClr val="EEE8D5"/>
+          </a:solidFill>
+          <a:ln>
+            <a:solidFill>
+              <a:srgbClr val="93A1A1"/>
+            </a:solidFill>
+          </a:ln>
+        </p:spPr>
+        <p:style>
+          <a:lnRef idx="1">
+            <a:schemeClr val="accent1"/>
+          </a:lnRef>
+          <a:fillRef idx="3">
+            <a:schemeClr val="accent1"/>
+          </a:fillRef>
+          <a:effectRef idx="2">
+            <a:schemeClr val="accent1"/>
+          </a:effectRef>
+          <a:fontRef idx="minor">
+            <a:schemeClr val="lt1"/>
+          </a:fontRef>
+        </p:style>
+        <p:txBody>
+          <a:bodyPr rtlCol="0" anchor="ctr"/>
+          <a:lstStyle/>
+          <a:p>
+            <a:pPr algn="ctr"/>
+          </a:p>
         </p:txBody>
       </p:sp>
       <p:sp>
@@ -4853,8 +4942,8 @@
         </p:nvSpPr>
         <p:spPr>
           <a:xfrm>
-            <a:off x="457200" y="1828800"/>
-            <a:ext cx="4114800" cy="4572000"/>
+            <a:off x="457200" y="2514600"/>
+            <a:ext cx="2011680" cy="731520"/>
           </a:xfrm>
           <a:prstGeom prst="rect">
             <a:avLst/>
@@ -4866,68 +4955,16 @@
             <a:spAutoFit/>
           </a:bodyPr>
           <a:lstStyle/>
-          <a:p/>
-          <a:p>
-            <a:pPr>
-              <a:spcAft>
-                <a:spcPts val="2000"/>
-              </a:spcAft>
-              <a:defRPr b="1" sz="2800">
-                <a:solidFill>
-                  <a:srgbClr val="268BD2"/>
+          <a:p>
+            <a:pPr algn="ctr">
+              <a:defRPr b="1" sz="3200">
+                <a:solidFill>
+                  <a:srgbClr val="D33682"/>
                 </a:solidFill>
               </a:defRPr>
             </a:pPr>
             <a:r>
-              <a:t>ResNet50 Backbone</a:t>
-            </a:r>
-          </a:p>
-          <a:p>
-            <a:pPr>
-              <a:defRPr sz="2000">
-                <a:solidFill>
-                  <a:srgbClr val="657B83"/>
-                </a:solidFill>
-              </a:defRPr>
-            </a:pPr>
-            <a:r>
-              <a:t>• Pre-trained on ImageNet</a:t>
-            </a:r>
-          </a:p>
-          <a:p>
-            <a:pPr>
-              <a:defRPr sz="2000">
-                <a:solidFill>
-                  <a:srgbClr val="657B83"/>
-                </a:solidFill>
-              </a:defRPr>
-            </a:pPr>
-            <a:r>
-              <a:t>• 50 convolutional layers</a:t>
-            </a:r>
-          </a:p>
-          <a:p>
-            <a:pPr>
-              <a:defRPr sz="2000">
-                <a:solidFill>
-                  <a:srgbClr val="657B83"/>
-                </a:solidFill>
-              </a:defRPr>
-            </a:pPr>
-            <a:r>
-              <a:t>• Skip connections</a:t>
-            </a:r>
-          </a:p>
-          <a:p>
-            <a:pPr>
-              <a:defRPr sz="2000">
-                <a:solidFill>
-                  <a:srgbClr val="657B83"/>
-                </a:solidFill>
-              </a:defRPr>
-            </a:pPr>
-            <a:r>
-              <a:t>• 24.5M parameters</a:t>
+              <a:t>86.33%</a:t>
             </a:r>
           </a:p>
         </p:txBody>
@@ -4940,8 +4977,8 @@
         </p:nvSpPr>
         <p:spPr>
           <a:xfrm>
-            <a:off x="5029200" y="1828800"/>
-            <a:ext cx="4114800" cy="4572000"/>
+            <a:off x="457200" y="3063240"/>
+            <a:ext cx="2011680" cy="457200"/>
           </a:xfrm>
           <a:prstGeom prst="rect">
             <a:avLst/>
@@ -4953,68 +4990,361 @@
             <a:spAutoFit/>
           </a:bodyPr>
           <a:lstStyle/>
-          <a:p/>
-          <a:p>
-            <a:pPr>
-              <a:spcAft>
-                <a:spcPts val="2000"/>
-              </a:spcAft>
-              <a:defRPr b="1" sz="2800">
-                <a:solidFill>
-                  <a:srgbClr val="268BD2"/>
+          <a:p>
+            <a:pPr algn="ctr">
+              <a:defRPr sz="1400">
+                <a:solidFill>
+                  <a:srgbClr val="586E75"/>
                 </a:solidFill>
               </a:defRPr>
             </a:pPr>
             <a:r>
-              <a:t>Custom Head</a:t>
-            </a:r>
-          </a:p>
-          <a:p>
-            <a:pPr>
-              <a:defRPr sz="2000">
-                <a:solidFill>
-                  <a:srgbClr val="657B83"/>
+              <a:t>Test Accuracy</a:t>
+            </a:r>
+          </a:p>
+        </p:txBody>
+      </p:sp>
+      <p:sp>
+        <p:nvSpPr>
+          <p:cNvPr id="6" name="Rounded Rectangle 5"/>
+          <p:cNvSpPr/>
+          <p:nvPr/>
+        </p:nvSpPr>
+        <p:spPr>
+          <a:xfrm>
+            <a:off x="2697480" y="2286000"/>
+            <a:ext cx="2011680" cy="1371600"/>
+          </a:xfrm>
+          <a:prstGeom prst="roundRect">
+            <a:avLst/>
+          </a:prstGeom>
+          <a:solidFill>
+            <a:srgbClr val="EEE8D5"/>
+          </a:solidFill>
+          <a:ln>
+            <a:solidFill>
+              <a:srgbClr val="93A1A1"/>
+            </a:solidFill>
+          </a:ln>
+        </p:spPr>
+        <p:style>
+          <a:lnRef idx="1">
+            <a:schemeClr val="accent1"/>
+          </a:lnRef>
+          <a:fillRef idx="3">
+            <a:schemeClr val="accent1"/>
+          </a:fillRef>
+          <a:effectRef idx="2">
+            <a:schemeClr val="accent1"/>
+          </a:effectRef>
+          <a:fontRef idx="minor">
+            <a:schemeClr val="lt1"/>
+          </a:fontRef>
+        </p:style>
+        <p:txBody>
+          <a:bodyPr rtlCol="0" anchor="ctr"/>
+          <a:lstStyle/>
+          <a:p>
+            <a:pPr algn="ctr"/>
+          </a:p>
+        </p:txBody>
+      </p:sp>
+      <p:sp>
+        <p:nvSpPr>
+          <p:cNvPr id="7" name="TextBox 6"/>
+          <p:cNvSpPr txBox="1"/>
+          <p:nvPr/>
+        </p:nvSpPr>
+        <p:spPr>
+          <a:xfrm>
+            <a:off x="2697480" y="2514600"/>
+            <a:ext cx="2011680" cy="731520"/>
+          </a:xfrm>
+          <a:prstGeom prst="rect">
+            <a:avLst/>
+          </a:prstGeom>
+          <a:noFill/>
+        </p:spPr>
+        <p:txBody>
+          <a:bodyPr wrap="none">
+            <a:spAutoFit/>
+          </a:bodyPr>
+          <a:lstStyle/>
+          <a:p>
+            <a:pPr algn="ctr">
+              <a:defRPr b="1" sz="3200">
+                <a:solidFill>
+                  <a:srgbClr val="D33682"/>
                 </a:solidFill>
               </a:defRPr>
             </a:pPr>
             <a:r>
-              <a:t>• Global Average Pooling</a:t>
-            </a:r>
-          </a:p>
-          <a:p>
-            <a:pPr>
-              <a:defRPr sz="2000">
-                <a:solidFill>
-                  <a:srgbClr val="657B83"/>
+              <a:t>86.53%</a:t>
+            </a:r>
+          </a:p>
+        </p:txBody>
+      </p:sp>
+      <p:sp>
+        <p:nvSpPr>
+          <p:cNvPr id="8" name="TextBox 7"/>
+          <p:cNvSpPr txBox="1"/>
+          <p:nvPr/>
+        </p:nvSpPr>
+        <p:spPr>
+          <a:xfrm>
+            <a:off x="2697480" y="3063240"/>
+            <a:ext cx="2011680" cy="457200"/>
+          </a:xfrm>
+          <a:prstGeom prst="rect">
+            <a:avLst/>
+          </a:prstGeom>
+          <a:noFill/>
+        </p:spPr>
+        <p:txBody>
+          <a:bodyPr wrap="none">
+            <a:spAutoFit/>
+          </a:bodyPr>
+          <a:lstStyle/>
+          <a:p>
+            <a:pPr algn="ctr">
+              <a:defRPr sz="1400">
+                <a:solidFill>
+                  <a:srgbClr val="586E75"/>
                 </a:solidFill>
               </a:defRPr>
             </a:pPr>
             <a:r>
-              <a:t>• Dropout (p=0.5)</a:t>
-            </a:r>
-          </a:p>
-          <a:p>
-            <a:pPr>
-              <a:defRPr sz="2000">
-                <a:solidFill>
-                  <a:srgbClr val="657B83"/>
+              <a:t>Precision</a:t>
+            </a:r>
+          </a:p>
+        </p:txBody>
+      </p:sp>
+      <p:sp>
+        <p:nvSpPr>
+          <p:cNvPr id="9" name="Rounded Rectangle 8"/>
+          <p:cNvSpPr/>
+          <p:nvPr/>
+        </p:nvSpPr>
+        <p:spPr>
+          <a:xfrm>
+            <a:off x="4937760" y="2286000"/>
+            <a:ext cx="2011680" cy="1371600"/>
+          </a:xfrm>
+          <a:prstGeom prst="roundRect">
+            <a:avLst/>
+          </a:prstGeom>
+          <a:solidFill>
+            <a:srgbClr val="EEE8D5"/>
+          </a:solidFill>
+          <a:ln>
+            <a:solidFill>
+              <a:srgbClr val="93A1A1"/>
+            </a:solidFill>
+          </a:ln>
+        </p:spPr>
+        <p:style>
+          <a:lnRef idx="1">
+            <a:schemeClr val="accent1"/>
+          </a:lnRef>
+          <a:fillRef idx="3">
+            <a:schemeClr val="accent1"/>
+          </a:fillRef>
+          <a:effectRef idx="2">
+            <a:schemeClr val="accent1"/>
+          </a:effectRef>
+          <a:fontRef idx="minor">
+            <a:schemeClr val="lt1"/>
+          </a:fontRef>
+        </p:style>
+        <p:txBody>
+          <a:bodyPr rtlCol="0" anchor="ctr"/>
+          <a:lstStyle/>
+          <a:p>
+            <a:pPr algn="ctr"/>
+          </a:p>
+        </p:txBody>
+      </p:sp>
+      <p:sp>
+        <p:nvSpPr>
+          <p:cNvPr id="10" name="TextBox 9"/>
+          <p:cNvSpPr txBox="1"/>
+          <p:nvPr/>
+        </p:nvSpPr>
+        <p:spPr>
+          <a:xfrm>
+            <a:off x="4937760" y="2514600"/>
+            <a:ext cx="2011680" cy="731520"/>
+          </a:xfrm>
+          <a:prstGeom prst="rect">
+            <a:avLst/>
+          </a:prstGeom>
+          <a:noFill/>
+        </p:spPr>
+        <p:txBody>
+          <a:bodyPr wrap="none">
+            <a:spAutoFit/>
+          </a:bodyPr>
+          <a:lstStyle/>
+          <a:p>
+            <a:pPr algn="ctr">
+              <a:defRPr b="1" sz="3200">
+                <a:solidFill>
+                  <a:srgbClr val="D33682"/>
                 </a:solidFill>
               </a:defRPr>
             </a:pPr>
             <a:r>
-              <a:t>• FC: 2048 → 512 → 8</a:t>
-            </a:r>
-          </a:p>
-          <a:p>
-            <a:pPr>
-              <a:defRPr sz="2000">
-                <a:solidFill>
-                  <a:srgbClr val="657B83"/>
+              <a:t>86.34%</a:t>
+            </a:r>
+          </a:p>
+        </p:txBody>
+      </p:sp>
+      <p:sp>
+        <p:nvSpPr>
+          <p:cNvPr id="11" name="TextBox 10"/>
+          <p:cNvSpPr txBox="1"/>
+          <p:nvPr/>
+        </p:nvSpPr>
+        <p:spPr>
+          <a:xfrm>
+            <a:off x="4937760" y="3063240"/>
+            <a:ext cx="2011680" cy="457200"/>
+          </a:xfrm>
+          <a:prstGeom prst="rect">
+            <a:avLst/>
+          </a:prstGeom>
+          <a:noFill/>
+        </p:spPr>
+        <p:txBody>
+          <a:bodyPr wrap="none">
+            <a:spAutoFit/>
+          </a:bodyPr>
+          <a:lstStyle/>
+          <a:p>
+            <a:pPr algn="ctr">
+              <a:defRPr sz="1400">
+                <a:solidFill>
+                  <a:srgbClr val="586E75"/>
                 </a:solidFill>
               </a:defRPr>
             </a:pPr>
             <a:r>
-              <a:t>• Softmax output</a:t>
+              <a:t>F1-Score</a:t>
+            </a:r>
+          </a:p>
+        </p:txBody>
+      </p:sp>
+      <p:sp>
+        <p:nvSpPr>
+          <p:cNvPr id="12" name="Rounded Rectangle 11"/>
+          <p:cNvSpPr/>
+          <p:nvPr/>
+        </p:nvSpPr>
+        <p:spPr>
+          <a:xfrm>
+            <a:off x="7178040" y="2286000"/>
+            <a:ext cx="2011680" cy="1371600"/>
+          </a:xfrm>
+          <a:prstGeom prst="roundRect">
+            <a:avLst/>
+          </a:prstGeom>
+          <a:solidFill>
+            <a:srgbClr val="EEE8D5"/>
+          </a:solidFill>
+          <a:ln>
+            <a:solidFill>
+              <a:srgbClr val="93A1A1"/>
+            </a:solidFill>
+          </a:ln>
+        </p:spPr>
+        <p:style>
+          <a:lnRef idx="1">
+            <a:schemeClr val="accent1"/>
+          </a:lnRef>
+          <a:fillRef idx="3">
+            <a:schemeClr val="accent1"/>
+          </a:fillRef>
+          <a:effectRef idx="2">
+            <a:schemeClr val="accent1"/>
+          </a:effectRef>
+          <a:fontRef idx="minor">
+            <a:schemeClr val="lt1"/>
+          </a:fontRef>
+        </p:style>
+        <p:txBody>
+          <a:bodyPr rtlCol="0" anchor="ctr"/>
+          <a:lstStyle/>
+          <a:p>
+            <a:pPr algn="ctr"/>
+          </a:p>
+        </p:txBody>
+      </p:sp>
+      <p:sp>
+        <p:nvSpPr>
+          <p:cNvPr id="13" name="TextBox 12"/>
+          <p:cNvSpPr txBox="1"/>
+          <p:nvPr/>
+        </p:nvSpPr>
+        <p:spPr>
+          <a:xfrm>
+            <a:off x="7178040" y="2514600"/>
+            <a:ext cx="2011680" cy="731520"/>
+          </a:xfrm>
+          <a:prstGeom prst="rect">
+            <a:avLst/>
+          </a:prstGeom>
+          <a:noFill/>
+        </p:spPr>
+        <p:txBody>
+          <a:bodyPr wrap="none">
+            <a:spAutoFit/>
+          </a:bodyPr>
+          <a:lstStyle/>
+          <a:p>
+            <a:pPr algn="ctr">
+              <a:defRPr b="1" sz="3200">
+                <a:solidFill>
+                  <a:srgbClr val="D33682"/>
+                </a:solidFill>
+              </a:defRPr>
+            </a:pPr>
+            <a:r>
+              <a:t>13.6</a:t>
+            </a:r>
+          </a:p>
+        </p:txBody>
+      </p:sp>
+      <p:sp>
+        <p:nvSpPr>
+          <p:cNvPr id="14" name="TextBox 13"/>
+          <p:cNvSpPr txBox="1"/>
+          <p:nvPr/>
+        </p:nvSpPr>
+        <p:spPr>
+          <a:xfrm>
+            <a:off x="7178040" y="3063240"/>
+            <a:ext cx="2011680" cy="457200"/>
+          </a:xfrm>
+          <a:prstGeom prst="rect">
+            <a:avLst/>
+          </a:prstGeom>
+          <a:noFill/>
+        </p:spPr>
+        <p:txBody>
+          <a:bodyPr wrap="none">
+            <a:spAutoFit/>
+          </a:bodyPr>
+          <a:lstStyle/>
+          <a:p>
+            <a:pPr algn="ctr">
+              <a:defRPr sz="1400">
+                <a:solidFill>
+                  <a:srgbClr val="586E75"/>
+                </a:solidFill>
+              </a:defRPr>
+            </a:pPr>
+            <a:r>
+              <a:t>Video FPS</a:t>
             </a:r>
           </a:p>
         </p:txBody>
@@ -5068,56 +5398,35 @@
               </a:defRPr>
             </a:pPr>
             <a:r>
-              <a:t>Results Overview</a:t>
-            </a:r>
-          </a:p>
-        </p:txBody>
-      </p:sp>
-      <p:sp>
-        <p:nvSpPr>
-          <p:cNvPr id="3" name="Rounded Rectangle 2"/>
-          <p:cNvSpPr/>
+              <a:t>Confusion Matrix Analysis</a:t>
+            </a:r>
+          </a:p>
+        </p:txBody>
+      </p:sp>
+      <p:pic>
+        <p:nvPicPr>
+          <p:cNvPr id="3" name="Picture 2" descr="confusion_matrix.png"/>
+          <p:cNvPicPr>
+            <a:picLocks noChangeAspect="1"/>
+          </p:cNvPicPr>
           <p:nvPr/>
-        </p:nvSpPr>
-        <p:spPr>
-          <a:xfrm>
-            <a:off x="457200" y="2286000"/>
-            <a:ext cx="2011680" cy="1371600"/>
-          </a:xfrm>
-          <a:prstGeom prst="roundRect">
+        </p:nvPicPr>
+        <p:blipFill>
+          <a:blip r:embed="rId2"/>
+          <a:stretch>
+            <a:fillRect/>
+          </a:stretch>
+        </p:blipFill>
+        <p:spPr>
+          <a:xfrm>
+            <a:off x="-820209" y="1828800"/>
+            <a:ext cx="10784419" cy="4114800"/>
+          </a:xfrm>
+          <a:prstGeom prst="rect">
             <a:avLst/>
           </a:prstGeom>
-          <a:solidFill>
-            <a:srgbClr val="EEE8D5"/>
-          </a:solidFill>
-          <a:ln>
-            <a:solidFill>
-              <a:srgbClr val="93A1A1"/>
-            </a:solidFill>
-          </a:ln>
-        </p:spPr>
-        <p:style>
-          <a:lnRef idx="1">
-            <a:schemeClr val="accent1"/>
-          </a:lnRef>
-          <a:fillRef idx="3">
-            <a:schemeClr val="accent1"/>
-          </a:fillRef>
-          <a:effectRef idx="2">
-            <a:schemeClr val="accent1"/>
-          </a:effectRef>
-          <a:fontRef idx="minor">
-            <a:schemeClr val="lt1"/>
-          </a:fontRef>
-        </p:style>
-        <p:txBody>
-          <a:bodyPr rtlCol="0" anchor="ctr"/>
-          <a:lstStyle/>
-          <a:p>
-            <a:pPr algn="ctr"/>
-          </a:p>
-        </p:txBody>
-      </p:sp>
+        </p:spPr>
+      </p:pic>
       <p:sp>
         <p:nvSpPr>
           <p:cNvPr id="4" name="TextBox 3"/>
@@ -5126,8 +5435,8 @@
         </p:nvSpPr>
         <p:spPr>
           <a:xfrm>
-            <a:off x="457200" y="2468880"/>
-            <a:ext cx="2011680" cy="731520"/>
+            <a:off x="914400" y="6035040"/>
+            <a:ext cx="7315200" cy="914400"/>
           </a:xfrm>
           <a:prstGeom prst="rect">
             <a:avLst/>
@@ -5139,396 +5448,17 @@
             <a:spAutoFit/>
           </a:bodyPr>
           <a:lstStyle/>
+          <a:p/>
           <a:p>
             <a:pPr algn="ctr">
-              <a:defRPr b="1" sz="3200">
-                <a:solidFill>
-                  <a:srgbClr val="D33682"/>
+              <a:defRPr sz="1600">
+                <a:solidFill>
+                  <a:srgbClr val="586E75"/>
                 </a:solidFill>
               </a:defRPr>
             </a:pPr>
             <a:r>
-              <a:t>86.33%</a:t>
-            </a:r>
-          </a:p>
-        </p:txBody>
-      </p:sp>
-      <p:sp>
-        <p:nvSpPr>
-          <p:cNvPr id="5" name="TextBox 4"/>
-          <p:cNvSpPr txBox="1"/>
-          <p:nvPr/>
-        </p:nvSpPr>
-        <p:spPr>
-          <a:xfrm>
-            <a:off x="457200" y="3017520"/>
-            <a:ext cx="2011680" cy="457200"/>
-          </a:xfrm>
-          <a:prstGeom prst="rect">
-            <a:avLst/>
-          </a:prstGeom>
-          <a:noFill/>
-        </p:spPr>
-        <p:txBody>
-          <a:bodyPr wrap="none">
-            <a:spAutoFit/>
-          </a:bodyPr>
-          <a:lstStyle/>
-          <a:p>
-            <a:pPr algn="ctr">
-              <a:defRPr sz="1400">
-                <a:solidFill>
-                  <a:srgbClr val="586E75"/>
-                </a:solidFill>
-              </a:defRPr>
-            </a:pPr>
-            <a:r>
-              <a:t>Test Accuracy</a:t>
-            </a:r>
-          </a:p>
-        </p:txBody>
-      </p:sp>
-      <p:sp>
-        <p:nvSpPr>
-          <p:cNvPr id="6" name="Rounded Rectangle 5"/>
-          <p:cNvSpPr/>
-          <p:nvPr/>
-        </p:nvSpPr>
-        <p:spPr>
-          <a:xfrm>
-            <a:off x="2697480" y="2286000"/>
-            <a:ext cx="2011680" cy="1371600"/>
-          </a:xfrm>
-          <a:prstGeom prst="roundRect">
-            <a:avLst/>
-          </a:prstGeom>
-          <a:solidFill>
-            <a:srgbClr val="EEE8D5"/>
-          </a:solidFill>
-          <a:ln>
-            <a:solidFill>
-              <a:srgbClr val="93A1A1"/>
-            </a:solidFill>
-          </a:ln>
-        </p:spPr>
-        <p:style>
-          <a:lnRef idx="1">
-            <a:schemeClr val="accent1"/>
-          </a:lnRef>
-          <a:fillRef idx="3">
-            <a:schemeClr val="accent1"/>
-          </a:fillRef>
-          <a:effectRef idx="2">
-            <a:schemeClr val="accent1"/>
-          </a:effectRef>
-          <a:fontRef idx="minor">
-            <a:schemeClr val="lt1"/>
-          </a:fontRef>
-        </p:style>
-        <p:txBody>
-          <a:bodyPr rtlCol="0" anchor="ctr"/>
-          <a:lstStyle/>
-          <a:p>
-            <a:pPr algn="ctr"/>
-          </a:p>
-        </p:txBody>
-      </p:sp>
-      <p:sp>
-        <p:nvSpPr>
-          <p:cNvPr id="7" name="TextBox 6"/>
-          <p:cNvSpPr txBox="1"/>
-          <p:nvPr/>
-        </p:nvSpPr>
-        <p:spPr>
-          <a:xfrm>
-            <a:off x="2697480" y="2468880"/>
-            <a:ext cx="2011680" cy="731520"/>
-          </a:xfrm>
-          <a:prstGeom prst="rect">
-            <a:avLst/>
-          </a:prstGeom>
-          <a:noFill/>
-        </p:spPr>
-        <p:txBody>
-          <a:bodyPr wrap="none">
-            <a:spAutoFit/>
-          </a:bodyPr>
-          <a:lstStyle/>
-          <a:p>
-            <a:pPr algn="ctr">
-              <a:defRPr b="1" sz="3200">
-                <a:solidFill>
-                  <a:srgbClr val="D33682"/>
-                </a:solidFill>
-              </a:defRPr>
-            </a:pPr>
-            <a:r>
-              <a:t>86.53%</a:t>
-            </a:r>
-          </a:p>
-        </p:txBody>
-      </p:sp>
-      <p:sp>
-        <p:nvSpPr>
-          <p:cNvPr id="8" name="TextBox 7"/>
-          <p:cNvSpPr txBox="1"/>
-          <p:nvPr/>
-        </p:nvSpPr>
-        <p:spPr>
-          <a:xfrm>
-            <a:off x="2697480" y="3017520"/>
-            <a:ext cx="2011680" cy="457200"/>
-          </a:xfrm>
-          <a:prstGeom prst="rect">
-            <a:avLst/>
-          </a:prstGeom>
-          <a:noFill/>
-        </p:spPr>
-        <p:txBody>
-          <a:bodyPr wrap="none">
-            <a:spAutoFit/>
-          </a:bodyPr>
-          <a:lstStyle/>
-          <a:p>
-            <a:pPr algn="ctr">
-              <a:defRPr sz="1400">
-                <a:solidFill>
-                  <a:srgbClr val="586E75"/>
-                </a:solidFill>
-              </a:defRPr>
-            </a:pPr>
-            <a:r>
-              <a:t>Precision</a:t>
-            </a:r>
-          </a:p>
-        </p:txBody>
-      </p:sp>
-      <p:sp>
-        <p:nvSpPr>
-          <p:cNvPr id="9" name="Rounded Rectangle 8"/>
-          <p:cNvSpPr/>
-          <p:nvPr/>
-        </p:nvSpPr>
-        <p:spPr>
-          <a:xfrm>
-            <a:off x="4937760" y="2286000"/>
-            <a:ext cx="2011680" cy="1371600"/>
-          </a:xfrm>
-          <a:prstGeom prst="roundRect">
-            <a:avLst/>
-          </a:prstGeom>
-          <a:solidFill>
-            <a:srgbClr val="EEE8D5"/>
-          </a:solidFill>
-          <a:ln>
-            <a:solidFill>
-              <a:srgbClr val="93A1A1"/>
-            </a:solidFill>
-          </a:ln>
-        </p:spPr>
-        <p:style>
-          <a:lnRef idx="1">
-            <a:schemeClr val="accent1"/>
-          </a:lnRef>
-          <a:fillRef idx="3">
-            <a:schemeClr val="accent1"/>
-          </a:fillRef>
-          <a:effectRef idx="2">
-            <a:schemeClr val="accent1"/>
-          </a:effectRef>
-          <a:fontRef idx="minor">
-            <a:schemeClr val="lt1"/>
-          </a:fontRef>
-        </p:style>
-        <p:txBody>
-          <a:bodyPr rtlCol="0" anchor="ctr"/>
-          <a:lstStyle/>
-          <a:p>
-            <a:pPr algn="ctr"/>
-          </a:p>
-        </p:txBody>
-      </p:sp>
-      <p:sp>
-        <p:nvSpPr>
-          <p:cNvPr id="10" name="TextBox 9"/>
-          <p:cNvSpPr txBox="1"/>
-          <p:nvPr/>
-        </p:nvSpPr>
-        <p:spPr>
-          <a:xfrm>
-            <a:off x="4937760" y="2468880"/>
-            <a:ext cx="2011680" cy="731520"/>
-          </a:xfrm>
-          <a:prstGeom prst="rect">
-            <a:avLst/>
-          </a:prstGeom>
-          <a:noFill/>
-        </p:spPr>
-        <p:txBody>
-          <a:bodyPr wrap="none">
-            <a:spAutoFit/>
-          </a:bodyPr>
-          <a:lstStyle/>
-          <a:p>
-            <a:pPr algn="ctr">
-              <a:defRPr b="1" sz="3200">
-                <a:solidFill>
-                  <a:srgbClr val="D33682"/>
-                </a:solidFill>
-              </a:defRPr>
-            </a:pPr>
-            <a:r>
-              <a:t>86.34%</a:t>
-            </a:r>
-          </a:p>
-        </p:txBody>
-      </p:sp>
-      <p:sp>
-        <p:nvSpPr>
-          <p:cNvPr id="11" name="TextBox 10"/>
-          <p:cNvSpPr txBox="1"/>
-          <p:nvPr/>
-        </p:nvSpPr>
-        <p:spPr>
-          <a:xfrm>
-            <a:off x="4937760" y="3017520"/>
-            <a:ext cx="2011680" cy="457200"/>
-          </a:xfrm>
-          <a:prstGeom prst="rect">
-            <a:avLst/>
-          </a:prstGeom>
-          <a:noFill/>
-        </p:spPr>
-        <p:txBody>
-          <a:bodyPr wrap="none">
-            <a:spAutoFit/>
-          </a:bodyPr>
-          <a:lstStyle/>
-          <a:p>
-            <a:pPr algn="ctr">
-              <a:defRPr sz="1400">
-                <a:solidFill>
-                  <a:srgbClr val="586E75"/>
-                </a:solidFill>
-              </a:defRPr>
-            </a:pPr>
-            <a:r>
-              <a:t>F1-Score</a:t>
-            </a:r>
-          </a:p>
-        </p:txBody>
-      </p:sp>
-      <p:sp>
-        <p:nvSpPr>
-          <p:cNvPr id="12" name="Rounded Rectangle 11"/>
-          <p:cNvSpPr/>
-          <p:nvPr/>
-        </p:nvSpPr>
-        <p:spPr>
-          <a:xfrm>
-            <a:off x="7178040" y="2286000"/>
-            <a:ext cx="2011680" cy="1371600"/>
-          </a:xfrm>
-          <a:prstGeom prst="roundRect">
-            <a:avLst/>
-          </a:prstGeom>
-          <a:solidFill>
-            <a:srgbClr val="EEE8D5"/>
-          </a:solidFill>
-          <a:ln>
-            <a:solidFill>
-              <a:srgbClr val="93A1A1"/>
-            </a:solidFill>
-          </a:ln>
-        </p:spPr>
-        <p:style>
-          <a:lnRef idx="1">
-            <a:schemeClr val="accent1"/>
-          </a:lnRef>
-          <a:fillRef idx="3">
-            <a:schemeClr val="accent1"/>
-          </a:fillRef>
-          <a:effectRef idx="2">
-            <a:schemeClr val="accent1"/>
-          </a:effectRef>
-          <a:fontRef idx="minor">
-            <a:schemeClr val="lt1"/>
-          </a:fontRef>
-        </p:style>
-        <p:txBody>
-          <a:bodyPr rtlCol="0" anchor="ctr"/>
-          <a:lstStyle/>
-          <a:p>
-            <a:pPr algn="ctr"/>
-          </a:p>
-        </p:txBody>
-      </p:sp>
-      <p:sp>
-        <p:nvSpPr>
-          <p:cNvPr id="13" name="TextBox 12"/>
-          <p:cNvSpPr txBox="1"/>
-          <p:nvPr/>
-        </p:nvSpPr>
-        <p:spPr>
-          <a:xfrm>
-            <a:off x="7178040" y="2468880"/>
-            <a:ext cx="2011680" cy="731520"/>
-          </a:xfrm>
-          <a:prstGeom prst="rect">
-            <a:avLst/>
-          </a:prstGeom>
-          <a:noFill/>
-        </p:spPr>
-        <p:txBody>
-          <a:bodyPr wrap="none">
-            <a:spAutoFit/>
-          </a:bodyPr>
-          <a:lstStyle/>
-          <a:p>
-            <a:pPr algn="ctr">
-              <a:defRPr b="1" sz="3200">
-                <a:solidFill>
-                  <a:srgbClr val="D33682"/>
-                </a:solidFill>
-              </a:defRPr>
-            </a:pPr>
-            <a:r>
-              <a:t>13.6</a:t>
-            </a:r>
-          </a:p>
-        </p:txBody>
-      </p:sp>
-      <p:sp>
-        <p:nvSpPr>
-          <p:cNvPr id="14" name="TextBox 13"/>
-          <p:cNvSpPr txBox="1"/>
-          <p:nvPr/>
-        </p:nvSpPr>
-        <p:spPr>
-          <a:xfrm>
-            <a:off x="7178040" y="3017520"/>
-            <a:ext cx="2011680" cy="457200"/>
-          </a:xfrm>
-          <a:prstGeom prst="rect">
-            <a:avLst/>
-          </a:prstGeom>
-          <a:noFill/>
-        </p:spPr>
-        <p:txBody>
-          <a:bodyPr wrap="none">
-            <a:spAutoFit/>
-          </a:bodyPr>
-          <a:lstStyle/>
-          <a:p>
-            <a:pPr algn="ctr">
-              <a:defRPr sz="1400">
-                <a:solidFill>
-                  <a:srgbClr val="586E75"/>
-                </a:solidFill>
-              </a:defRPr>
-            </a:pPr>
-            <a:r>
-              <a:t>Video FPS</a:t>
+              <a:t>Diagonal dominance indicates strong performance. Confusion visible between Crossover/MPV.</a:t>
             </a:r>
           </a:p>
         </p:txBody>
@@ -5582,757 +5512,71 @@
               </a:defRPr>
             </a:pPr>
             <a:r>
-              <a:t>Per-Class Performance</a:t>
-            </a:r>
-          </a:p>
-        </p:txBody>
-      </p:sp>
-      <p:graphicFrame>
-        <p:nvGraphicFramePr>
-          <p:cNvPr id="3" name="Table 2"/>
-          <p:cNvGraphicFramePr>
-            <a:graphicFrameLocks noGrp="1"/>
-          </p:cNvGraphicFramePr>
+              <a:t>Per-Class Performance Metrics</a:t>
+            </a:r>
+          </a:p>
+        </p:txBody>
+      </p:sp>
+      <p:pic>
+        <p:nvPicPr>
+          <p:cNvPr id="3" name="Picture 2" descr="per_class_metrics.png"/>
+          <p:cNvPicPr>
+            <a:picLocks noChangeAspect="1"/>
+          </p:cNvPicPr>
           <p:nvPr/>
-        </p:nvGraphicFramePr>
-        <p:xfrm>
-          <a:off x="914400" y="1828800"/>
-          <a:ext cx="7315200" cy="4114800"/>
-        </p:xfrm>
-        <a:graphic>
-          <a:graphicData uri="http://schemas.openxmlformats.org/drawingml/2006/table">
-            <a:tbl>
-              <a:tblPr firstRow="1" bandRow="1">
-                <a:tableStyleId>{5C22544A-7EE6-4342-B048-85BDC9FD1C3A}</a:tableStyleId>
-              </a:tblPr>
-              <a:tblGrid>
-                <a:gridCol w="1828800"/>
-                <a:gridCol w="1828800"/>
-                <a:gridCol w="1828800"/>
-                <a:gridCol w="1828800"/>
-              </a:tblGrid>
-              <a:tr h="457200">
-                <a:tc>
-                  <a:txBody>
-                    <a:bodyPr/>
-                    <a:lstStyle/>
-                    <a:p>
-                      <a:pPr>
-                        <a:defRPr b="1">
-                          <a:solidFill>
-                            <a:srgbClr val="CB4B16"/>
-                          </a:solidFill>
-                        </a:defRPr>
-                      </a:pPr>
-                      <a:r>
-                        <a:t>Class</a:t>
-                      </a:r>
-                    </a:p>
-                  </a:txBody>
-                  <a:tcPr>
-                    <a:solidFill>
-                      <a:srgbClr val="EEE8D5"/>
-                    </a:solidFill>
-                  </a:tcPr>
-                </a:tc>
-                <a:tc>
-                  <a:txBody>
-                    <a:bodyPr/>
-                    <a:lstStyle/>
-                    <a:p>
-                      <a:pPr>
-                        <a:defRPr b="1">
-                          <a:solidFill>
-                            <a:srgbClr val="CB4B16"/>
-                          </a:solidFill>
-                        </a:defRPr>
-                      </a:pPr>
-                      <a:r>
-                        <a:t>Precision</a:t>
-                      </a:r>
-                    </a:p>
-                  </a:txBody>
-                  <a:tcPr>
-                    <a:solidFill>
-                      <a:srgbClr val="EEE8D5"/>
-                    </a:solidFill>
-                  </a:tcPr>
-                </a:tc>
-                <a:tc>
-                  <a:txBody>
-                    <a:bodyPr/>
-                    <a:lstStyle/>
-                    <a:p>
-                      <a:pPr>
-                        <a:defRPr b="1">
-                          <a:solidFill>
-                            <a:srgbClr val="CB4B16"/>
-                          </a:solidFill>
-                        </a:defRPr>
-                      </a:pPr>
-                      <a:r>
-                        <a:t>Recall</a:t>
-                      </a:r>
-                    </a:p>
-                  </a:txBody>
-                  <a:tcPr>
-                    <a:solidFill>
-                      <a:srgbClr val="EEE8D5"/>
-                    </a:solidFill>
-                  </a:tcPr>
-                </a:tc>
-                <a:tc>
-                  <a:txBody>
-                    <a:bodyPr/>
-                    <a:lstStyle/>
-                    <a:p>
-                      <a:pPr>
-                        <a:defRPr b="1">
-                          <a:solidFill>
-                            <a:srgbClr val="CB4B16"/>
-                          </a:solidFill>
-                        </a:defRPr>
-                      </a:pPr>
-                      <a:r>
-                        <a:t>F1-Score</a:t>
-                      </a:r>
-                    </a:p>
-                  </a:txBody>
-                  <a:tcPr>
-                    <a:solidFill>
-                      <a:srgbClr val="EEE8D5"/>
-                    </a:solidFill>
-                  </a:tcPr>
-                </a:tc>
-              </a:tr>
-              <a:tr h="457200">
-                <a:tc>
-                  <a:txBody>
-                    <a:bodyPr/>
-                    <a:lstStyle/>
-                    <a:p>
-                      <a:pPr>
-                        <a:defRPr>
-                          <a:solidFill>
-                            <a:srgbClr val="657B83"/>
-                          </a:solidFill>
-                        </a:defRPr>
-                      </a:pPr>
-                      <a:r>
-                        <a:t>Crossover</a:t>
-                      </a:r>
-                    </a:p>
-                  </a:txBody>
-                  <a:tcPr/>
-                </a:tc>
-                <a:tc>
-                  <a:txBody>
-                    <a:bodyPr/>
-                    <a:lstStyle/>
-                    <a:p>
-                      <a:pPr>
-                        <a:defRPr>
-                          <a:solidFill>
-                            <a:srgbClr val="657B83"/>
-                          </a:solidFill>
-                        </a:defRPr>
-                      </a:pPr>
-                      <a:r>
-                        <a:t>0.85</a:t>
-                      </a:r>
-                    </a:p>
-                  </a:txBody>
-                  <a:tcPr/>
-                </a:tc>
-                <a:tc>
-                  <a:txBody>
-                    <a:bodyPr/>
-                    <a:lstStyle/>
-                    <a:p>
-                      <a:pPr>
-                        <a:defRPr>
-                          <a:solidFill>
-                            <a:srgbClr val="657B83"/>
-                          </a:solidFill>
-                        </a:defRPr>
-                      </a:pPr>
-                      <a:r>
-                        <a:t>0.81</a:t>
-                      </a:r>
-                    </a:p>
-                  </a:txBody>
-                  <a:tcPr/>
-                </a:tc>
-                <a:tc>
-                  <a:txBody>
-                    <a:bodyPr/>
-                    <a:lstStyle/>
-                    <a:p>
-                      <a:pPr>
-                        <a:defRPr>
-                          <a:solidFill>
-                            <a:srgbClr val="657B83"/>
-                          </a:solidFill>
-                        </a:defRPr>
-                      </a:pPr>
-                      <a:r>
-                        <a:t>0.83</a:t>
-                      </a:r>
-                    </a:p>
-                  </a:txBody>
-                  <a:tcPr/>
-                </a:tc>
-              </a:tr>
-              <a:tr h="457200">
-                <a:tc>
-                  <a:txBody>
-                    <a:bodyPr/>
-                    <a:lstStyle/>
-                    <a:p>
-                      <a:pPr>
-                        <a:defRPr>
-                          <a:solidFill>
-                            <a:srgbClr val="657B83"/>
-                          </a:solidFill>
-                        </a:defRPr>
-                      </a:pPr>
-                      <a:r>
-                        <a:t>Hatchback</a:t>
-                      </a:r>
-                    </a:p>
-                  </a:txBody>
-                  <a:tcPr/>
-                </a:tc>
-                <a:tc>
-                  <a:txBody>
-                    <a:bodyPr/>
-                    <a:lstStyle/>
-                    <a:p>
-                      <a:pPr>
-                        <a:defRPr>
-                          <a:solidFill>
-                            <a:srgbClr val="657B83"/>
-                          </a:solidFill>
-                        </a:defRPr>
-                      </a:pPr>
-                      <a:r>
-                        <a:t>0.88</a:t>
-                      </a:r>
-                    </a:p>
-                  </a:txBody>
-                  <a:tcPr/>
-                </a:tc>
-                <a:tc>
-                  <a:txBody>
-                    <a:bodyPr/>
-                    <a:lstStyle/>
-                    <a:p>
-                      <a:pPr>
-                        <a:defRPr>
-                          <a:solidFill>
-                            <a:srgbClr val="657B83"/>
-                          </a:solidFill>
-                        </a:defRPr>
-                      </a:pPr>
-                      <a:r>
-                        <a:t>0.83</a:t>
-                      </a:r>
-                    </a:p>
-                  </a:txBody>
-                  <a:tcPr/>
-                </a:tc>
-                <a:tc>
-                  <a:txBody>
-                    <a:bodyPr/>
-                    <a:lstStyle/>
-                    <a:p>
-                      <a:pPr>
-                        <a:defRPr>
-                          <a:solidFill>
-                            <a:srgbClr val="657B83"/>
-                          </a:solidFill>
-                        </a:defRPr>
-                      </a:pPr>
-                      <a:r>
-                        <a:t>0.85</a:t>
-                      </a:r>
-                    </a:p>
-                  </a:txBody>
-                  <a:tcPr/>
-                </a:tc>
-              </a:tr>
-              <a:tr h="457200">
-                <a:tc>
-                  <a:txBody>
-                    <a:bodyPr/>
-                    <a:lstStyle/>
-                    <a:p>
-                      <a:pPr>
-                        <a:defRPr>
-                          <a:solidFill>
-                            <a:srgbClr val="657B83"/>
-                          </a:solidFill>
-                        </a:defRPr>
-                      </a:pPr>
-                      <a:r>
-                        <a:t>MPV</a:t>
-                      </a:r>
-                    </a:p>
-                  </a:txBody>
-                  <a:tcPr/>
-                </a:tc>
-                <a:tc>
-                  <a:txBody>
-                    <a:bodyPr/>
-                    <a:lstStyle/>
-                    <a:p>
-                      <a:pPr>
-                        <a:defRPr>
-                          <a:solidFill>
-                            <a:srgbClr val="657B83"/>
-                          </a:solidFill>
-                        </a:defRPr>
-                      </a:pPr>
-                      <a:r>
-                        <a:t>0.8</a:t>
-                      </a:r>
-                    </a:p>
-                  </a:txBody>
-                  <a:tcPr/>
-                </a:tc>
-                <a:tc>
-                  <a:txBody>
-                    <a:bodyPr/>
-                    <a:lstStyle/>
-                    <a:p>
-                      <a:pPr>
-                        <a:defRPr b="1">
-                          <a:solidFill>
-                            <a:srgbClr val="859900"/>
-                          </a:solidFill>
-                        </a:defRPr>
-                      </a:pPr>
-                      <a:r>
-                        <a:t>0.9</a:t>
-                      </a:r>
-                    </a:p>
-                  </a:txBody>
-                  <a:tcPr/>
-                </a:tc>
-                <a:tc>
-                  <a:txBody>
-                    <a:bodyPr/>
-                    <a:lstStyle/>
-                    <a:p>
-                      <a:pPr>
-                        <a:defRPr>
-                          <a:solidFill>
-                            <a:srgbClr val="657B83"/>
-                          </a:solidFill>
-                        </a:defRPr>
-                      </a:pPr>
-                      <a:r>
-                        <a:t>0.85</a:t>
-                      </a:r>
-                    </a:p>
-                  </a:txBody>
-                  <a:tcPr/>
-                </a:tc>
-              </a:tr>
-              <a:tr h="457200">
-                <a:tc>
-                  <a:txBody>
-                    <a:bodyPr/>
-                    <a:lstStyle/>
-                    <a:p>
-                      <a:pPr>
-                        <a:defRPr>
-                          <a:solidFill>
-                            <a:srgbClr val="657B83"/>
-                          </a:solidFill>
-                        </a:defRPr>
-                      </a:pPr>
-                      <a:r>
-                        <a:t>Offroad</a:t>
-                      </a:r>
-                    </a:p>
-                  </a:txBody>
-                  <a:tcPr/>
-                </a:tc>
-                <a:tc>
-                  <a:txBody>
-                    <a:bodyPr/>
-                    <a:lstStyle/>
-                    <a:p>
-                      <a:pPr>
-                        <a:defRPr>
-                          <a:solidFill>
-                            <a:srgbClr val="657B83"/>
-                          </a:solidFill>
-                        </a:defRPr>
-                      </a:pPr>
-                      <a:r>
-                        <a:t>0.86</a:t>
-                      </a:r>
-                    </a:p>
-                  </a:txBody>
-                  <a:tcPr/>
-                </a:tc>
-                <a:tc>
-                  <a:txBody>
-                    <a:bodyPr/>
-                    <a:lstStyle/>
-                    <a:p>
-                      <a:pPr>
-                        <a:defRPr>
-                          <a:solidFill>
-                            <a:srgbClr val="657B83"/>
-                          </a:solidFill>
-                        </a:defRPr>
-                      </a:pPr>
-                      <a:r>
-                        <a:t>0.85</a:t>
-                      </a:r>
-                    </a:p>
-                  </a:txBody>
-                  <a:tcPr/>
-                </a:tc>
-                <a:tc>
-                  <a:txBody>
-                    <a:bodyPr/>
-                    <a:lstStyle/>
-                    <a:p>
-                      <a:pPr>
-                        <a:defRPr>
-                          <a:solidFill>
-                            <a:srgbClr val="657B83"/>
-                          </a:solidFill>
-                        </a:defRPr>
-                      </a:pPr>
-                      <a:r>
-                        <a:t>0.86</a:t>
-                      </a:r>
-                    </a:p>
-                  </a:txBody>
-                  <a:tcPr/>
-                </a:tc>
-              </a:tr>
-              <a:tr h="457200">
-                <a:tc>
-                  <a:txBody>
-                    <a:bodyPr/>
-                    <a:lstStyle/>
-                    <a:p>
-                      <a:pPr>
-                        <a:defRPr>
-                          <a:solidFill>
-                            <a:srgbClr val="657B83"/>
-                          </a:solidFill>
-                        </a:defRPr>
-                      </a:pPr>
-                      <a:r>
-                        <a:t>Pickup</a:t>
-                      </a:r>
-                    </a:p>
-                  </a:txBody>
-                  <a:tcPr/>
-                </a:tc>
-                <a:tc>
-                  <a:txBody>
-                    <a:bodyPr/>
-                    <a:lstStyle/>
-                    <a:p>
-                      <a:pPr>
-                        <a:defRPr b="1">
-                          <a:solidFill>
-                            <a:srgbClr val="859900"/>
-                          </a:solidFill>
-                        </a:defRPr>
-                      </a:pPr>
-                      <a:r>
-                        <a:t>0.93</a:t>
-                      </a:r>
-                    </a:p>
-                  </a:txBody>
-                  <a:tcPr/>
-                </a:tc>
-                <a:tc>
-                  <a:txBody>
-                    <a:bodyPr/>
-                    <a:lstStyle/>
-                    <a:p>
-                      <a:pPr>
-                        <a:defRPr>
-                          <a:solidFill>
-                            <a:srgbClr val="657B83"/>
-                          </a:solidFill>
-                        </a:defRPr>
-                      </a:pPr>
-                      <a:r>
-                        <a:t>0.89</a:t>
-                      </a:r>
-                    </a:p>
-                  </a:txBody>
-                  <a:tcPr/>
-                </a:tc>
-                <a:tc>
-                  <a:txBody>
-                    <a:bodyPr/>
-                    <a:lstStyle/>
-                    <a:p>
-                      <a:pPr>
-                        <a:defRPr b="1">
-                          <a:solidFill>
-                            <a:srgbClr val="859900"/>
-                          </a:solidFill>
-                        </a:defRPr>
-                      </a:pPr>
-                      <a:r>
-                        <a:t>0.91</a:t>
-                      </a:r>
-                    </a:p>
-                  </a:txBody>
-                  <a:tcPr/>
-                </a:tc>
-              </a:tr>
-              <a:tr h="457200">
-                <a:tc>
-                  <a:txBody>
-                    <a:bodyPr/>
-                    <a:lstStyle/>
-                    <a:p>
-                      <a:pPr>
-                        <a:defRPr>
-                          <a:solidFill>
-                            <a:srgbClr val="657B83"/>
-                          </a:solidFill>
-                        </a:defRPr>
-                      </a:pPr>
-                      <a:r>
-                        <a:t>Sedan</a:t>
-                      </a:r>
-                    </a:p>
-                  </a:txBody>
-                  <a:tcPr/>
-                </a:tc>
-                <a:tc>
-                  <a:txBody>
-                    <a:bodyPr/>
-                    <a:lstStyle/>
-                    <a:p>
-                      <a:pPr>
-                        <a:defRPr>
-                          <a:solidFill>
-                            <a:srgbClr val="657B83"/>
-                          </a:solidFill>
-                        </a:defRPr>
-                      </a:pPr>
-                      <a:r>
-                        <a:t>0.87</a:t>
-                      </a:r>
-                    </a:p>
-                  </a:txBody>
-                  <a:tcPr/>
-                </a:tc>
-                <a:tc>
-                  <a:txBody>
-                    <a:bodyPr/>
-                    <a:lstStyle/>
-                    <a:p>
-                      <a:pPr>
-                        <a:defRPr>
-                          <a:solidFill>
-                            <a:srgbClr val="657B83"/>
-                          </a:solidFill>
-                        </a:defRPr>
-                      </a:pPr>
-                      <a:r>
-                        <a:t>0.87</a:t>
-                      </a:r>
-                    </a:p>
-                  </a:txBody>
-                  <a:tcPr/>
-                </a:tc>
-                <a:tc>
-                  <a:txBody>
-                    <a:bodyPr/>
-                    <a:lstStyle/>
-                    <a:p>
-                      <a:pPr>
-                        <a:defRPr>
-                          <a:solidFill>
-                            <a:srgbClr val="657B83"/>
-                          </a:solidFill>
-                        </a:defRPr>
-                      </a:pPr>
-                      <a:r>
-                        <a:t>0.87</a:t>
-                      </a:r>
-                    </a:p>
-                  </a:txBody>
-                  <a:tcPr/>
-                </a:tc>
-              </a:tr>
-              <a:tr h="457200">
-                <a:tc>
-                  <a:txBody>
-                    <a:bodyPr/>
-                    <a:lstStyle/>
-                    <a:p>
-                      <a:pPr>
-                        <a:defRPr>
-                          <a:solidFill>
-                            <a:srgbClr val="657B83"/>
-                          </a:solidFill>
-                        </a:defRPr>
-                      </a:pPr>
-                      <a:r>
-                        <a:t>Truck</a:t>
-                      </a:r>
-                    </a:p>
-                  </a:txBody>
-                  <a:tcPr/>
-                </a:tc>
-                <a:tc>
-                  <a:txBody>
-                    <a:bodyPr/>
-                    <a:lstStyle/>
-                    <a:p>
-                      <a:pPr>
-                        <a:defRPr b="1">
-                          <a:solidFill>
-                            <a:srgbClr val="859900"/>
-                          </a:solidFill>
-                        </a:defRPr>
-                      </a:pPr>
-                      <a:r>
-                        <a:t>0.92</a:t>
-                      </a:r>
-                    </a:p>
-                  </a:txBody>
-                  <a:tcPr/>
-                </a:tc>
-                <a:tc>
-                  <a:txBody>
-                    <a:bodyPr/>
-                    <a:lstStyle/>
-                    <a:p>
-                      <a:pPr>
-                        <a:defRPr>
-                          <a:solidFill>
-                            <a:srgbClr val="657B83"/>
-                          </a:solidFill>
-                        </a:defRPr>
-                      </a:pPr>
-                      <a:r>
-                        <a:t>0.88</a:t>
-                      </a:r>
-                    </a:p>
-                  </a:txBody>
-                  <a:tcPr/>
-                </a:tc>
-                <a:tc>
-                  <a:txBody>
-                    <a:bodyPr/>
-                    <a:lstStyle/>
-                    <a:p>
-                      <a:pPr>
-                        <a:defRPr b="1">
-                          <a:solidFill>
-                            <a:srgbClr val="859900"/>
-                          </a:solidFill>
-                        </a:defRPr>
-                      </a:pPr>
-                      <a:r>
-                        <a:t>0.9</a:t>
-                      </a:r>
-                    </a:p>
-                  </a:txBody>
-                  <a:tcPr/>
-                </a:tc>
-              </a:tr>
-              <a:tr h="457200">
-                <a:tc>
-                  <a:txBody>
-                    <a:bodyPr/>
-                    <a:lstStyle/>
-                    <a:p>
-                      <a:pPr>
-                        <a:defRPr>
-                          <a:solidFill>
-                            <a:srgbClr val="657B83"/>
-                          </a:solidFill>
-                        </a:defRPr>
-                      </a:pPr>
-                      <a:r>
-                        <a:t>Van</a:t>
-                      </a:r>
-                    </a:p>
-                  </a:txBody>
-                  <a:tcPr/>
-                </a:tc>
-                <a:tc>
-                  <a:txBody>
-                    <a:bodyPr/>
-                    <a:lstStyle/>
-                    <a:p>
-                      <a:pPr>
-                        <a:defRPr b="1">
-                          <a:solidFill>
-                            <a:srgbClr val="859900"/>
-                          </a:solidFill>
-                        </a:defRPr>
-                      </a:pPr>
-                      <a:r>
-                        <a:t>0.9</a:t>
-                      </a:r>
-                    </a:p>
-                  </a:txBody>
-                  <a:tcPr/>
-                </a:tc>
-                <a:tc>
-                  <a:txBody>
-                    <a:bodyPr/>
-                    <a:lstStyle/>
-                    <a:p>
-                      <a:pPr>
-                        <a:defRPr b="1">
-                          <a:solidFill>
-                            <a:srgbClr val="859900"/>
-                          </a:solidFill>
-                        </a:defRPr>
-                      </a:pPr>
-                      <a:r>
-                        <a:t>0.9</a:t>
-                      </a:r>
-                    </a:p>
-                  </a:txBody>
-                  <a:tcPr/>
-                </a:tc>
-                <a:tc>
-                  <a:txBody>
-                    <a:bodyPr/>
-                    <a:lstStyle/>
-                    <a:p>
-                      <a:pPr>
-                        <a:defRPr b="1">
-                          <a:solidFill>
-                            <a:srgbClr val="859900"/>
-                          </a:solidFill>
-                        </a:defRPr>
-                      </a:pPr>
-                      <a:r>
-                        <a:t>0.9</a:t>
-                      </a:r>
-                    </a:p>
-                  </a:txBody>
-                  <a:tcPr/>
-                </a:tc>
-              </a:tr>
-            </a:tbl>
-          </a:graphicData>
-        </a:graphic>
-      </p:graphicFrame>
+        </p:nvPicPr>
+        <p:blipFill>
+          <a:blip r:embed="rId2"/>
+          <a:stretch>
+            <a:fillRect/>
+          </a:stretch>
+        </p:blipFill>
+        <p:spPr>
+          <a:xfrm>
+            <a:off x="401089" y="1828800"/>
+            <a:ext cx="8341822" cy="4114800"/>
+          </a:xfrm>
+          <a:prstGeom prst="rect">
+            <a:avLst/>
+          </a:prstGeom>
+        </p:spPr>
+      </p:pic>
+      <p:sp>
+        <p:nvSpPr>
+          <p:cNvPr id="4" name="TextBox 3"/>
+          <p:cNvSpPr txBox="1"/>
+          <p:nvPr/>
+        </p:nvSpPr>
+        <p:spPr>
+          <a:xfrm>
+            <a:off x="914400" y="6035040"/>
+            <a:ext cx="7315200" cy="914400"/>
+          </a:xfrm>
+          <a:prstGeom prst="rect">
+            <a:avLst/>
+          </a:prstGeom>
+          <a:noFill/>
+        </p:spPr>
+        <p:txBody>
+          <a:bodyPr wrap="none">
+            <a:spAutoFit/>
+          </a:bodyPr>
+          <a:lstStyle/>
+          <a:p/>
+          <a:p>
+            <a:pPr algn="ctr">
+              <a:defRPr sz="1600">
+                <a:solidFill>
+                  <a:srgbClr val="586E75"/>
+                </a:solidFill>
+              </a:defRPr>
+            </a:pPr>
+            <a:r>
+              <a:t>Pickup and Truck achieve highest F1-scores (&gt;0.90). Crossover is lowest (0.83).</a:t>
+            </a:r>
+          </a:p>
+        </p:txBody>
+      </p:sp>
     </p:spTree>
   </p:cSld>
   <p:clrMapOvr>
@@ -6375,14 +5619,14 @@
           <a:lstStyle/>
           <a:p>
             <a:pPr>
-              <a:defRPr>
+              <a:defRPr b="1">
                 <a:solidFill>
                   <a:srgbClr val="B58900"/>
                 </a:solidFill>
               </a:defRPr>
             </a:pPr>
             <a:r>
-              <a:t>Video Inference Results</a:t>
+              <a:t>Video Inference Statistics</a:t>
             </a:r>
           </a:p>
         </p:txBody>
@@ -6440,7 +5684,7 @@
         </p:nvSpPr>
         <p:spPr>
           <a:xfrm>
-            <a:off x="457200" y="2468880"/>
+            <a:off x="457200" y="2514600"/>
             <a:ext cx="2011680" cy="731520"/>
           </a:xfrm>
           <a:prstGeom prst="rect">
@@ -6475,7 +5719,7 @@
         </p:nvSpPr>
         <p:spPr>
           <a:xfrm>
-            <a:off x="457200" y="3017520"/>
+            <a:off x="457200" y="3063240"/>
             <a:ext cx="2011680" cy="457200"/>
           </a:xfrm>
           <a:prstGeom prst="rect">
@@ -6555,7 +5799,7 @@
         </p:nvSpPr>
         <p:spPr>
           <a:xfrm>
-            <a:off x="2697480" y="2468880"/>
+            <a:off x="2697480" y="2514600"/>
             <a:ext cx="2011680" cy="731520"/>
           </a:xfrm>
           <a:prstGeom prst="rect">
@@ -6590,7 +5834,7 @@
         </p:nvSpPr>
         <p:spPr>
           <a:xfrm>
-            <a:off x="2697480" y="3017520"/>
+            <a:off x="2697480" y="3063240"/>
             <a:ext cx="2011680" cy="457200"/>
           </a:xfrm>
           <a:prstGeom prst="rect">
@@ -6612,7 +5856,7 @@
               </a:defRPr>
             </a:pPr>
             <a:r>
-              <a:t>Avg Inference</a:t>
+              <a:t>Latency/Frame</a:t>
             </a:r>
           </a:p>
         </p:txBody>
@@ -6670,7 +5914,7 @@
         </p:nvSpPr>
         <p:spPr>
           <a:xfrm>
-            <a:off x="4937760" y="2468880"/>
+            <a:off x="4937760" y="2514600"/>
             <a:ext cx="2011680" cy="731520"/>
           </a:xfrm>
           <a:prstGeom prst="rect">
@@ -6705,7 +5949,7 @@
         </p:nvSpPr>
         <p:spPr>
           <a:xfrm>
-            <a:off x="4937760" y="3017520"/>
+            <a:off x="4937760" y="3063240"/>
             <a:ext cx="2011680" cy="457200"/>
           </a:xfrm>
           <a:prstGeom prst="rect">
@@ -6727,7 +5971,7 @@
               </a:defRPr>
             </a:pPr>
             <a:r>
-              <a:t>Car Detections</a:t>
+              <a:t>Detections</a:t>
             </a:r>
           </a:p>
         </p:txBody>
@@ -6785,7 +6029,7 @@
         </p:nvSpPr>
         <p:spPr>
           <a:xfrm>
-            <a:off x="7178040" y="2468880"/>
+            <a:off x="7178040" y="2514600"/>
             <a:ext cx="2011680" cy="731520"/>
           </a:xfrm>
           <a:prstGeom prst="rect">
@@ -6820,7 +6064,7 @@
         </p:nvSpPr>
         <p:spPr>
           <a:xfrm>
-            <a:off x="7178040" y="3017520"/>
+            <a:off x="7178040" y="3063240"/>
             <a:ext cx="2011680" cy="457200"/>
           </a:xfrm>
           <a:prstGeom prst="rect">
@@ -6842,43 +6086,7 @@
               </a:defRPr>
             </a:pPr>
             <a:r>
-              <a:t>Video Duration</a:t>
-            </a:r>
-          </a:p>
-        </p:txBody>
-      </p:sp>
-      <p:sp>
-        <p:nvSpPr>
-          <p:cNvPr id="15" name="TextBox 14"/>
-          <p:cNvSpPr txBox="1"/>
-          <p:nvPr/>
-        </p:nvSpPr>
-        <p:spPr>
-          <a:xfrm>
-            <a:off x="457200" y="4572000"/>
-            <a:ext cx="8229600" cy="914400"/>
-          </a:xfrm>
-          <a:prstGeom prst="rect">
-            <a:avLst/>
-          </a:prstGeom>
-          <a:noFill/>
-        </p:spPr>
-        <p:txBody>
-          <a:bodyPr wrap="none">
-            <a:spAutoFit/>
-          </a:bodyPr>
-          <a:lstStyle/>
-          <a:p/>
-          <a:p>
-            <a:pPr algn="ctr">
-              <a:defRPr sz="2000">
-                <a:solidFill>
-                  <a:srgbClr val="586E75"/>
-                </a:solidFill>
-              </a:defRPr>
-            </a:pPr>
-            <a:r>
-              <a:t>MPV: 34.7% • Sedan: 19.5% • Hatchback: 16.1% • Offroad: 12.0%</a:t>
+              <a:t>Duration</a:t>
             </a:r>
           </a:p>
         </p:txBody>

</xml_diff>

<commit_message>
Update README acknowledgments and clean up documentation files
</commit_message>
<xml_diff>
--- a/presentation.pptx
+++ b/presentation.pptx
@@ -5,16 +5,16 @@
     <p:sldMasterId id="2147483648" r:id="rId1"/>
   </p:sldMasterIdLst>
   <p:sldIdLst>
-    <p:sldId id="256" r:id="rId7"/>
-    <p:sldId id="257" r:id="rId8"/>
-    <p:sldId id="258" r:id="rId9"/>
-    <p:sldId id="259" r:id="rId10"/>
-    <p:sldId id="260" r:id="rId11"/>
-    <p:sldId id="261" r:id="rId12"/>
-    <p:sldId id="262" r:id="rId13"/>
-    <p:sldId id="263" r:id="rId14"/>
-    <p:sldId id="264" r:id="rId15"/>
-    <p:sldId id="265" r:id="rId16"/>
+    <p:sldId id="256" r:id="rId2"/>
+    <p:sldId id="257" r:id="rId3"/>
+    <p:sldId id="258" r:id="rId4"/>
+    <p:sldId id="259" r:id="rId5"/>
+    <p:sldId id="260" r:id="rId6"/>
+    <p:sldId id="261" r:id="rId7"/>
+    <p:sldId id="262" r:id="rId8"/>
+    <p:sldId id="263" r:id="rId9"/>
+    <p:sldId id="264" r:id="rId10"/>
+    <p:sldId id="265" r:id="rId11"/>
   </p:sldIdLst>
   <p:sldSz cx="9144000" cy="6858000" type="screen4x3"/>
   <p:notesSz cx="6858000" cy="9144000"/>
@@ -113,6 +113,22 @@
       </a:defRPr>
     </a:lvl9pPr>
   </p:defaultTextStyle>
+  <p:extLst>
+    <p:ext uri="{EFAFB233-063F-42B5-8137-9DF3F51BA10A}">
+      <p15:sldGuideLst xmlns:p15="http://schemas.microsoft.com/office/powerpoint/2012/main">
+        <p15:guide id="1" orient="horz" pos="2160">
+          <p15:clr>
+            <a:srgbClr val="A4A3A4"/>
+          </p15:clr>
+        </p15:guide>
+        <p15:guide id="2" pos="2880">
+          <p15:clr>
+            <a:srgbClr val="A4A3A4"/>
+          </p15:clr>
+        </p15:guide>
+      </p15:sldGuideLst>
+    </p:ext>
+  </p:extLst>
 </p:presentation>
 </file>
 
@@ -154,10 +170,9 @@
           <a:lstStyle/>
           <a:p>
             <a:r>
-              <a:rPr lang="en-US" smtClean="0"/>
+              <a:rPr lang="en-US"/>
               <a:t>Click to edit Master title style</a:t>
             </a:r>
-            <a:endParaRPr lang="en-US"/>
           </a:p>
         </p:txBody>
       </p:sp>
@@ -273,10 +288,9 @@
           </a:lstStyle>
           <a:p>
             <a:r>
-              <a:rPr lang="en-US" smtClean="0"/>
+              <a:rPr lang="en-US"/>
               <a:t>Click to edit Master subtitle style</a:t>
             </a:r>
-            <a:endParaRPr lang="en-US"/>
           </a:p>
         </p:txBody>
       </p:sp>
@@ -297,7 +311,7 @@
           <a:p>
             <a:fld id="{5BCAD085-E8A6-8845-BD4E-CB4CCA059FC4}" type="datetimeFigureOut">
               <a:rPr lang="en-US" smtClean="0"/>
-              <a:t>1/27/13</a:t>
+              <a:t>1/17/2026</a:t>
             </a:fld>
             <a:endParaRPr lang="en-US"/>
           </a:p>
@@ -391,10 +405,9 @@
           <a:lstStyle/>
           <a:p>
             <a:r>
-              <a:rPr lang="en-US" smtClean="0"/>
+              <a:rPr lang="en-US"/>
               <a:t>Click to edit Master title style</a:t>
             </a:r>
-            <a:endParaRPr lang="en-US"/>
           </a:p>
         </p:txBody>
       </p:sp>
@@ -415,38 +428,37 @@
           <a:p>
             <a:pPr lvl="0"/>
             <a:r>
-              <a:rPr lang="en-US" smtClean="0"/>
+              <a:rPr lang="en-US"/>
               <a:t>Click to edit Master text styles</a:t>
             </a:r>
           </a:p>
           <a:p>
             <a:pPr lvl="1"/>
             <a:r>
-              <a:rPr lang="en-US" smtClean="0"/>
+              <a:rPr lang="en-US"/>
               <a:t>Second level</a:t>
             </a:r>
           </a:p>
           <a:p>
             <a:pPr lvl="2"/>
             <a:r>
-              <a:rPr lang="en-US" smtClean="0"/>
+              <a:rPr lang="en-US"/>
               <a:t>Third level</a:t>
             </a:r>
           </a:p>
           <a:p>
             <a:pPr lvl="3"/>
             <a:r>
-              <a:rPr lang="en-US" smtClean="0"/>
+              <a:rPr lang="en-US"/>
               <a:t>Fourth level</a:t>
             </a:r>
           </a:p>
           <a:p>
             <a:pPr lvl="4"/>
             <a:r>
-              <a:rPr lang="en-US" smtClean="0"/>
+              <a:rPr lang="en-US"/>
               <a:t>Fifth level</a:t>
             </a:r>
-            <a:endParaRPr lang="en-US"/>
           </a:p>
         </p:txBody>
       </p:sp>
@@ -467,7 +479,7 @@
           <a:p>
             <a:fld id="{5BCAD085-E8A6-8845-BD4E-CB4CCA059FC4}" type="datetimeFigureOut">
               <a:rPr lang="en-US" smtClean="0"/>
-              <a:t>1/27/13</a:t>
+              <a:t>1/17/2026</a:t>
             </a:fld>
             <a:endParaRPr lang="en-US"/>
           </a:p>
@@ -566,10 +578,9 @@
           <a:lstStyle/>
           <a:p>
             <a:r>
-              <a:rPr lang="en-US" smtClean="0"/>
+              <a:rPr lang="en-US"/>
               <a:t>Click to edit Master title style</a:t>
             </a:r>
-            <a:endParaRPr lang="en-US"/>
           </a:p>
         </p:txBody>
       </p:sp>
@@ -595,38 +606,37 @@
           <a:p>
             <a:pPr lvl="0"/>
             <a:r>
-              <a:rPr lang="en-US" smtClean="0"/>
+              <a:rPr lang="en-US"/>
               <a:t>Click to edit Master text styles</a:t>
             </a:r>
           </a:p>
           <a:p>
             <a:pPr lvl="1"/>
             <a:r>
-              <a:rPr lang="en-US" smtClean="0"/>
+              <a:rPr lang="en-US"/>
               <a:t>Second level</a:t>
             </a:r>
           </a:p>
           <a:p>
             <a:pPr lvl="2"/>
             <a:r>
-              <a:rPr lang="en-US" smtClean="0"/>
+              <a:rPr lang="en-US"/>
               <a:t>Third level</a:t>
             </a:r>
           </a:p>
           <a:p>
             <a:pPr lvl="3"/>
             <a:r>
-              <a:rPr lang="en-US" smtClean="0"/>
+              <a:rPr lang="en-US"/>
               <a:t>Fourth level</a:t>
             </a:r>
           </a:p>
           <a:p>
             <a:pPr lvl="4"/>
             <a:r>
-              <a:rPr lang="en-US" smtClean="0"/>
+              <a:rPr lang="en-US"/>
               <a:t>Fifth level</a:t>
             </a:r>
-            <a:endParaRPr lang="en-US"/>
           </a:p>
         </p:txBody>
       </p:sp>
@@ -647,7 +657,7 @@
           <a:p>
             <a:fld id="{5BCAD085-E8A6-8845-BD4E-CB4CCA059FC4}" type="datetimeFigureOut">
               <a:rPr lang="en-US" smtClean="0"/>
-              <a:t>1/27/13</a:t>
+              <a:t>1/17/2026</a:t>
             </a:fld>
             <a:endParaRPr lang="en-US"/>
           </a:p>
@@ -741,10 +751,9 @@
           <a:lstStyle/>
           <a:p>
             <a:r>
-              <a:rPr lang="en-US" smtClean="0"/>
+              <a:rPr lang="en-US"/>
               <a:t>Click to edit Master title style</a:t>
             </a:r>
-            <a:endParaRPr lang="en-US"/>
           </a:p>
         </p:txBody>
       </p:sp>
@@ -765,38 +774,37 @@
           <a:p>
             <a:pPr lvl="0"/>
             <a:r>
-              <a:rPr lang="en-US" smtClean="0"/>
+              <a:rPr lang="en-US"/>
               <a:t>Click to edit Master text styles</a:t>
             </a:r>
           </a:p>
           <a:p>
             <a:pPr lvl="1"/>
             <a:r>
-              <a:rPr lang="en-US" smtClean="0"/>
+              <a:rPr lang="en-US"/>
               <a:t>Second level</a:t>
             </a:r>
           </a:p>
           <a:p>
             <a:pPr lvl="2"/>
             <a:r>
-              <a:rPr lang="en-US" smtClean="0"/>
+              <a:rPr lang="en-US"/>
               <a:t>Third level</a:t>
             </a:r>
           </a:p>
           <a:p>
             <a:pPr lvl="3"/>
             <a:r>
-              <a:rPr lang="en-US" smtClean="0"/>
+              <a:rPr lang="en-US"/>
               <a:t>Fourth level</a:t>
             </a:r>
           </a:p>
           <a:p>
             <a:pPr lvl="4"/>
             <a:r>
-              <a:rPr lang="en-US" smtClean="0"/>
+              <a:rPr lang="en-US"/>
               <a:t>Fifth level</a:t>
             </a:r>
-            <a:endParaRPr lang="en-US"/>
           </a:p>
         </p:txBody>
       </p:sp>
@@ -817,7 +825,7 @@
           <a:p>
             <a:fld id="{5BCAD085-E8A6-8845-BD4E-CB4CCA059FC4}" type="datetimeFigureOut">
               <a:rPr lang="en-US" smtClean="0"/>
-              <a:t>1/27/13</a:t>
+              <a:t>1/17/2026</a:t>
             </a:fld>
             <a:endParaRPr lang="en-US"/>
           </a:p>
@@ -920,10 +928,9 @@
           </a:lstStyle>
           <a:p>
             <a:r>
-              <a:rPr lang="en-US" smtClean="0"/>
+              <a:rPr lang="en-US"/>
               <a:t>Click to edit Master title style</a:t>
             </a:r>
-            <a:endParaRPr lang="en-US"/>
           </a:p>
         </p:txBody>
       </p:sp>
@@ -1040,7 +1047,7 @@
           <a:p>
             <a:pPr lvl="0"/>
             <a:r>
-              <a:rPr lang="en-US" smtClean="0"/>
+              <a:rPr lang="en-US"/>
               <a:t>Click to edit Master text styles</a:t>
             </a:r>
           </a:p>
@@ -1063,7 +1070,7 @@
           <a:p>
             <a:fld id="{5BCAD085-E8A6-8845-BD4E-CB4CCA059FC4}" type="datetimeFigureOut">
               <a:rPr lang="en-US" smtClean="0"/>
-              <a:t>1/27/13</a:t>
+              <a:t>1/17/2026</a:t>
             </a:fld>
             <a:endParaRPr lang="en-US"/>
           </a:p>
@@ -1157,10 +1164,9 @@
           <a:lstStyle/>
           <a:p>
             <a:r>
-              <a:rPr lang="en-US" smtClean="0"/>
+              <a:rPr lang="en-US"/>
               <a:t>Click to edit Master title style</a:t>
             </a:r>
-            <a:endParaRPr lang="en-US"/>
           </a:p>
         </p:txBody>
       </p:sp>
@@ -1214,38 +1220,37 @@
           <a:p>
             <a:pPr lvl="0"/>
             <a:r>
-              <a:rPr lang="en-US" smtClean="0"/>
+              <a:rPr lang="en-US"/>
               <a:t>Click to edit Master text styles</a:t>
             </a:r>
           </a:p>
           <a:p>
             <a:pPr lvl="1"/>
             <a:r>
-              <a:rPr lang="en-US" smtClean="0"/>
+              <a:rPr lang="en-US"/>
               <a:t>Second level</a:t>
             </a:r>
           </a:p>
           <a:p>
             <a:pPr lvl="2"/>
             <a:r>
-              <a:rPr lang="en-US" smtClean="0"/>
+              <a:rPr lang="en-US"/>
               <a:t>Third level</a:t>
             </a:r>
           </a:p>
           <a:p>
             <a:pPr lvl="3"/>
             <a:r>
-              <a:rPr lang="en-US" smtClean="0"/>
+              <a:rPr lang="en-US"/>
               <a:t>Fourth level</a:t>
             </a:r>
           </a:p>
           <a:p>
             <a:pPr lvl="4"/>
             <a:r>
-              <a:rPr lang="en-US" smtClean="0"/>
+              <a:rPr lang="en-US"/>
               <a:t>Fifth level</a:t>
             </a:r>
-            <a:endParaRPr lang="en-US"/>
           </a:p>
         </p:txBody>
       </p:sp>
@@ -1299,38 +1304,37 @@
           <a:p>
             <a:pPr lvl="0"/>
             <a:r>
-              <a:rPr lang="en-US" smtClean="0"/>
+              <a:rPr lang="en-US"/>
               <a:t>Click to edit Master text styles</a:t>
             </a:r>
           </a:p>
           <a:p>
             <a:pPr lvl="1"/>
             <a:r>
-              <a:rPr lang="en-US" smtClean="0"/>
+              <a:rPr lang="en-US"/>
               <a:t>Second level</a:t>
             </a:r>
           </a:p>
           <a:p>
             <a:pPr lvl="2"/>
             <a:r>
-              <a:rPr lang="en-US" smtClean="0"/>
+              <a:rPr lang="en-US"/>
               <a:t>Third level</a:t>
             </a:r>
           </a:p>
           <a:p>
             <a:pPr lvl="3"/>
             <a:r>
-              <a:rPr lang="en-US" smtClean="0"/>
+              <a:rPr lang="en-US"/>
               <a:t>Fourth level</a:t>
             </a:r>
           </a:p>
           <a:p>
             <a:pPr lvl="4"/>
             <a:r>
-              <a:rPr lang="en-US" smtClean="0"/>
+              <a:rPr lang="en-US"/>
               <a:t>Fifth level</a:t>
             </a:r>
-            <a:endParaRPr lang="en-US"/>
           </a:p>
         </p:txBody>
       </p:sp>
@@ -1351,7 +1355,7 @@
           <a:p>
             <a:fld id="{5BCAD085-E8A6-8845-BD4E-CB4CCA059FC4}" type="datetimeFigureOut">
               <a:rPr lang="en-US" smtClean="0"/>
-              <a:t>1/27/13</a:t>
+              <a:t>1/17/2026</a:t>
             </a:fld>
             <a:endParaRPr lang="en-US"/>
           </a:p>
@@ -1449,10 +1453,9 @@
           </a:lstStyle>
           <a:p>
             <a:r>
-              <a:rPr lang="en-US" smtClean="0"/>
+              <a:rPr lang="en-US"/>
               <a:t>Click to edit Master title style</a:t>
             </a:r>
-            <a:endParaRPr lang="en-US"/>
           </a:p>
         </p:txBody>
       </p:sp>
@@ -1515,7 +1518,7 @@
           <a:p>
             <a:pPr lvl="0"/>
             <a:r>
-              <a:rPr lang="en-US" smtClean="0"/>
+              <a:rPr lang="en-US"/>
               <a:t>Click to edit Master text styles</a:t>
             </a:r>
           </a:p>
@@ -1571,38 +1574,37 @@
           <a:p>
             <a:pPr lvl="0"/>
             <a:r>
-              <a:rPr lang="en-US" smtClean="0"/>
+              <a:rPr lang="en-US"/>
               <a:t>Click to edit Master text styles</a:t>
             </a:r>
           </a:p>
           <a:p>
             <a:pPr lvl="1"/>
             <a:r>
-              <a:rPr lang="en-US" smtClean="0"/>
+              <a:rPr lang="en-US"/>
               <a:t>Second level</a:t>
             </a:r>
           </a:p>
           <a:p>
             <a:pPr lvl="2"/>
             <a:r>
-              <a:rPr lang="en-US" smtClean="0"/>
+              <a:rPr lang="en-US"/>
               <a:t>Third level</a:t>
             </a:r>
           </a:p>
           <a:p>
             <a:pPr lvl="3"/>
             <a:r>
-              <a:rPr lang="en-US" smtClean="0"/>
+              <a:rPr lang="en-US"/>
               <a:t>Fourth level</a:t>
             </a:r>
           </a:p>
           <a:p>
             <a:pPr lvl="4"/>
             <a:r>
-              <a:rPr lang="en-US" smtClean="0"/>
+              <a:rPr lang="en-US"/>
               <a:t>Fifth level</a:t>
             </a:r>
-            <a:endParaRPr lang="en-US"/>
           </a:p>
         </p:txBody>
       </p:sp>
@@ -1665,7 +1667,7 @@
           <a:p>
             <a:pPr lvl="0"/>
             <a:r>
-              <a:rPr lang="en-US" smtClean="0"/>
+              <a:rPr lang="en-US"/>
               <a:t>Click to edit Master text styles</a:t>
             </a:r>
           </a:p>
@@ -1721,38 +1723,37 @@
           <a:p>
             <a:pPr lvl="0"/>
             <a:r>
-              <a:rPr lang="en-US" smtClean="0"/>
+              <a:rPr lang="en-US"/>
               <a:t>Click to edit Master text styles</a:t>
             </a:r>
           </a:p>
           <a:p>
             <a:pPr lvl="1"/>
             <a:r>
-              <a:rPr lang="en-US" smtClean="0"/>
+              <a:rPr lang="en-US"/>
               <a:t>Second level</a:t>
             </a:r>
           </a:p>
           <a:p>
             <a:pPr lvl="2"/>
             <a:r>
-              <a:rPr lang="en-US" smtClean="0"/>
+              <a:rPr lang="en-US"/>
               <a:t>Third level</a:t>
             </a:r>
           </a:p>
           <a:p>
             <a:pPr lvl="3"/>
             <a:r>
-              <a:rPr lang="en-US" smtClean="0"/>
+              <a:rPr lang="en-US"/>
               <a:t>Fourth level</a:t>
             </a:r>
           </a:p>
           <a:p>
             <a:pPr lvl="4"/>
             <a:r>
-              <a:rPr lang="en-US" smtClean="0"/>
+              <a:rPr lang="en-US"/>
               <a:t>Fifth level</a:t>
             </a:r>
-            <a:endParaRPr lang="en-US"/>
           </a:p>
         </p:txBody>
       </p:sp>
@@ -1773,7 +1774,7 @@
           <a:p>
             <a:fld id="{5BCAD085-E8A6-8845-BD4E-CB4CCA059FC4}" type="datetimeFigureOut">
               <a:rPr lang="en-US" smtClean="0"/>
-              <a:t>1/27/13</a:t>
+              <a:t>1/17/2026</a:t>
             </a:fld>
             <a:endParaRPr lang="en-US"/>
           </a:p>
@@ -1867,10 +1868,9 @@
           <a:lstStyle/>
           <a:p>
             <a:r>
-              <a:rPr lang="en-US" smtClean="0"/>
+              <a:rPr lang="en-US"/>
               <a:t>Click to edit Master title style</a:t>
             </a:r>
-            <a:endParaRPr lang="en-US"/>
           </a:p>
         </p:txBody>
       </p:sp>
@@ -1891,7 +1891,7 @@
           <a:p>
             <a:fld id="{5BCAD085-E8A6-8845-BD4E-CB4CCA059FC4}" type="datetimeFigureOut">
               <a:rPr lang="en-US" smtClean="0"/>
-              <a:t>1/27/13</a:t>
+              <a:t>1/17/2026</a:t>
             </a:fld>
             <a:endParaRPr lang="en-US"/>
           </a:p>
@@ -1986,7 +1986,7 @@
           <a:p>
             <a:fld id="{5BCAD085-E8A6-8845-BD4E-CB4CCA059FC4}" type="datetimeFigureOut">
               <a:rPr lang="en-US" smtClean="0"/>
-              <a:t>1/27/13</a:t>
+              <a:t>1/17/2026</a:t>
             </a:fld>
             <a:endParaRPr lang="en-US"/>
           </a:p>
@@ -2089,10 +2089,9 @@
           </a:lstStyle>
           <a:p>
             <a:r>
-              <a:rPr lang="en-US" smtClean="0"/>
+              <a:rPr lang="en-US"/>
               <a:t>Click to edit Master title style</a:t>
             </a:r>
-            <a:endParaRPr lang="en-US"/>
           </a:p>
         </p:txBody>
       </p:sp>
@@ -2146,38 +2145,37 @@
           <a:p>
             <a:pPr lvl="0"/>
             <a:r>
-              <a:rPr lang="en-US" smtClean="0"/>
+              <a:rPr lang="en-US"/>
               <a:t>Click to edit Master text styles</a:t>
             </a:r>
           </a:p>
           <a:p>
             <a:pPr lvl="1"/>
             <a:r>
-              <a:rPr lang="en-US" smtClean="0"/>
+              <a:rPr lang="en-US"/>
               <a:t>Second level</a:t>
             </a:r>
           </a:p>
           <a:p>
             <a:pPr lvl="2"/>
             <a:r>
-              <a:rPr lang="en-US" smtClean="0"/>
+              <a:rPr lang="en-US"/>
               <a:t>Third level</a:t>
             </a:r>
           </a:p>
           <a:p>
             <a:pPr lvl="3"/>
             <a:r>
-              <a:rPr lang="en-US" smtClean="0"/>
+              <a:rPr lang="en-US"/>
               <a:t>Fourth level</a:t>
             </a:r>
           </a:p>
           <a:p>
             <a:pPr lvl="4"/>
             <a:r>
-              <a:rPr lang="en-US" smtClean="0"/>
+              <a:rPr lang="en-US"/>
               <a:t>Fifth level</a:t>
             </a:r>
-            <a:endParaRPr lang="en-US"/>
           </a:p>
         </p:txBody>
       </p:sp>
@@ -2240,7 +2238,7 @@
           <a:p>
             <a:pPr lvl="0"/>
             <a:r>
-              <a:rPr lang="en-US" smtClean="0"/>
+              <a:rPr lang="en-US"/>
               <a:t>Click to edit Master text styles</a:t>
             </a:r>
           </a:p>
@@ -2263,7 +2261,7 @@
           <a:p>
             <a:fld id="{5BCAD085-E8A6-8845-BD4E-CB4CCA059FC4}" type="datetimeFigureOut">
               <a:rPr lang="en-US" smtClean="0"/>
-              <a:t>1/27/13</a:t>
+              <a:t>1/17/2026</a:t>
             </a:fld>
             <a:endParaRPr lang="en-US"/>
           </a:p>
@@ -2366,10 +2364,9 @@
           </a:lstStyle>
           <a:p>
             <a:r>
-              <a:rPr lang="en-US" smtClean="0"/>
+              <a:rPr lang="en-US"/>
               <a:t>Click to edit Master title style</a:t>
             </a:r>
-            <a:endParaRPr lang="en-US"/>
           </a:p>
         </p:txBody>
       </p:sp>
@@ -2493,7 +2490,7 @@
           <a:p>
             <a:pPr lvl="0"/>
             <a:r>
-              <a:rPr lang="en-US" smtClean="0"/>
+              <a:rPr lang="en-US"/>
               <a:t>Click to edit Master text styles</a:t>
             </a:r>
           </a:p>
@@ -2516,7 +2513,7 @@
           <a:p>
             <a:fld id="{5BCAD085-E8A6-8845-BD4E-CB4CCA059FC4}" type="datetimeFigureOut">
               <a:rPr lang="en-US" smtClean="0"/>
-              <a:t>1/27/13</a:t>
+              <a:t>1/17/2026</a:t>
             </a:fld>
             <a:endParaRPr lang="en-US"/>
           </a:p>
@@ -2625,10 +2622,9 @@
           <a:lstStyle/>
           <a:p>
             <a:r>
-              <a:rPr lang="en-US" smtClean="0"/>
+              <a:rPr lang="en-US"/>
               <a:t>Click to edit Master title style</a:t>
             </a:r>
-            <a:endParaRPr lang="en-US"/>
           </a:p>
         </p:txBody>
       </p:sp>
@@ -2659,38 +2655,37 @@
           <a:p>
             <a:pPr lvl="0"/>
             <a:r>
-              <a:rPr lang="en-US" smtClean="0"/>
+              <a:rPr lang="en-US"/>
               <a:t>Click to edit Master text styles</a:t>
             </a:r>
           </a:p>
           <a:p>
             <a:pPr lvl="1"/>
             <a:r>
-              <a:rPr lang="en-US" smtClean="0"/>
+              <a:rPr lang="en-US"/>
               <a:t>Second level</a:t>
             </a:r>
           </a:p>
           <a:p>
             <a:pPr lvl="2"/>
             <a:r>
-              <a:rPr lang="en-US" smtClean="0"/>
+              <a:rPr lang="en-US"/>
               <a:t>Third level</a:t>
             </a:r>
           </a:p>
           <a:p>
             <a:pPr lvl="3"/>
             <a:r>
-              <a:rPr lang="en-US" smtClean="0"/>
+              <a:rPr lang="en-US"/>
               <a:t>Fourth level</a:t>
             </a:r>
           </a:p>
           <a:p>
             <a:pPr lvl="4"/>
             <a:r>
-              <a:rPr lang="en-US" smtClean="0"/>
+              <a:rPr lang="en-US"/>
               <a:t>Fifth level</a:t>
             </a:r>
-            <a:endParaRPr lang="en-US"/>
           </a:p>
         </p:txBody>
       </p:sp>
@@ -2729,7 +2724,7 @@
           <a:p>
             <a:fld id="{5BCAD085-E8A6-8845-BD4E-CB4CCA059FC4}" type="datetimeFigureOut">
               <a:rPr lang="en-US" smtClean="0"/>
-              <a:t>1/27/13</a:t>
+              <a:t>1/17/2026</a:t>
             </a:fld>
             <a:endParaRPr lang="en-US"/>
           </a:p>
@@ -3088,7 +3083,7 @@
 </file>
 
 <file path=ppt/slides/slide1.xml><?xml version="1.0" encoding="utf-8"?>
-<p:sld xmlns:a="http://schemas.openxmlformats.org/drawingml/2006/main" xmlns:p="http://schemas.openxmlformats.org/presentationml/2006/main" xmlns:r="http://schemas.openxmlformats.org/officeDocument/2006/relationships">
+<p:sld xmlns:a="http://schemas.openxmlformats.org/drawingml/2006/main" xmlns:r="http://schemas.openxmlformats.org/officeDocument/2006/relationships" xmlns:p="http://schemas.openxmlformats.org/presentationml/2006/main">
   <p:cSld>
     <p:bg>
       <p:bgPr>
@@ -3104,7 +3099,14 @@
         <p:cNvGrpSpPr/>
         <p:nvPr/>
       </p:nvGrpSpPr>
-      <p:grpSpPr/>
+      <p:grpSpPr>
+        <a:xfrm>
+          <a:off x="0" y="0"/>
+          <a:ext cx="0" cy="0"/>
+          <a:chOff x="0" y="0"/>
+          <a:chExt cx="0" cy="0"/>
+        </a:xfrm>
+      </p:grpSpPr>
       <p:sp>
         <p:nvSpPr>
           <p:cNvPr id="2" name="Title 1"/>
@@ -3115,7 +3117,12 @@
             <p:ph type="ctrTitle"/>
           </p:nvPr>
         </p:nvSpPr>
-        <p:spPr/>
+        <p:spPr>
+          <a:xfrm>
+            <a:off x="685800" y="1501775"/>
+            <a:ext cx="7772400" cy="1470025"/>
+          </a:xfrm>
+        </p:spPr>
         <p:txBody>
           <a:bodyPr/>
           <a:lstStyle/>
@@ -3128,6 +3135,7 @@
               </a:defRPr>
             </a:pPr>
             <a:r>
+              <a:rPr dirty="0"/>
               <a:t>Car Retrieval System</a:t>
             </a:r>
           </a:p>
@@ -3143,9 +3151,16 @@
             <p:ph type="subTitle" idx="1"/>
           </p:nvPr>
         </p:nvSpPr>
-        <p:spPr/>
-        <p:txBody>
-          <a:bodyPr/>
+        <p:spPr>
+          <a:xfrm>
+            <a:off x="1371600" y="2971800"/>
+            <a:ext cx="6400800" cy="1752600"/>
+          </a:xfrm>
+        </p:spPr>
+        <p:txBody>
+          <a:bodyPr>
+            <a:normAutofit fontScale="92500"/>
+          </a:bodyPr>
           <a:lstStyle/>
           <a:p>
             <a:pPr>
@@ -3156,11 +3171,13 @@
               </a:defRPr>
             </a:pPr>
             <a:r>
+              <a:rPr dirty="0"/>
               <a:t>An End-to-End Deep Learning Approach for</a:t>
             </a:r>
           </a:p>
           <a:p>
             <a:r>
+              <a:rPr dirty="0"/>
               <a:t>Indonesian Vehicle Detection and Classification</a:t>
             </a:r>
           </a:p>
@@ -3175,7 +3192,7 @@
 </file>
 
 <file path=ppt/slides/slide10.xml><?xml version="1.0" encoding="utf-8"?>
-<p:sld xmlns:a="http://schemas.openxmlformats.org/drawingml/2006/main" xmlns:p="http://schemas.openxmlformats.org/presentationml/2006/main" xmlns:r="http://schemas.openxmlformats.org/officeDocument/2006/relationships">
+<p:sld xmlns:a="http://schemas.openxmlformats.org/drawingml/2006/main" xmlns:r="http://schemas.openxmlformats.org/officeDocument/2006/relationships" xmlns:p="http://schemas.openxmlformats.org/presentationml/2006/main">
   <p:cSld>
     <p:bg>
       <p:bgPr>
@@ -3191,7 +3208,14 @@
         <p:cNvGrpSpPr/>
         <p:nvPr/>
       </p:nvGrpSpPr>
-      <p:grpSpPr/>
+      <p:grpSpPr>
+        <a:xfrm>
+          <a:off x="0" y="0"/>
+          <a:ext cx="0" cy="0"/>
+          <a:chOff x="0" y="0"/>
+          <a:chExt cx="0" cy="0"/>
+        </a:xfrm>
+      </p:grpSpPr>
       <p:sp>
         <p:nvSpPr>
           <p:cNvPr id="2" name="Title 1"/>
@@ -3234,7 +3258,9 @@
         <p:txBody>
           <a:bodyPr/>
           <a:lstStyle/>
-          <a:p/>
+          <a:p>
+            <a:endParaRPr/>
+          </a:p>
         </p:txBody>
       </p:sp>
       <p:sp>
@@ -3258,13 +3284,15 @@
             <a:spAutoFit/>
           </a:bodyPr>
           <a:lstStyle/>
-          <a:p/>
+          <a:p>
+            <a:endParaRPr/>
+          </a:p>
           <a:p>
             <a:pPr>
               <a:spcAft>
                 <a:spcPts val="2000"/>
               </a:spcAft>
-              <a:defRPr b="1" sz="2800">
+              <a:defRPr sz="2800" b="1">
                 <a:solidFill>
                   <a:srgbClr val="268BD2"/>
                 </a:solidFill>
@@ -3342,13 +3370,15 @@
             <a:spAutoFit/>
           </a:bodyPr>
           <a:lstStyle/>
-          <a:p/>
+          <a:p>
+            <a:endParaRPr/>
+          </a:p>
           <a:p>
             <a:pPr>
               <a:spcAft>
                 <a:spcPts val="2000"/>
               </a:spcAft>
-              <a:defRPr b="1" sz="2800">
+              <a:defRPr sz="2800" b="1">
                 <a:solidFill>
                   <a:srgbClr val="268BD2"/>
                 </a:solidFill>
@@ -3414,7 +3444,7 @@
 </file>
 
 <file path=ppt/slides/slide2.xml><?xml version="1.0" encoding="utf-8"?>
-<p:sld xmlns:a="http://schemas.openxmlformats.org/drawingml/2006/main" xmlns:p="http://schemas.openxmlformats.org/presentationml/2006/main" xmlns:r="http://schemas.openxmlformats.org/officeDocument/2006/relationships">
+<p:sld xmlns:a="http://schemas.openxmlformats.org/drawingml/2006/main" xmlns:r="http://schemas.openxmlformats.org/officeDocument/2006/relationships" xmlns:p="http://schemas.openxmlformats.org/presentationml/2006/main">
   <p:cSld>
     <p:bg>
       <p:bgPr>
@@ -3430,7 +3460,14 @@
         <p:cNvGrpSpPr/>
         <p:nvPr/>
       </p:nvGrpSpPr>
-      <p:grpSpPr/>
+      <p:grpSpPr>
+        <a:xfrm>
+          <a:off x="0" y="0"/>
+          <a:ext cx="0" cy="0"/>
+          <a:chOff x="0" y="0"/>
+          <a:chExt cx="0" cy="0"/>
+        </a:xfrm>
+      </p:grpSpPr>
       <p:sp>
         <p:nvSpPr>
           <p:cNvPr id="2" name="Title 1"/>
@@ -3473,7 +3510,9 @@
         <p:txBody>
           <a:bodyPr/>
           <a:lstStyle/>
-          <a:p/>
+          <a:p>
+            <a:endParaRPr/>
+          </a:p>
         </p:txBody>
       </p:sp>
       <p:sp>
@@ -3497,13 +3536,15 @@
             <a:spAutoFit/>
           </a:bodyPr>
           <a:lstStyle/>
-          <a:p/>
+          <a:p>
+            <a:endParaRPr/>
+          </a:p>
           <a:p>
             <a:pPr>
               <a:spcAft>
                 <a:spcPts val="2000"/>
               </a:spcAft>
-              <a:defRPr b="1" sz="2800">
+              <a:defRPr sz="2800" b="1">
                 <a:solidFill>
                   <a:srgbClr val="268BD2"/>
                 </a:solidFill>
@@ -3581,13 +3622,15 @@
             <a:spAutoFit/>
           </a:bodyPr>
           <a:lstStyle/>
-          <a:p/>
+          <a:p>
+            <a:endParaRPr/>
+          </a:p>
           <a:p>
             <a:pPr>
               <a:spcAft>
                 <a:spcPts val="2000"/>
               </a:spcAft>
-              <a:defRPr b="1" sz="2800">
+              <a:defRPr sz="2800" b="1">
                 <a:solidFill>
                   <a:srgbClr val="268BD2"/>
                 </a:solidFill>
@@ -3653,7 +3696,7 @@
 </file>
 
 <file path=ppt/slides/slide3.xml><?xml version="1.0" encoding="utf-8"?>
-<p:sld xmlns:a="http://schemas.openxmlformats.org/drawingml/2006/main" xmlns:p="http://schemas.openxmlformats.org/presentationml/2006/main" xmlns:r="http://schemas.openxmlformats.org/officeDocument/2006/relationships">
+<p:sld xmlns:a="http://schemas.openxmlformats.org/drawingml/2006/main" xmlns:r="http://schemas.openxmlformats.org/officeDocument/2006/relationships" xmlns:p="http://schemas.openxmlformats.org/presentationml/2006/main">
   <p:cSld>
     <p:bg>
       <p:bgPr>
@@ -3669,7 +3712,14 @@
         <p:cNvGrpSpPr/>
         <p:nvPr/>
       </p:nvGrpSpPr>
-      <p:grpSpPr/>
+      <p:grpSpPr>
+        <a:xfrm>
+          <a:off x="0" y="0"/>
+          <a:ext cx="0" cy="0"/>
+          <a:chOff x="0" y="0"/>
+          <a:chExt cx="0" cy="0"/>
+        </a:xfrm>
+      </p:grpSpPr>
       <p:sp>
         <p:nvSpPr>
           <p:cNvPr id="2" name="Title 1"/>
@@ -3706,8 +3756,8 @@
         </p:nvSpPr>
         <p:spPr>
           <a:xfrm>
-            <a:off x="365760" y="3200400"/>
-            <a:ext cx="1463040" cy="1097280"/>
+            <a:off x="256032" y="3200400"/>
+            <a:ext cx="1572768" cy="1143000"/>
           </a:xfrm>
           <a:prstGeom prst="roundRect">
             <a:avLst/>
@@ -3739,9 +3789,6 @@
           <a:bodyPr rtlCol="0" anchor="ctr"/>
           <a:lstStyle/>
           <a:p>
-            <a:pPr algn="ctr"/>
-          </a:p>
-          <a:p>
             <a:pPr algn="ctr">
               <a:defRPr b="1">
                 <a:solidFill>
@@ -3750,10 +3797,14 @@
               </a:defRPr>
             </a:pPr>
             <a:r>
+              <a:rPr dirty="0"/>
               <a:t>Input</a:t>
             </a:r>
-            <a:br/>
-            <a:r>
+            <a:br>
+              <a:rPr dirty="0"/>
+            </a:br>
+            <a:r>
+              <a:rPr dirty="0"/>
               <a:t>Video/Image</a:t>
             </a:r>
           </a:p>
@@ -3799,6 +3850,7 @@
           <a:lstStyle/>
           <a:p>
             <a:pPr algn="ctr"/>
+            <a:endParaRPr/>
           </a:p>
         </p:txBody>
       </p:sp>
@@ -3844,6 +3896,7 @@
           <a:lstStyle/>
           <a:p>
             <a:pPr algn="ctr"/>
+            <a:endParaRPr/>
           </a:p>
           <a:p>
             <a:pPr algn="ctr">
@@ -3903,6 +3956,7 @@
           <a:lstStyle/>
           <a:p>
             <a:pPr algn="ctr"/>
+            <a:endParaRPr/>
           </a:p>
         </p:txBody>
       </p:sp>
@@ -3948,6 +4002,7 @@
           <a:lstStyle/>
           <a:p>
             <a:pPr algn="ctr"/>
+            <a:endParaRPr/>
           </a:p>
           <a:p>
             <a:pPr algn="ctr">
@@ -4007,6 +4062,7 @@
           <a:lstStyle/>
           <a:p>
             <a:pPr algn="ctr"/>
+            <a:endParaRPr/>
           </a:p>
         </p:txBody>
       </p:sp>
@@ -4052,6 +4108,7 @@
           <a:lstStyle/>
           <a:p>
             <a:pPr algn="ctr"/>
+            <a:endParaRPr/>
           </a:p>
           <a:p>
             <a:pPr algn="ctr">
@@ -4111,6 +4168,7 @@
           <a:lstStyle/>
           <a:p>
             <a:pPr algn="ctr"/>
+            <a:endParaRPr/>
           </a:p>
         </p:txBody>
       </p:sp>
@@ -4123,7 +4181,7 @@
         <p:spPr>
           <a:xfrm>
             <a:off x="7315200" y="3200400"/>
-            <a:ext cx="1463040" cy="1097280"/>
+            <a:ext cx="1673352" cy="1097280"/>
           </a:xfrm>
           <a:prstGeom prst="roundRect">
             <a:avLst/>
@@ -4155,9 +4213,6 @@
           <a:bodyPr rtlCol="0" anchor="ctr"/>
           <a:lstStyle/>
           <a:p>
-            <a:pPr algn="ctr"/>
-          </a:p>
-          <a:p>
             <a:pPr algn="ctr">
               <a:defRPr b="1">
                 <a:solidFill>
@@ -4166,12 +4221,17 @@
               </a:defRPr>
             </a:pPr>
             <a:r>
+              <a:rPr dirty="0"/>
               <a:t>Output</a:t>
             </a:r>
-            <a:br/>
-            <a:r>
+            <a:br>
+              <a:rPr dirty="0"/>
+            </a:br>
+            <a:r>
+              <a:rPr dirty="0" err="1"/>
               <a:t>Annnotations</a:t>
             </a:r>
+            <a:endParaRPr dirty="0"/>
           </a:p>
         </p:txBody>
       </p:sp>
@@ -4184,7 +4244,7 @@
 </file>
 
 <file path=ppt/slides/slide4.xml><?xml version="1.0" encoding="utf-8"?>
-<p:sld xmlns:a="http://schemas.openxmlformats.org/drawingml/2006/main" xmlns:p="http://schemas.openxmlformats.org/presentationml/2006/main" xmlns:r="http://schemas.openxmlformats.org/officeDocument/2006/relationships">
+<p:sld xmlns:a="http://schemas.openxmlformats.org/drawingml/2006/main" xmlns:r="http://schemas.openxmlformats.org/officeDocument/2006/relationships" xmlns:p="http://schemas.openxmlformats.org/presentationml/2006/main">
   <p:cSld>
     <p:bg>
       <p:bgPr>
@@ -4200,7 +4260,14 @@
         <p:cNvGrpSpPr/>
         <p:nvPr/>
       </p:nvGrpSpPr>
-      <p:grpSpPr/>
+      <p:grpSpPr>
+        <a:xfrm>
+          <a:off x="0" y="0"/>
+          <a:ext cx="0" cy="0"/>
+          <a:chOff x="0" y="0"/>
+          <a:chExt cx="0" cy="0"/>
+        </a:xfrm>
+      </p:grpSpPr>
       <p:sp>
         <p:nvSpPr>
           <p:cNvPr id="2" name="Title 1"/>
@@ -4237,7 +4304,7 @@
         </p:nvSpPr>
         <p:spPr>
           <a:xfrm>
-            <a:off x="457200" y="2286000"/>
+            <a:off x="365760" y="2286000"/>
             <a:ext cx="2011680" cy="1371600"/>
           </a:xfrm>
           <a:prstGeom prst="roundRect">
@@ -4271,6 +4338,7 @@
           <a:lstStyle/>
           <a:p>
             <a:pPr algn="ctr"/>
+            <a:endParaRPr/>
           </a:p>
         </p:txBody>
       </p:sp>
@@ -4282,7 +4350,7 @@
         </p:nvSpPr>
         <p:spPr>
           <a:xfrm>
-            <a:off x="457200" y="2514600"/>
+            <a:off x="365760" y="2514600"/>
             <a:ext cx="2011680" cy="731520"/>
           </a:xfrm>
           <a:prstGeom prst="rect">
@@ -4297,13 +4365,14 @@
           <a:lstStyle/>
           <a:p>
             <a:pPr algn="ctr">
-              <a:defRPr b="1" sz="3200">
+              <a:defRPr sz="3200" b="1">
                 <a:solidFill>
                   <a:srgbClr val="D33682"/>
                 </a:solidFill>
               </a:defRPr>
             </a:pPr>
             <a:r>
+              <a:rPr dirty="0"/>
               <a:t>17,171</a:t>
             </a:r>
           </a:p>
@@ -4317,7 +4386,7 @@
         </p:nvSpPr>
         <p:spPr>
           <a:xfrm>
-            <a:off x="457200" y="3063240"/>
+            <a:off x="365760" y="3063240"/>
             <a:ext cx="2011680" cy="457200"/>
           </a:xfrm>
           <a:prstGeom prst="rect">
@@ -4339,6 +4408,7 @@
               </a:defRPr>
             </a:pPr>
             <a:r>
+              <a:rPr dirty="0"/>
               <a:t>Total Images</a:t>
             </a:r>
           </a:p>
@@ -4352,7 +4422,7 @@
         </p:nvSpPr>
         <p:spPr>
           <a:xfrm>
-            <a:off x="2697480" y="2286000"/>
+            <a:off x="2606040" y="2286000"/>
             <a:ext cx="2011680" cy="1371600"/>
           </a:xfrm>
           <a:prstGeom prst="roundRect">
@@ -4386,6 +4456,7 @@
           <a:lstStyle/>
           <a:p>
             <a:pPr algn="ctr"/>
+            <a:endParaRPr/>
           </a:p>
         </p:txBody>
       </p:sp>
@@ -4397,7 +4468,7 @@
         </p:nvSpPr>
         <p:spPr>
           <a:xfrm>
-            <a:off x="2697480" y="2514600"/>
+            <a:off x="2606040" y="2514600"/>
             <a:ext cx="2011680" cy="731520"/>
           </a:xfrm>
           <a:prstGeom prst="rect">
@@ -4412,13 +4483,14 @@
           <a:lstStyle/>
           <a:p>
             <a:pPr algn="ctr">
-              <a:defRPr b="1" sz="3200">
+              <a:defRPr sz="3200" b="1">
                 <a:solidFill>
                   <a:srgbClr val="D33682"/>
                 </a:solidFill>
               </a:defRPr>
             </a:pPr>
             <a:r>
+              <a:rPr dirty="0"/>
               <a:t>8</a:t>
             </a:r>
           </a:p>
@@ -4432,7 +4504,7 @@
         </p:nvSpPr>
         <p:spPr>
           <a:xfrm>
-            <a:off x="2697480" y="3063240"/>
+            <a:off x="2606040" y="3063240"/>
             <a:ext cx="2011680" cy="457200"/>
           </a:xfrm>
           <a:prstGeom prst="rect">
@@ -4454,6 +4526,7 @@
               </a:defRPr>
             </a:pPr>
             <a:r>
+              <a:rPr dirty="0"/>
               <a:t>Car Types</a:t>
             </a:r>
           </a:p>
@@ -4467,7 +4540,7 @@
         </p:nvSpPr>
         <p:spPr>
           <a:xfrm>
-            <a:off x="4937760" y="2286000"/>
+            <a:off x="4818888" y="2286000"/>
             <a:ext cx="2011680" cy="1371600"/>
           </a:xfrm>
           <a:prstGeom prst="roundRect">
@@ -4501,6 +4574,7 @@
           <a:lstStyle/>
           <a:p>
             <a:pPr algn="ctr"/>
+            <a:endParaRPr dirty="0"/>
           </a:p>
         </p:txBody>
       </p:sp>
@@ -4512,7 +4586,7 @@
         </p:nvSpPr>
         <p:spPr>
           <a:xfrm>
-            <a:off x="4937760" y="2514600"/>
+            <a:off x="4846320" y="2514600"/>
             <a:ext cx="2011680" cy="731520"/>
           </a:xfrm>
           <a:prstGeom prst="rect">
@@ -4527,13 +4601,14 @@
           <a:lstStyle/>
           <a:p>
             <a:pPr algn="ctr">
-              <a:defRPr b="1" sz="3200">
+              <a:defRPr sz="3200" b="1">
                 <a:solidFill>
                   <a:srgbClr val="D33682"/>
                 </a:solidFill>
               </a:defRPr>
             </a:pPr>
             <a:r>
+              <a:rPr dirty="0"/>
               <a:t>13,542</a:t>
             </a:r>
           </a:p>
@@ -4547,7 +4622,7 @@
         </p:nvSpPr>
         <p:spPr>
           <a:xfrm>
-            <a:off x="4937760" y="3063240"/>
+            <a:off x="4878324" y="3063240"/>
             <a:ext cx="2011680" cy="457200"/>
           </a:xfrm>
           <a:prstGeom prst="rect">
@@ -4569,6 +4644,7 @@
               </a:defRPr>
             </a:pPr>
             <a:r>
+              <a:rPr dirty="0"/>
               <a:t>Train Samples</a:t>
             </a:r>
           </a:p>
@@ -4582,7 +4658,7 @@
         </p:nvSpPr>
         <p:spPr>
           <a:xfrm>
-            <a:off x="7178040" y="2286000"/>
+            <a:off x="7008876" y="2286000"/>
             <a:ext cx="2011680" cy="1371600"/>
           </a:xfrm>
           <a:prstGeom prst="roundRect">
@@ -4616,6 +4692,7 @@
           <a:lstStyle/>
           <a:p>
             <a:pPr algn="ctr"/>
+            <a:endParaRPr/>
           </a:p>
         </p:txBody>
       </p:sp>
@@ -4627,7 +4704,7 @@
         </p:nvSpPr>
         <p:spPr>
           <a:xfrm>
-            <a:off x="7178040" y="2514600"/>
+            <a:off x="6949440" y="2532888"/>
             <a:ext cx="2011680" cy="731520"/>
           </a:xfrm>
           <a:prstGeom prst="rect">
@@ -4642,13 +4719,14 @@
           <a:lstStyle/>
           <a:p>
             <a:pPr algn="ctr">
-              <a:defRPr b="1" sz="3200">
+              <a:defRPr sz="3200" b="1">
                 <a:solidFill>
                   <a:srgbClr val="D33682"/>
                 </a:solidFill>
               </a:defRPr>
             </a:pPr>
             <a:r>
+              <a:rPr dirty="0"/>
               <a:t>1,756</a:t>
             </a:r>
           </a:p>
@@ -4662,7 +4740,7 @@
         </p:nvSpPr>
         <p:spPr>
           <a:xfrm>
-            <a:off x="7178040" y="3063240"/>
+            <a:off x="6981444" y="3063240"/>
             <a:ext cx="2011680" cy="457200"/>
           </a:xfrm>
           <a:prstGeom prst="rect">
@@ -4684,6 +4762,7 @@
               </a:defRPr>
             </a:pPr>
             <a:r>
+              <a:rPr dirty="0"/>
               <a:t>Test Samples</a:t>
             </a:r>
           </a:p>
@@ -4698,7 +4777,7 @@
 </file>
 
 <file path=ppt/slides/slide5.xml><?xml version="1.0" encoding="utf-8"?>
-<p:sld xmlns:a="http://schemas.openxmlformats.org/drawingml/2006/main" xmlns:p="http://schemas.openxmlformats.org/presentationml/2006/main" xmlns:r="http://schemas.openxmlformats.org/officeDocument/2006/relationships">
+<p:sld xmlns:a="http://schemas.openxmlformats.org/drawingml/2006/main" xmlns:r="http://schemas.openxmlformats.org/officeDocument/2006/relationships" xmlns:p="http://schemas.openxmlformats.org/presentationml/2006/main">
   <p:cSld>
     <p:bg>
       <p:bgPr>
@@ -4714,7 +4793,14 @@
         <p:cNvGrpSpPr/>
         <p:nvPr/>
       </p:nvGrpSpPr>
-      <p:grpSpPr/>
+      <p:grpSpPr>
+        <a:xfrm>
+          <a:off x="0" y="0"/>
+          <a:ext cx="0" cy="0"/>
+          <a:chOff x="0" y="0"/>
+          <a:chExt cx="0" cy="0"/>
+        </a:xfrm>
+      </p:grpSpPr>
       <p:sp>
         <p:nvSpPr>
           <p:cNvPr id="2" name="Title 1"/>
@@ -4757,7 +4843,9 @@
         <p:txBody>
           <a:bodyPr/>
           <a:lstStyle/>
-          <a:p/>
+          <a:p>
+            <a:endParaRPr/>
+          </a:p>
           <a:p>
             <a:pPr>
               <a:spcAft>
@@ -4844,7 +4932,7 @@
 </file>
 
 <file path=ppt/slides/slide6.xml><?xml version="1.0" encoding="utf-8"?>
-<p:sld xmlns:a="http://schemas.openxmlformats.org/drawingml/2006/main" xmlns:p="http://schemas.openxmlformats.org/presentationml/2006/main" xmlns:r="http://schemas.openxmlformats.org/officeDocument/2006/relationships">
+<p:sld xmlns:a="http://schemas.openxmlformats.org/drawingml/2006/main" xmlns:r="http://schemas.openxmlformats.org/officeDocument/2006/relationships" xmlns:p="http://schemas.openxmlformats.org/presentationml/2006/main">
   <p:cSld>
     <p:bg>
       <p:bgPr>
@@ -4860,7 +4948,14 @@
         <p:cNvGrpSpPr/>
         <p:nvPr/>
       </p:nvGrpSpPr>
-      <p:grpSpPr/>
+      <p:grpSpPr>
+        <a:xfrm>
+          <a:off x="0" y="0"/>
+          <a:ext cx="0" cy="0"/>
+          <a:chOff x="0" y="0"/>
+          <a:chExt cx="0" cy="0"/>
+        </a:xfrm>
+      </p:grpSpPr>
       <p:sp>
         <p:nvSpPr>
           <p:cNvPr id="2" name="Title 1"/>
@@ -4897,7 +4992,7 @@
         </p:nvSpPr>
         <p:spPr>
           <a:xfrm>
-            <a:off x="457200" y="2286000"/>
+            <a:off x="228600" y="2286000"/>
             <a:ext cx="2011680" cy="1371600"/>
           </a:xfrm>
           <a:prstGeom prst="roundRect">
@@ -4931,6 +5026,7 @@
           <a:lstStyle/>
           <a:p>
             <a:pPr algn="ctr"/>
+            <a:endParaRPr/>
           </a:p>
         </p:txBody>
       </p:sp>
@@ -4942,7 +5038,7 @@
         </p:nvSpPr>
         <p:spPr>
           <a:xfrm>
-            <a:off x="457200" y="2514600"/>
+            <a:off x="228600" y="2514600"/>
             <a:ext cx="2011680" cy="731520"/>
           </a:xfrm>
           <a:prstGeom prst="rect">
@@ -4957,13 +5053,14 @@
           <a:lstStyle/>
           <a:p>
             <a:pPr algn="ctr">
-              <a:defRPr b="1" sz="3200">
+              <a:defRPr sz="3200" b="1">
                 <a:solidFill>
                   <a:srgbClr val="D33682"/>
                 </a:solidFill>
               </a:defRPr>
             </a:pPr>
             <a:r>
+              <a:rPr dirty="0"/>
               <a:t>86.33%</a:t>
             </a:r>
           </a:p>
@@ -4977,7 +5074,7 @@
         </p:nvSpPr>
         <p:spPr>
           <a:xfrm>
-            <a:off x="457200" y="3063240"/>
+            <a:off x="228600" y="3054096"/>
             <a:ext cx="2011680" cy="457200"/>
           </a:xfrm>
           <a:prstGeom prst="rect">
@@ -4999,6 +5096,7 @@
               </a:defRPr>
             </a:pPr>
             <a:r>
+              <a:rPr dirty="0"/>
               <a:t>Test Accuracy</a:t>
             </a:r>
           </a:p>
@@ -5012,7 +5110,7 @@
         </p:nvSpPr>
         <p:spPr>
           <a:xfrm>
-            <a:off x="2697480" y="2286000"/>
+            <a:off x="2468880" y="2286001"/>
             <a:ext cx="2011680" cy="1371600"/>
           </a:xfrm>
           <a:prstGeom prst="roundRect">
@@ -5046,6 +5144,7 @@
           <a:lstStyle/>
           <a:p>
             <a:pPr algn="ctr"/>
+            <a:endParaRPr/>
           </a:p>
         </p:txBody>
       </p:sp>
@@ -5057,7 +5156,7 @@
         </p:nvSpPr>
         <p:spPr>
           <a:xfrm>
-            <a:off x="2697480" y="2514600"/>
+            <a:off x="2468880" y="2542032"/>
             <a:ext cx="2011680" cy="731520"/>
           </a:xfrm>
           <a:prstGeom prst="rect">
@@ -5072,13 +5171,14 @@
           <a:lstStyle/>
           <a:p>
             <a:pPr algn="ctr">
-              <a:defRPr b="1" sz="3200">
+              <a:defRPr sz="3200" b="1">
                 <a:solidFill>
                   <a:srgbClr val="D33682"/>
                 </a:solidFill>
               </a:defRPr>
             </a:pPr>
             <a:r>
+              <a:rPr dirty="0"/>
               <a:t>86.53%</a:t>
             </a:r>
           </a:p>
@@ -5092,7 +5192,7 @@
         </p:nvSpPr>
         <p:spPr>
           <a:xfrm>
-            <a:off x="2697480" y="3063240"/>
+            <a:off x="2468880" y="3054096"/>
             <a:ext cx="2011680" cy="457200"/>
           </a:xfrm>
           <a:prstGeom prst="rect">
@@ -5114,6 +5214,7 @@
               </a:defRPr>
             </a:pPr>
             <a:r>
+              <a:rPr dirty="0"/>
               <a:t>Precision</a:t>
             </a:r>
           </a:p>
@@ -5127,7 +5228,7 @@
         </p:nvSpPr>
         <p:spPr>
           <a:xfrm>
-            <a:off x="4937760" y="2286000"/>
+            <a:off x="4709160" y="2286001"/>
             <a:ext cx="2011680" cy="1371600"/>
           </a:xfrm>
           <a:prstGeom prst="roundRect">
@@ -5161,6 +5262,7 @@
           <a:lstStyle/>
           <a:p>
             <a:pPr algn="ctr"/>
+            <a:endParaRPr/>
           </a:p>
         </p:txBody>
       </p:sp>
@@ -5172,7 +5274,7 @@
         </p:nvSpPr>
         <p:spPr>
           <a:xfrm>
-            <a:off x="4937760" y="2514600"/>
+            <a:off x="4709160" y="2514600"/>
             <a:ext cx="2011680" cy="731520"/>
           </a:xfrm>
           <a:prstGeom prst="rect">
@@ -5187,13 +5289,14 @@
           <a:lstStyle/>
           <a:p>
             <a:pPr algn="ctr">
-              <a:defRPr b="1" sz="3200">
+              <a:defRPr sz="3200" b="1">
                 <a:solidFill>
                   <a:srgbClr val="D33682"/>
                 </a:solidFill>
               </a:defRPr>
             </a:pPr>
             <a:r>
+              <a:rPr dirty="0"/>
               <a:t>86.34%</a:t>
             </a:r>
           </a:p>
@@ -5207,7 +5310,7 @@
         </p:nvSpPr>
         <p:spPr>
           <a:xfrm>
-            <a:off x="4937760" y="3063240"/>
+            <a:off x="4709160" y="3054096"/>
             <a:ext cx="2011680" cy="457200"/>
           </a:xfrm>
           <a:prstGeom prst="rect">
@@ -5229,6 +5332,7 @@
               </a:defRPr>
             </a:pPr>
             <a:r>
+              <a:rPr dirty="0"/>
               <a:t>F1-Score</a:t>
             </a:r>
           </a:p>
@@ -5242,7 +5346,7 @@
         </p:nvSpPr>
         <p:spPr>
           <a:xfrm>
-            <a:off x="7178040" y="2286000"/>
+            <a:off x="6949440" y="2286001"/>
             <a:ext cx="2011680" cy="1371600"/>
           </a:xfrm>
           <a:prstGeom prst="roundRect">
@@ -5276,6 +5380,7 @@
           <a:lstStyle/>
           <a:p>
             <a:pPr algn="ctr"/>
+            <a:endParaRPr dirty="0"/>
           </a:p>
         </p:txBody>
       </p:sp>
@@ -5287,7 +5392,7 @@
         </p:nvSpPr>
         <p:spPr>
           <a:xfrm>
-            <a:off x="7178040" y="2514600"/>
+            <a:off x="6949440" y="2519173"/>
             <a:ext cx="2011680" cy="731520"/>
           </a:xfrm>
           <a:prstGeom prst="rect">
@@ -5302,13 +5407,14 @@
           <a:lstStyle/>
           <a:p>
             <a:pPr algn="ctr">
-              <a:defRPr b="1" sz="3200">
+              <a:defRPr sz="3200" b="1">
                 <a:solidFill>
                   <a:srgbClr val="D33682"/>
                 </a:solidFill>
               </a:defRPr>
             </a:pPr>
             <a:r>
+              <a:rPr dirty="0"/>
               <a:t>13.6</a:t>
             </a:r>
           </a:p>
@@ -5322,7 +5428,7 @@
         </p:nvSpPr>
         <p:spPr>
           <a:xfrm>
-            <a:off x="7178040" y="3063240"/>
+            <a:off x="6949440" y="3063240"/>
             <a:ext cx="2011680" cy="457200"/>
           </a:xfrm>
           <a:prstGeom prst="rect">
@@ -5344,6 +5450,7 @@
               </a:defRPr>
             </a:pPr>
             <a:r>
+              <a:rPr dirty="0"/>
               <a:t>Video FPS</a:t>
             </a:r>
           </a:p>
@@ -5358,7 +5465,7 @@
 </file>
 
 <file path=ppt/slides/slide7.xml><?xml version="1.0" encoding="utf-8"?>
-<p:sld xmlns:a="http://schemas.openxmlformats.org/drawingml/2006/main" xmlns:p="http://schemas.openxmlformats.org/presentationml/2006/main" xmlns:r="http://schemas.openxmlformats.org/officeDocument/2006/relationships">
+<p:sld xmlns:a="http://schemas.openxmlformats.org/drawingml/2006/main" xmlns:r="http://schemas.openxmlformats.org/officeDocument/2006/relationships" xmlns:p="http://schemas.openxmlformats.org/presentationml/2006/main">
   <p:cSld>
     <p:bg>
       <p:bgPr>
@@ -5374,7 +5481,14 @@
         <p:cNvGrpSpPr/>
         <p:nvPr/>
       </p:nvGrpSpPr>
-      <p:grpSpPr/>
+      <p:grpSpPr>
+        <a:xfrm>
+          <a:off x="0" y="0"/>
+          <a:ext cx="0" cy="0"/>
+          <a:chOff x="0" y="0"/>
+          <a:chExt cx="0" cy="0"/>
+        </a:xfrm>
+      </p:grpSpPr>
       <p:sp>
         <p:nvSpPr>
           <p:cNvPr id="2" name="Title 1"/>
@@ -5419,8 +5533,8 @@
         </p:blipFill>
         <p:spPr>
           <a:xfrm>
-            <a:off x="-820209" y="1828800"/>
-            <a:ext cx="10784419" cy="4114800"/>
+            <a:off x="513439" y="1828800"/>
+            <a:ext cx="8117121" cy="3097091"/>
           </a:xfrm>
           <a:prstGeom prst="rect">
             <a:avLst/>
@@ -5435,7 +5549,7 @@
         </p:nvSpPr>
         <p:spPr>
           <a:xfrm>
-            <a:off x="914400" y="6035040"/>
+            <a:off x="914399" y="5212080"/>
             <a:ext cx="7315200" cy="914400"/>
           </a:xfrm>
           <a:prstGeom prst="rect">
@@ -5448,7 +5562,9 @@
             <a:spAutoFit/>
           </a:bodyPr>
           <a:lstStyle/>
-          <a:p/>
+          <a:p>
+            <a:endParaRPr/>
+          </a:p>
           <a:p>
             <a:pPr algn="ctr">
               <a:defRPr sz="1600">
@@ -5472,7 +5588,7 @@
 </file>
 
 <file path=ppt/slides/slide8.xml><?xml version="1.0" encoding="utf-8"?>
-<p:sld xmlns:a="http://schemas.openxmlformats.org/drawingml/2006/main" xmlns:p="http://schemas.openxmlformats.org/presentationml/2006/main" xmlns:r="http://schemas.openxmlformats.org/officeDocument/2006/relationships">
+<p:sld xmlns:a="http://schemas.openxmlformats.org/drawingml/2006/main" xmlns:r="http://schemas.openxmlformats.org/officeDocument/2006/relationships" xmlns:p="http://schemas.openxmlformats.org/presentationml/2006/main">
   <p:cSld>
     <p:bg>
       <p:bgPr>
@@ -5488,7 +5604,14 @@
         <p:cNvGrpSpPr/>
         <p:nvPr/>
       </p:nvGrpSpPr>
-      <p:grpSpPr/>
+      <p:grpSpPr>
+        <a:xfrm>
+          <a:off x="0" y="0"/>
+          <a:ext cx="0" cy="0"/>
+          <a:chOff x="0" y="0"/>
+          <a:chExt cx="0" cy="0"/>
+        </a:xfrm>
+      </p:grpSpPr>
       <p:sp>
         <p:nvSpPr>
           <p:cNvPr id="2" name="Title 1"/>
@@ -5562,7 +5685,9 @@
             <a:spAutoFit/>
           </a:bodyPr>
           <a:lstStyle/>
-          <a:p/>
+          <a:p>
+            <a:endParaRPr/>
+          </a:p>
           <a:p>
             <a:pPr algn="ctr">
               <a:defRPr sz="1600">
@@ -5586,7 +5711,7 @@
 </file>
 
 <file path=ppt/slides/slide9.xml><?xml version="1.0" encoding="utf-8"?>
-<p:sld xmlns:a="http://schemas.openxmlformats.org/drawingml/2006/main" xmlns:p="http://schemas.openxmlformats.org/presentationml/2006/main" xmlns:r="http://schemas.openxmlformats.org/officeDocument/2006/relationships">
+<p:sld xmlns:a="http://schemas.openxmlformats.org/drawingml/2006/main" xmlns:r="http://schemas.openxmlformats.org/officeDocument/2006/relationships" xmlns:p="http://schemas.openxmlformats.org/presentationml/2006/main">
   <p:cSld>
     <p:bg>
       <p:bgPr>
@@ -5602,7 +5727,14 @@
         <p:cNvGrpSpPr/>
         <p:nvPr/>
       </p:nvGrpSpPr>
-      <p:grpSpPr/>
+      <p:grpSpPr>
+        <a:xfrm>
+          <a:off x="0" y="0"/>
+          <a:ext cx="0" cy="0"/>
+          <a:chOff x="0" y="0"/>
+          <a:chExt cx="0" cy="0"/>
+        </a:xfrm>
+      </p:grpSpPr>
       <p:sp>
         <p:nvSpPr>
           <p:cNvPr id="2" name="Title 1"/>
@@ -5639,7 +5771,7 @@
         </p:nvSpPr>
         <p:spPr>
           <a:xfrm>
-            <a:off x="457200" y="2286000"/>
+            <a:off x="329184" y="2286000"/>
             <a:ext cx="2011680" cy="1371600"/>
           </a:xfrm>
           <a:prstGeom prst="roundRect">
@@ -5673,6 +5805,7 @@
           <a:lstStyle/>
           <a:p>
             <a:pPr algn="ctr"/>
+            <a:endParaRPr/>
           </a:p>
         </p:txBody>
       </p:sp>
@@ -5684,7 +5817,7 @@
         </p:nvSpPr>
         <p:spPr>
           <a:xfrm>
-            <a:off x="457200" y="2514600"/>
+            <a:off x="329184" y="2514600"/>
             <a:ext cx="2011680" cy="731520"/>
           </a:xfrm>
           <a:prstGeom prst="rect">
@@ -5699,13 +5832,14 @@
           <a:lstStyle/>
           <a:p>
             <a:pPr algn="ctr">
-              <a:defRPr b="1" sz="3200">
+              <a:defRPr sz="3200" b="1">
                 <a:solidFill>
                   <a:srgbClr val="D33682"/>
                 </a:solidFill>
               </a:defRPr>
             </a:pPr>
             <a:r>
+              <a:rPr dirty="0"/>
               <a:t>2,960</a:t>
             </a:r>
           </a:p>
@@ -5719,7 +5853,7 @@
         </p:nvSpPr>
         <p:spPr>
           <a:xfrm>
-            <a:off x="457200" y="3063240"/>
+            <a:off x="356616" y="3063240"/>
             <a:ext cx="2011680" cy="457200"/>
           </a:xfrm>
           <a:prstGeom prst="rect">
@@ -5741,6 +5875,7 @@
               </a:defRPr>
             </a:pPr>
             <a:r>
+              <a:rPr dirty="0"/>
               <a:t>Frames Processed</a:t>
             </a:r>
           </a:p>
@@ -5754,7 +5889,7 @@
         </p:nvSpPr>
         <p:spPr>
           <a:xfrm>
-            <a:off x="2697480" y="2286000"/>
+            <a:off x="2569464" y="2286000"/>
             <a:ext cx="2011680" cy="1371600"/>
           </a:xfrm>
           <a:prstGeom prst="roundRect">
@@ -5788,6 +5923,7 @@
           <a:lstStyle/>
           <a:p>
             <a:pPr algn="ctr"/>
+            <a:endParaRPr/>
           </a:p>
         </p:txBody>
       </p:sp>
@@ -5799,7 +5935,7 @@
         </p:nvSpPr>
         <p:spPr>
           <a:xfrm>
-            <a:off x="2697480" y="2514600"/>
+            <a:off x="2542032" y="2514600"/>
             <a:ext cx="2011680" cy="731520"/>
           </a:xfrm>
           <a:prstGeom prst="rect">
@@ -5814,13 +5950,14 @@
           <a:lstStyle/>
           <a:p>
             <a:pPr algn="ctr">
-              <a:defRPr b="1" sz="3200">
+              <a:defRPr sz="3200" b="1">
                 <a:solidFill>
                   <a:srgbClr val="D33682"/>
                 </a:solidFill>
               </a:defRPr>
             </a:pPr>
             <a:r>
+              <a:rPr dirty="0"/>
               <a:t>73.7ms</a:t>
             </a:r>
           </a:p>
@@ -5834,7 +5971,7 @@
         </p:nvSpPr>
         <p:spPr>
           <a:xfrm>
-            <a:off x="2697480" y="3063240"/>
+            <a:off x="2542032" y="3063240"/>
             <a:ext cx="2011680" cy="457200"/>
           </a:xfrm>
           <a:prstGeom prst="rect">
@@ -5856,6 +5993,7 @@
               </a:defRPr>
             </a:pPr>
             <a:r>
+              <a:rPr dirty="0"/>
               <a:t>Latency/Frame</a:t>
             </a:r>
           </a:p>
@@ -5869,7 +6007,7 @@
         </p:nvSpPr>
         <p:spPr>
           <a:xfrm>
-            <a:off x="4937760" y="2286000"/>
+            <a:off x="4809744" y="2286000"/>
             <a:ext cx="2011680" cy="1371600"/>
           </a:xfrm>
           <a:prstGeom prst="roundRect">
@@ -5903,6 +6041,7 @@
           <a:lstStyle/>
           <a:p>
             <a:pPr algn="ctr"/>
+            <a:endParaRPr/>
           </a:p>
         </p:txBody>
       </p:sp>
@@ -5914,7 +6053,7 @@
         </p:nvSpPr>
         <p:spPr>
           <a:xfrm>
-            <a:off x="4937760" y="2514600"/>
+            <a:off x="4809744" y="2523744"/>
             <a:ext cx="2011680" cy="731520"/>
           </a:xfrm>
           <a:prstGeom prst="rect">
@@ -5929,13 +6068,14 @@
           <a:lstStyle/>
           <a:p>
             <a:pPr algn="ctr">
-              <a:defRPr b="1" sz="3200">
+              <a:defRPr sz="3200" b="1">
                 <a:solidFill>
                   <a:srgbClr val="D33682"/>
                 </a:solidFill>
               </a:defRPr>
             </a:pPr>
             <a:r>
+              <a:rPr dirty="0"/>
               <a:t>14,107</a:t>
             </a:r>
           </a:p>
@@ -5949,7 +6089,7 @@
         </p:nvSpPr>
         <p:spPr>
           <a:xfrm>
-            <a:off x="4937760" y="3063240"/>
+            <a:off x="4809744" y="3063240"/>
             <a:ext cx="2011680" cy="457200"/>
           </a:xfrm>
           <a:prstGeom prst="rect">
@@ -5971,6 +6111,7 @@
               </a:defRPr>
             </a:pPr>
             <a:r>
+              <a:rPr dirty="0"/>
               <a:t>Detections</a:t>
             </a:r>
           </a:p>
@@ -5984,7 +6125,7 @@
         </p:nvSpPr>
         <p:spPr>
           <a:xfrm>
-            <a:off x="7178040" y="2286000"/>
+            <a:off x="7022592" y="2286000"/>
             <a:ext cx="2011680" cy="1371600"/>
           </a:xfrm>
           <a:prstGeom prst="roundRect">
@@ -6018,6 +6159,7 @@
           <a:lstStyle/>
           <a:p>
             <a:pPr algn="ctr"/>
+            <a:endParaRPr/>
           </a:p>
         </p:txBody>
       </p:sp>
@@ -6029,7 +6171,7 @@
         </p:nvSpPr>
         <p:spPr>
           <a:xfrm>
-            <a:off x="7178040" y="2514600"/>
+            <a:off x="7022592" y="2514600"/>
             <a:ext cx="2011680" cy="731520"/>
           </a:xfrm>
           <a:prstGeom prst="rect">
@@ -6044,13 +6186,14 @@
           <a:lstStyle/>
           <a:p>
             <a:pPr algn="ctr">
-              <a:defRPr b="1" sz="3200">
+              <a:defRPr sz="3200" b="1">
                 <a:solidFill>
                   <a:srgbClr val="D33682"/>
                 </a:solidFill>
               </a:defRPr>
             </a:pPr>
             <a:r>
+              <a:rPr dirty="0"/>
               <a:t>197s</a:t>
             </a:r>
           </a:p>
@@ -6064,7 +6207,7 @@
         </p:nvSpPr>
         <p:spPr>
           <a:xfrm>
-            <a:off x="7178040" y="3063240"/>
+            <a:off x="7022592" y="3063240"/>
             <a:ext cx="2011680" cy="457200"/>
           </a:xfrm>
           <a:prstGeom prst="rect">
@@ -6086,6 +6229,7 @@
               </a:defRPr>
             </a:pPr>
             <a:r>
+              <a:rPr dirty="0"/>
               <a:t>Duration</a:t>
             </a:r>
           </a:p>

</xml_diff>